<commit_message>
further changes to presentation and challenge documentation
</commit_message>
<xml_diff>
--- a/Präsentation_MonteCarlo.pptx
+++ b/Präsentation_MonteCarlo.pptx
@@ -137,6 +137,135 @@
 </p:presentation>
 </file>
 
+<file path=ppt/authors.xml><?xml version="1.0" encoding="utf-8"?>
+<p188:authorLst xmlns:a="http://schemas.openxmlformats.org/drawingml/2006/main" xmlns:r="http://schemas.openxmlformats.org/officeDocument/2006/relationships" xmlns:p188="http://schemas.microsoft.com/office/powerpoint/2018/8/main">
+  <p188:author id="{738DA873-DB13-F91F-A9E2-F1ED84C0CE71}" name="Paul Nitschke" initials="PN" userId="Paul Nitschke" providerId="None"/>
+</p188:authorLst>
+</file>
+
+<file path=ppt/comments/modernComment_10C_9FD0E584.xml><?xml version="1.0" encoding="utf-8"?>
+<p188:cmLst xmlns:a="http://schemas.openxmlformats.org/drawingml/2006/main" xmlns:r="http://schemas.openxmlformats.org/officeDocument/2006/relationships" xmlns:p188="http://schemas.microsoft.com/office/powerpoint/2018/8/main">
+  <p188:cm id="{B86B9DF3-C850-4127-9E4B-DC315E9E3652}" authorId="{738DA873-DB13-F91F-A9E2-F1ED84C0CE71}" created="2022-11-13T10:27:54.470">
+    <pc:sldMkLst xmlns:pc="http://schemas.microsoft.com/office/powerpoint/2013/main/command">
+      <pc:docMk/>
+      <pc:sldMk cId="2681267588" sldId="268"/>
+    </pc:sldMkLst>
+    <p188:replyLst>
+      <p188:reply id="{875BB5D3-70FE-460F-8448-60F3F33C2E11}" authorId="{738DA873-DB13-F91F-A9E2-F1ED84C0CE71}" created="2022-11-13T10:29:44.261">
+        <p188:txBody>
+          <a:bodyPr/>
+          <a:lstStyle/>
+          <a:p>
+            <a:r>
+              <a:rPr lang="de-DE"/>
+              <a:t>Hat jemand Fragen?</a:t>
+            </a:r>
+          </a:p>
+        </p188:txBody>
+      </p188:reply>
+    </p188:replyLst>
+    <p188:txBody>
+      <a:bodyPr/>
+      <a:lstStyle/>
+      <a:p>
+        <a:r>
+          <a:rPr lang="de-DE"/>
+          <a:t>1.  Wie funktioniert Algo aufmalen
+2. Warum nehme ich manchmal auch weniger wahrscheinliche Punkte?
+Aufmalen</a:t>
+        </a:r>
+      </a:p>
+    </p188:txBody>
+  </p188:cm>
+</p188:cmLst>
+</file>
+
+<file path=ppt/comments/modernComment_10D_79DC3992.xml><?xml version="1.0" encoding="utf-8"?>
+<p188:cmLst xmlns:a="http://schemas.openxmlformats.org/drawingml/2006/main" xmlns:r="http://schemas.openxmlformats.org/officeDocument/2006/relationships" xmlns:p188="http://schemas.microsoft.com/office/powerpoint/2018/8/main">
+  <p188:cm id="{43C3058F-BC55-444C-A7B7-424FF0BCE054}" authorId="{738DA873-DB13-F91F-A9E2-F1ED84C0CE71}" created="2022-11-13T10:30:13.315">
+    <pc:sldMkLst xmlns:pc="http://schemas.microsoft.com/office/powerpoint/2013/main/command">
+      <pc:docMk/>
+      <pc:sldMk cId="2044475794" sldId="269"/>
+    </pc:sldMkLst>
+    <p188:txBody>
+      <a:bodyPr/>
+      <a:lstStyle/>
+      <a:p>
+        <a:r>
+          <a:rPr lang="de-DE"/>
+          <a:t>Hier nochmal fragen ob es Fragen gibt</a:t>
+        </a:r>
+      </a:p>
+    </p188:txBody>
+  </p188:cm>
+</p188:cmLst>
+</file>
+
+<file path=ppt/comments/modernComment_113_E6E92FAA.xml><?xml version="1.0" encoding="utf-8"?>
+<p188:cmLst xmlns:a="http://schemas.openxmlformats.org/drawingml/2006/main" xmlns:r="http://schemas.openxmlformats.org/officeDocument/2006/relationships" xmlns:p188="http://schemas.microsoft.com/office/powerpoint/2018/8/main">
+  <p188:cm id="{0AB98AE5-8CAC-4EDB-99E0-0350730F965A}" authorId="{738DA873-DB13-F91F-A9E2-F1ED84C0CE71}" created="2022-11-13T10:31:25.031">
+    <ac:deMkLst xmlns:ac="http://schemas.microsoft.com/office/drawing/2013/main/command">
+      <pc:docMk xmlns:pc="http://schemas.microsoft.com/office/powerpoint/2013/main/command"/>
+      <pc:sldMk xmlns:pc="http://schemas.microsoft.com/office/powerpoint/2013/main/command" cId="3874041770" sldId="275"/>
+      <ac:spMk id="3" creationId="{232E5703-9081-45BF-35E8-3E0D697B74CF}"/>
+    </ac:deMkLst>
+    <p188:txBody>
+      <a:bodyPr/>
+      <a:lstStyle/>
+      <a:p>
+        <a:r>
+          <a:rPr lang="de-DE"/>
+          <a:t>Bild vom Gradienten</a:t>
+        </a:r>
+      </a:p>
+    </p188:txBody>
+  </p188:cm>
+</p188:cmLst>
+</file>
+
+<file path=ppt/comments/modernComment_119_B3A139BF.xml><?xml version="1.0" encoding="utf-8"?>
+<p188:cmLst xmlns:a="http://schemas.openxmlformats.org/drawingml/2006/main" xmlns:r="http://schemas.openxmlformats.org/officeDocument/2006/relationships" xmlns:p188="http://schemas.microsoft.com/office/powerpoint/2018/8/main">
+  <p188:cm id="{3A7A2230-4E63-4C21-8FA8-859B93138CF7}" authorId="{738DA873-DB13-F91F-A9E2-F1ED84C0CE71}" created="2022-11-13T10:52:22.524">
+    <pc:sldMkLst xmlns:pc="http://schemas.microsoft.com/office/powerpoint/2013/main/command">
+      <pc:docMk/>
+      <pc:sldMk cId="3013687743" sldId="281"/>
+    </pc:sldMkLst>
+    <p188:txBody>
+      <a:bodyPr/>
+      <a:lstStyle/>
+      <a:p>
+        <a:r>
+          <a:rPr lang="de-DE"/>
+          <a:t>Einmal algo einblenden</a:t>
+        </a:r>
+      </a:p>
+    </p188:txBody>
+  </p188:cm>
+</p188:cmLst>
+</file>
+
+<file path=ppt/comments/modernComment_11B_2FADCD9C.xml><?xml version="1.0" encoding="utf-8"?>
+<p188:cmLst xmlns:a="http://schemas.openxmlformats.org/drawingml/2006/main" xmlns:r="http://schemas.openxmlformats.org/officeDocument/2006/relationships" xmlns:p188="http://schemas.microsoft.com/office/powerpoint/2018/8/main">
+  <p188:cm id="{E37E97F4-F703-4EC4-922B-61449239A81A}" authorId="{738DA873-DB13-F91F-A9E2-F1ED84C0CE71}" created="2022-11-13T11:18:37.129">
+    <ac:deMkLst xmlns:ac="http://schemas.microsoft.com/office/drawing/2013/main/command">
+      <pc:docMk xmlns:pc="http://schemas.microsoft.com/office/powerpoint/2013/main/command"/>
+      <pc:sldMk xmlns:pc="http://schemas.microsoft.com/office/powerpoint/2013/main/command" cId="799919516" sldId="283"/>
+      <ac:spMk id="3" creationId="{232E5703-9081-45BF-35E8-3E0D697B74CF}"/>
+    </ac:deMkLst>
+    <p188:txBody>
+      <a:bodyPr/>
+      <a:lstStyle/>
+      <a:p>
+        <a:r>
+          <a:rPr lang="de-DE"/>
+          <a:t>Genauer ESS</a:t>
+        </a:r>
+      </a:p>
+    </p188:txBody>
+  </p188:cm>
+</p188:cmLst>
+</file>
+
 <file path=ppt/slideLayouts/slideLayout1.xml><?xml version="1.0" encoding="utf-8"?>
 <p:sldLayout xmlns:a="http://schemas.openxmlformats.org/drawingml/2006/main" xmlns:r="http://schemas.openxmlformats.org/officeDocument/2006/relationships" xmlns:p="http://schemas.openxmlformats.org/presentationml/2006/main" type="title" preserve="1">
   <p:cSld name="Titelfolie">
@@ -284,7 +413,7 @@
           <a:p>
             <a:fld id="{FEA9118B-EB62-4AC7-B893-52C4CE8DA56F}" type="datetimeFigureOut">
               <a:rPr lang="de-DE" smtClean="0"/>
-              <a:t>07.11.2022</a:t>
+              <a:t>13.11.2022</a:t>
             </a:fld>
             <a:endParaRPr lang="de-DE"/>
           </a:p>
@@ -482,7 +611,7 @@
           <a:p>
             <a:fld id="{FEA9118B-EB62-4AC7-B893-52C4CE8DA56F}" type="datetimeFigureOut">
               <a:rPr lang="de-DE" smtClean="0"/>
-              <a:t>07.11.2022</a:t>
+              <a:t>13.11.2022</a:t>
             </a:fld>
             <a:endParaRPr lang="de-DE"/>
           </a:p>
@@ -690,7 +819,7 @@
           <a:p>
             <a:fld id="{FEA9118B-EB62-4AC7-B893-52C4CE8DA56F}" type="datetimeFigureOut">
               <a:rPr lang="de-DE" smtClean="0"/>
-              <a:t>07.11.2022</a:t>
+              <a:t>13.11.2022</a:t>
             </a:fld>
             <a:endParaRPr lang="de-DE"/>
           </a:p>
@@ -888,7 +1017,7 @@
           <a:p>
             <a:fld id="{FEA9118B-EB62-4AC7-B893-52C4CE8DA56F}" type="datetimeFigureOut">
               <a:rPr lang="de-DE" smtClean="0"/>
-              <a:t>07.11.2022</a:t>
+              <a:t>13.11.2022</a:t>
             </a:fld>
             <a:endParaRPr lang="de-DE"/>
           </a:p>
@@ -1163,7 +1292,7 @@
           <a:p>
             <a:fld id="{FEA9118B-EB62-4AC7-B893-52C4CE8DA56F}" type="datetimeFigureOut">
               <a:rPr lang="de-DE" smtClean="0"/>
-              <a:t>07.11.2022</a:t>
+              <a:t>13.11.2022</a:t>
             </a:fld>
             <a:endParaRPr lang="de-DE"/>
           </a:p>
@@ -1428,7 +1557,7 @@
           <a:p>
             <a:fld id="{FEA9118B-EB62-4AC7-B893-52C4CE8DA56F}" type="datetimeFigureOut">
               <a:rPr lang="de-DE" smtClean="0"/>
-              <a:t>07.11.2022</a:t>
+              <a:t>13.11.2022</a:t>
             </a:fld>
             <a:endParaRPr lang="de-DE"/>
           </a:p>
@@ -1840,7 +1969,7 @@
           <a:p>
             <a:fld id="{FEA9118B-EB62-4AC7-B893-52C4CE8DA56F}" type="datetimeFigureOut">
               <a:rPr lang="de-DE" smtClean="0"/>
-              <a:t>07.11.2022</a:t>
+              <a:t>13.11.2022</a:t>
             </a:fld>
             <a:endParaRPr lang="de-DE"/>
           </a:p>
@@ -1981,7 +2110,7 @@
           <a:p>
             <a:fld id="{FEA9118B-EB62-4AC7-B893-52C4CE8DA56F}" type="datetimeFigureOut">
               <a:rPr lang="de-DE" smtClean="0"/>
-              <a:t>07.11.2022</a:t>
+              <a:t>13.11.2022</a:t>
             </a:fld>
             <a:endParaRPr lang="de-DE"/>
           </a:p>
@@ -2094,7 +2223,7 @@
           <a:p>
             <a:fld id="{FEA9118B-EB62-4AC7-B893-52C4CE8DA56F}" type="datetimeFigureOut">
               <a:rPr lang="de-DE" smtClean="0"/>
-              <a:t>07.11.2022</a:t>
+              <a:t>13.11.2022</a:t>
             </a:fld>
             <a:endParaRPr lang="de-DE"/>
           </a:p>
@@ -2405,7 +2534,7 @@
           <a:p>
             <a:fld id="{FEA9118B-EB62-4AC7-B893-52C4CE8DA56F}" type="datetimeFigureOut">
               <a:rPr lang="de-DE" smtClean="0"/>
-              <a:t>07.11.2022</a:t>
+              <a:t>13.11.2022</a:t>
             </a:fld>
             <a:endParaRPr lang="de-DE"/>
           </a:p>
@@ -2693,7 +2822,7 @@
           <a:p>
             <a:fld id="{FEA9118B-EB62-4AC7-B893-52C4CE8DA56F}" type="datetimeFigureOut">
               <a:rPr lang="de-DE" smtClean="0"/>
-              <a:t>07.11.2022</a:t>
+              <a:t>13.11.2022</a:t>
             </a:fld>
             <a:endParaRPr lang="de-DE"/>
           </a:p>
@@ -2934,7 +3063,7 @@
           <a:p>
             <a:fld id="{FEA9118B-EB62-4AC7-B893-52C4CE8DA56F}" type="datetimeFigureOut">
               <a:rPr lang="de-DE" smtClean="0"/>
-              <a:t>07.11.2022</a:t>
+              <a:t>13.11.2022</a:t>
             </a:fld>
             <a:endParaRPr lang="de-DE"/>
           </a:p>
@@ -3609,7 +3738,7 @@
             </a:r>
             <a:r>
               <a:rPr lang="de-DE" dirty="0"/>
-              <a:t>, bspw. ziehe x</a:t>
+              <a:t>, bspw. setze x</a:t>
             </a:r>
             <a:r>
               <a:rPr lang="de-DE" baseline="-25000" dirty="0"/>
@@ -3617,7 +3746,7 @@
             </a:r>
             <a:r>
               <a:rPr lang="de-DE" dirty="0"/>
-              <a:t> aus einer Normalverteilung N(0,1)</a:t>
+              <a:t> = 1</a:t>
             </a:r>
           </a:p>
           <a:p>
@@ -3630,7 +3759,7 @@
             </a:r>
             <a:r>
               <a:rPr lang="de-DE" b="1" dirty="0" err="1"/>
-              <a:t>Proposal</a:t>
+              <a:t>Propose</a:t>
             </a:r>
             <a:r>
               <a:rPr lang="de-DE" b="1" dirty="0"/>
@@ -3828,7 +3957,7 @@
             </a:pPr>
             <a:r>
               <a:rPr lang="de-DE" dirty="0"/>
-              <a:t>(iv) Wiederhole (i) – (iv) n-mal, um Stichproben x</a:t>
+              <a:t>(iv) Wiederhole (i) – (iii) n-mal, um Stichproben x</a:t>
             </a:r>
             <a:r>
               <a:rPr lang="de-DE" baseline="-25000" dirty="0"/>
@@ -3863,6 +3992,11 @@
   <p:clrMapOvr>
     <a:masterClrMapping/>
   </p:clrMapOvr>
+  <p:extLst>
+    <p:ext uri="{6950BFC3-D8DA-4A85-94F7-54DA5524770B}">
+      <p188:commentRel xmlns:p188="http://schemas.microsoft.com/office/powerpoint/2018/8/main" r:id="rId2"/>
+    </p:ext>
+  </p:extLst>
 </p:sld>
 </file>
 
@@ -4108,6 +4242,11 @@
   <p:clrMapOvr>
     <a:masterClrMapping/>
   </p:clrMapOvr>
+  <p:extLst>
+    <p:ext uri="{6950BFC3-D8DA-4A85-94F7-54DA5524770B}">
+      <p188:commentRel xmlns:p188="http://schemas.microsoft.com/office/powerpoint/2018/8/main" r:id="rId2"/>
+    </p:ext>
+  </p:extLst>
 </p:sld>
 </file>
 
@@ -4506,7 +4645,7 @@
             </p:nvSpPr>
             <p:spPr>
               <a:blipFill>
-                <a:blip r:embed="rId2"/>
+                <a:blip r:embed="rId3"/>
                 <a:stretch>
                   <a:fillRect l="-1217" t="-2661" r="-1507"/>
                 </a:stretch>
@@ -4537,6 +4676,11 @@
   <p:clrMapOvr>
     <a:masterClrMapping/>
   </p:clrMapOvr>
+  <p:extLst>
+    <p:ext uri="{6950BFC3-D8DA-4A85-94F7-54DA5524770B}">
+      <p188:commentRel xmlns:p188="http://schemas.microsoft.com/office/powerpoint/2018/8/main" r:id="rId2"/>
+    </p:ext>
+  </p:extLst>
 </p:sld>
 </file>
 
@@ -6111,8 +6255,8 @@
           </a:p>
         </p:txBody>
       </p:sp>
-      <mc:AlternateContent xmlns:mc="http://schemas.openxmlformats.org/markup-compatibility/2006" xmlns:a14="http://schemas.microsoft.com/office/drawing/2010/main">
-        <mc:Choice Requires="a14">
+      <mc:AlternateContent xmlns:mc="http://schemas.openxmlformats.org/markup-compatibility/2006">
+        <mc:Choice xmlns:a14="http://schemas.microsoft.com/office/drawing/2010/main" Requires="a14">
           <p:sp>
             <p:nvSpPr>
               <p:cNvPr id="3" name="Inhaltsplatzhalter 2">
@@ -6156,10 +6300,14 @@
                 </a:r>
                 <a:r>
                   <a:rPr lang="de-DE" sz="2600" dirty="0"/>
-                  <a:t> eine normalverteilte Momentum-Variable s</a:t>
-                </a:r>
-                <a:r>
-                  <a:rPr lang="de-DE" sz="2600" baseline="-25000" dirty="0"/>
+                  <a:t> eine normalverteilte Momentum-Variable </a:t>
+                </a:r>
+                <a:r>
+                  <a:rPr lang="de-DE" sz="2600" dirty="0" err="1"/>
+                  <a:t>p</a:t>
+                </a:r>
+                <a:r>
+                  <a:rPr lang="de-DE" sz="2600" baseline="-25000" dirty="0" err="1"/>
                   <a:t>i</a:t>
                 </a:r>
                 <a:r>
@@ -6587,7 +6735,7 @@
             </p:txBody>
           </p:sp>
         </mc:Choice>
-        <mc:Fallback xmlns="">
+        <mc:Fallback>
           <p:sp>
             <p:nvSpPr>
               <p:cNvPr id="3" name="Inhaltsplatzhalter 2">
@@ -7050,7 +7198,7 @@
             </p:nvSpPr>
             <p:spPr>
               <a:blipFill>
-                <a:blip r:embed="rId2"/>
+                <a:blip r:embed="rId3"/>
                 <a:stretch>
                   <a:fillRect l="-928" t="-2241" r="-1159"/>
                 </a:stretch>
@@ -7081,6 +7229,11 @@
   <p:clrMapOvr>
     <a:masterClrMapping/>
   </p:clrMapOvr>
+  <p:extLst>
+    <p:ext uri="{6950BFC3-D8DA-4A85-94F7-54DA5524770B}">
+      <p188:commentRel xmlns:p188="http://schemas.microsoft.com/office/powerpoint/2018/8/main" r:id="rId2"/>
+    </p:ext>
+  </p:extLst>
 </p:sld>
 </file>
 
@@ -7696,6 +7849,11 @@
   <p:clrMapOvr>
     <a:masterClrMapping/>
   </p:clrMapOvr>
+  <p:extLst>
+    <p:ext uri="{6950BFC3-D8DA-4A85-94F7-54DA5524770B}">
+      <p188:commentRel xmlns:p188="http://schemas.microsoft.com/office/powerpoint/2018/8/main" r:id="rId2"/>
+    </p:ext>
+  </p:extLst>
 </p:sld>
 </file>
 
@@ -8865,7 +9023,7 @@
           <a:p>
             <a:r>
               <a:rPr lang="de-DE" dirty="0"/>
-              <a:t>Die Idee: baue eine MC, die </a:t>
+              <a:t>Die Idee: baue eine Markov Kette, die </a:t>
             </a:r>
             <a:r>
               <a:rPr lang="el-GR" b="1" dirty="0"/>
@@ -8879,7 +9037,7 @@
           <a:p>
             <a:r>
               <a:rPr lang="de-DE" dirty="0"/>
-              <a:t>Lassen wir diese MC laufen, konvergiert diese gegen ihre stationäre Verteilung </a:t>
+              <a:t>Lassen wir diese Markov Kette laufen, konvergiert diese gegen ihre stationäre Verteilung </a:t>
             </a:r>
             <a:r>
               <a:rPr lang="el-GR" dirty="0"/>
@@ -8893,7 +9051,7 @@
           <a:p>
             <a:r>
               <a:rPr lang="de-DE" dirty="0"/>
-              <a:t>Weiteres simulieren der MC resultiert in Stichproben aus </a:t>
+              <a:t>Weiteres simulieren der Markov Kette resultiert in Stichproben aus </a:t>
             </a:r>
             <a:r>
               <a:rPr lang="el-GR" dirty="0"/>

</xml_diff>

<commit_message>
updated powerpoint to stads master layout
</commit_message>
<xml_diff>
--- a/Präsentation_MonteCarlo.pptx
+++ b/Präsentation_MonteCarlo.pptx
@@ -4,8 +4,11 @@
   <p:sldMasterIdLst>
     <p:sldMasterId id="2147483648" r:id="rId1"/>
   </p:sldMasterIdLst>
+  <p:notesMasterIdLst>
+    <p:notesMasterId r:id="rId28"/>
+  </p:notesMasterIdLst>
   <p:sldIdLst>
-    <p:sldId id="256" r:id="rId2"/>
+    <p:sldId id="552" r:id="rId2"/>
     <p:sldId id="260" r:id="rId3"/>
     <p:sldId id="257" r:id="rId4"/>
     <p:sldId id="259" r:id="rId5"/>
@@ -130,6 +133,43 @@
     </a:lvl9pPr>
   </p:defaultTextStyle>
   <p:extLst>
+    <p:ext uri="{521415D9-36F7-43E2-AB2F-B90AF26B5E84}">
+      <p14:sectionLst xmlns:p14="http://schemas.microsoft.com/office/powerpoint/2010/main">
+        <p14:section name="Standardabschnitt" id="{FCD7937E-1640-4062-B0C7-875AE97A90AF}">
+          <p14:sldIdLst/>
+        </p14:section>
+        <p14:section name="Standardabschnitt" id="{6D90F504-FE33-488A-B217-6756DB0C518A}">
+          <p14:sldIdLst>
+            <p14:sldId id="552"/>
+            <p14:sldId id="260"/>
+            <p14:sldId id="257"/>
+            <p14:sldId id="259"/>
+            <p14:sldId id="258"/>
+            <p14:sldId id="261"/>
+            <p14:sldId id="262"/>
+            <p14:sldId id="263"/>
+            <p14:sldId id="265"/>
+            <p14:sldId id="267"/>
+            <p14:sldId id="268"/>
+            <p14:sldId id="269"/>
+            <p14:sldId id="270"/>
+            <p14:sldId id="275"/>
+            <p14:sldId id="271"/>
+            <p14:sldId id="273"/>
+            <p14:sldId id="272"/>
+            <p14:sldId id="274"/>
+            <p14:sldId id="276"/>
+            <p14:sldId id="278"/>
+            <p14:sldId id="277"/>
+            <p14:sldId id="281"/>
+            <p14:sldId id="280"/>
+            <p14:sldId id="282"/>
+            <p14:sldId id="283"/>
+            <p14:sldId id="284"/>
+          </p14:sldIdLst>
+        </p14:section>
+      </p14:sectionLst>
+    </p:ext>
     <p:ext uri="{EFAFB233-063F-42B5-8137-9DF3F51BA10A}">
       <p15:sldGuideLst xmlns:p15="http://schemas.microsoft.com/office/powerpoint/2012/main"/>
     </p:ext>
@@ -266,6 +306,355 @@
 </p188:cmLst>
 </file>
 
+<file path=ppt/notesMasters/notesMaster1.xml><?xml version="1.0" encoding="utf-8"?>
+<p:notesMaster xmlns:a="http://schemas.openxmlformats.org/drawingml/2006/main" xmlns:r="http://schemas.openxmlformats.org/officeDocument/2006/relationships" xmlns:p="http://schemas.openxmlformats.org/presentationml/2006/main">
+  <p:cSld>
+    <p:bg>
+      <p:bgRef idx="1001">
+        <a:schemeClr val="bg1"/>
+      </p:bgRef>
+    </p:bg>
+    <p:spTree>
+      <p:nvGrpSpPr>
+        <p:cNvPr id="1" name=""/>
+        <p:cNvGrpSpPr/>
+        <p:nvPr/>
+      </p:nvGrpSpPr>
+      <p:grpSpPr>
+        <a:xfrm>
+          <a:off x="0" y="0"/>
+          <a:ext cx="0" cy="0"/>
+          <a:chOff x="0" y="0"/>
+          <a:chExt cx="0" cy="0"/>
+        </a:xfrm>
+      </p:grpSpPr>
+      <p:sp>
+        <p:nvSpPr>
+          <p:cNvPr id="2" name="Kopfzeilenplatzhalter 1"/>
+          <p:cNvSpPr>
+            <a:spLocks noGrp="1"/>
+          </p:cNvSpPr>
+          <p:nvPr>
+            <p:ph type="hdr" sz="quarter"/>
+          </p:nvPr>
+        </p:nvSpPr>
+        <p:spPr>
+          <a:xfrm>
+            <a:off x="0" y="0"/>
+            <a:ext cx="2971800" cy="458788"/>
+          </a:xfrm>
+          <a:prstGeom prst="rect">
+            <a:avLst/>
+          </a:prstGeom>
+        </p:spPr>
+        <p:txBody>
+          <a:bodyPr vert="horz" lIns="91440" tIns="45720" rIns="91440" bIns="45720" rtlCol="0"/>
+          <a:lstStyle>
+            <a:lvl1pPr algn="l">
+              <a:defRPr sz="1200"/>
+            </a:lvl1pPr>
+          </a:lstStyle>
+          <a:p>
+            <a:endParaRPr lang="de-DE"/>
+          </a:p>
+        </p:txBody>
+      </p:sp>
+      <p:sp>
+        <p:nvSpPr>
+          <p:cNvPr id="3" name="Datumsplatzhalter 2"/>
+          <p:cNvSpPr>
+            <a:spLocks noGrp="1"/>
+          </p:cNvSpPr>
+          <p:nvPr>
+            <p:ph type="dt" idx="1"/>
+          </p:nvPr>
+        </p:nvSpPr>
+        <p:spPr>
+          <a:xfrm>
+            <a:off x="3884613" y="0"/>
+            <a:ext cx="2971800" cy="458788"/>
+          </a:xfrm>
+          <a:prstGeom prst="rect">
+            <a:avLst/>
+          </a:prstGeom>
+        </p:spPr>
+        <p:txBody>
+          <a:bodyPr vert="horz" lIns="91440" tIns="45720" rIns="91440" bIns="45720" rtlCol="0"/>
+          <a:lstStyle>
+            <a:lvl1pPr algn="r">
+              <a:defRPr sz="1200"/>
+            </a:lvl1pPr>
+          </a:lstStyle>
+          <a:p>
+            <a:fld id="{041CD2E6-840F-44C5-A2A9-5138604D20B7}" type="datetimeFigureOut">
+              <a:rPr lang="de-DE" smtClean="0"/>
+              <a:t>15.11.2022</a:t>
+            </a:fld>
+            <a:endParaRPr lang="de-DE"/>
+          </a:p>
+        </p:txBody>
+      </p:sp>
+      <p:sp>
+        <p:nvSpPr>
+          <p:cNvPr id="4" name="Folienbildplatzhalter 3"/>
+          <p:cNvSpPr>
+            <a:spLocks noGrp="1" noRot="1" noChangeAspect="1"/>
+          </p:cNvSpPr>
+          <p:nvPr>
+            <p:ph type="sldImg" idx="2"/>
+          </p:nvPr>
+        </p:nvSpPr>
+        <p:spPr>
+          <a:xfrm>
+            <a:off x="685800" y="1143000"/>
+            <a:ext cx="5486400" cy="3086100"/>
+          </a:xfrm>
+          <a:prstGeom prst="rect">
+            <a:avLst/>
+          </a:prstGeom>
+          <a:noFill/>
+          <a:ln w="12700">
+            <a:solidFill>
+              <a:prstClr val="black"/>
+            </a:solidFill>
+          </a:ln>
+        </p:spPr>
+        <p:txBody>
+          <a:bodyPr vert="horz" lIns="91440" tIns="45720" rIns="91440" bIns="45720" rtlCol="0" anchor="ctr"/>
+          <a:lstStyle/>
+          <a:p>
+            <a:endParaRPr lang="de-DE"/>
+          </a:p>
+        </p:txBody>
+      </p:sp>
+      <p:sp>
+        <p:nvSpPr>
+          <p:cNvPr id="5" name="Notizenplatzhalter 4"/>
+          <p:cNvSpPr>
+            <a:spLocks noGrp="1"/>
+          </p:cNvSpPr>
+          <p:nvPr>
+            <p:ph type="body" sz="quarter" idx="3"/>
+          </p:nvPr>
+        </p:nvSpPr>
+        <p:spPr>
+          <a:xfrm>
+            <a:off x="685800" y="4400550"/>
+            <a:ext cx="5486400" cy="3600450"/>
+          </a:xfrm>
+          <a:prstGeom prst="rect">
+            <a:avLst/>
+          </a:prstGeom>
+        </p:spPr>
+        <p:txBody>
+          <a:bodyPr vert="horz" lIns="91440" tIns="45720" rIns="91440" bIns="45720" rtlCol="0"/>
+          <a:lstStyle/>
+          <a:p>
+            <a:pPr lvl="0"/>
+            <a:r>
+              <a:rPr lang="de-DE"/>
+              <a:t>Mastertextformat bearbeiten</a:t>
+            </a:r>
+          </a:p>
+          <a:p>
+            <a:pPr lvl="1"/>
+            <a:r>
+              <a:rPr lang="de-DE"/>
+              <a:t>Zweite Ebene</a:t>
+            </a:r>
+          </a:p>
+          <a:p>
+            <a:pPr lvl="2"/>
+            <a:r>
+              <a:rPr lang="de-DE"/>
+              <a:t>Dritte Ebene</a:t>
+            </a:r>
+          </a:p>
+          <a:p>
+            <a:pPr lvl="3"/>
+            <a:r>
+              <a:rPr lang="de-DE"/>
+              <a:t>Vierte Ebene</a:t>
+            </a:r>
+          </a:p>
+          <a:p>
+            <a:pPr lvl="4"/>
+            <a:r>
+              <a:rPr lang="de-DE"/>
+              <a:t>Fünfte Ebene</a:t>
+            </a:r>
+          </a:p>
+        </p:txBody>
+      </p:sp>
+      <p:sp>
+        <p:nvSpPr>
+          <p:cNvPr id="6" name="Fußzeilenplatzhalter 5"/>
+          <p:cNvSpPr>
+            <a:spLocks noGrp="1"/>
+          </p:cNvSpPr>
+          <p:nvPr>
+            <p:ph type="ftr" sz="quarter" idx="4"/>
+          </p:nvPr>
+        </p:nvSpPr>
+        <p:spPr>
+          <a:xfrm>
+            <a:off x="0" y="8685213"/>
+            <a:ext cx="2971800" cy="458787"/>
+          </a:xfrm>
+          <a:prstGeom prst="rect">
+            <a:avLst/>
+          </a:prstGeom>
+        </p:spPr>
+        <p:txBody>
+          <a:bodyPr vert="horz" lIns="91440" tIns="45720" rIns="91440" bIns="45720" rtlCol="0" anchor="b"/>
+          <a:lstStyle>
+            <a:lvl1pPr algn="l">
+              <a:defRPr sz="1200"/>
+            </a:lvl1pPr>
+          </a:lstStyle>
+          <a:p>
+            <a:endParaRPr lang="de-DE"/>
+          </a:p>
+        </p:txBody>
+      </p:sp>
+      <p:sp>
+        <p:nvSpPr>
+          <p:cNvPr id="7" name="Foliennummernplatzhalter 6"/>
+          <p:cNvSpPr>
+            <a:spLocks noGrp="1"/>
+          </p:cNvSpPr>
+          <p:nvPr>
+            <p:ph type="sldNum" sz="quarter" idx="5"/>
+          </p:nvPr>
+        </p:nvSpPr>
+        <p:spPr>
+          <a:xfrm>
+            <a:off x="3884613" y="8685213"/>
+            <a:ext cx="2971800" cy="458787"/>
+          </a:xfrm>
+          <a:prstGeom prst="rect">
+            <a:avLst/>
+          </a:prstGeom>
+        </p:spPr>
+        <p:txBody>
+          <a:bodyPr vert="horz" lIns="91440" tIns="45720" rIns="91440" bIns="45720" rtlCol="0" anchor="b"/>
+          <a:lstStyle>
+            <a:lvl1pPr algn="r">
+              <a:defRPr sz="1200"/>
+            </a:lvl1pPr>
+          </a:lstStyle>
+          <a:p>
+            <a:fld id="{052DC935-3EA7-4EE0-863C-B58948B5DB08}" type="slidenum">
+              <a:rPr lang="de-DE" smtClean="0"/>
+              <a:t>‹Nr.›</a:t>
+            </a:fld>
+            <a:endParaRPr lang="de-DE"/>
+          </a:p>
+        </p:txBody>
+      </p:sp>
+    </p:spTree>
+    <p:extLst>
+      <p:ext uri="{BB962C8B-B14F-4D97-AF65-F5344CB8AC3E}">
+        <p14:creationId xmlns:p14="http://schemas.microsoft.com/office/powerpoint/2010/main" val="3110726847"/>
+      </p:ext>
+    </p:extLst>
+  </p:cSld>
+  <p:clrMap bg1="lt1" tx1="dk1" bg2="lt2" tx2="dk2" accent1="accent1" accent2="accent2" accent3="accent3" accent4="accent4" accent5="accent5" accent6="accent6" hlink="hlink" folHlink="folHlink"/>
+  <p:notesStyle>
+    <a:lvl1pPr marL="0" algn="l" defTabSz="914400" rtl="0" eaLnBrk="1" latinLnBrk="0" hangingPunct="1">
+      <a:defRPr sz="1200" kern="1200">
+        <a:solidFill>
+          <a:schemeClr val="tx1"/>
+        </a:solidFill>
+        <a:latin typeface="+mn-lt"/>
+        <a:ea typeface="+mn-ea"/>
+        <a:cs typeface="+mn-cs"/>
+      </a:defRPr>
+    </a:lvl1pPr>
+    <a:lvl2pPr marL="457200" algn="l" defTabSz="914400" rtl="0" eaLnBrk="1" latinLnBrk="0" hangingPunct="1">
+      <a:defRPr sz="1200" kern="1200">
+        <a:solidFill>
+          <a:schemeClr val="tx1"/>
+        </a:solidFill>
+        <a:latin typeface="+mn-lt"/>
+        <a:ea typeface="+mn-ea"/>
+        <a:cs typeface="+mn-cs"/>
+      </a:defRPr>
+    </a:lvl2pPr>
+    <a:lvl3pPr marL="914400" algn="l" defTabSz="914400" rtl="0" eaLnBrk="1" latinLnBrk="0" hangingPunct="1">
+      <a:defRPr sz="1200" kern="1200">
+        <a:solidFill>
+          <a:schemeClr val="tx1"/>
+        </a:solidFill>
+        <a:latin typeface="+mn-lt"/>
+        <a:ea typeface="+mn-ea"/>
+        <a:cs typeface="+mn-cs"/>
+      </a:defRPr>
+    </a:lvl3pPr>
+    <a:lvl4pPr marL="1371600" algn="l" defTabSz="914400" rtl="0" eaLnBrk="1" latinLnBrk="0" hangingPunct="1">
+      <a:defRPr sz="1200" kern="1200">
+        <a:solidFill>
+          <a:schemeClr val="tx1"/>
+        </a:solidFill>
+        <a:latin typeface="+mn-lt"/>
+        <a:ea typeface="+mn-ea"/>
+        <a:cs typeface="+mn-cs"/>
+      </a:defRPr>
+    </a:lvl4pPr>
+    <a:lvl5pPr marL="1828800" algn="l" defTabSz="914400" rtl="0" eaLnBrk="1" latinLnBrk="0" hangingPunct="1">
+      <a:defRPr sz="1200" kern="1200">
+        <a:solidFill>
+          <a:schemeClr val="tx1"/>
+        </a:solidFill>
+        <a:latin typeface="+mn-lt"/>
+        <a:ea typeface="+mn-ea"/>
+        <a:cs typeface="+mn-cs"/>
+      </a:defRPr>
+    </a:lvl5pPr>
+    <a:lvl6pPr marL="2286000" algn="l" defTabSz="914400" rtl="0" eaLnBrk="1" latinLnBrk="0" hangingPunct="1">
+      <a:defRPr sz="1200" kern="1200">
+        <a:solidFill>
+          <a:schemeClr val="tx1"/>
+        </a:solidFill>
+        <a:latin typeface="+mn-lt"/>
+        <a:ea typeface="+mn-ea"/>
+        <a:cs typeface="+mn-cs"/>
+      </a:defRPr>
+    </a:lvl6pPr>
+    <a:lvl7pPr marL="2743200" algn="l" defTabSz="914400" rtl="0" eaLnBrk="1" latinLnBrk="0" hangingPunct="1">
+      <a:defRPr sz="1200" kern="1200">
+        <a:solidFill>
+          <a:schemeClr val="tx1"/>
+        </a:solidFill>
+        <a:latin typeface="+mn-lt"/>
+        <a:ea typeface="+mn-ea"/>
+        <a:cs typeface="+mn-cs"/>
+      </a:defRPr>
+    </a:lvl7pPr>
+    <a:lvl8pPr marL="3200400" algn="l" defTabSz="914400" rtl="0" eaLnBrk="1" latinLnBrk="0" hangingPunct="1">
+      <a:defRPr sz="1200" kern="1200">
+        <a:solidFill>
+          <a:schemeClr val="tx1"/>
+        </a:solidFill>
+        <a:latin typeface="+mn-lt"/>
+        <a:ea typeface="+mn-ea"/>
+        <a:cs typeface="+mn-cs"/>
+      </a:defRPr>
+    </a:lvl8pPr>
+    <a:lvl9pPr marL="3657600" algn="l" defTabSz="914400" rtl="0" eaLnBrk="1" latinLnBrk="0" hangingPunct="1">
+      <a:defRPr sz="1200" kern="1200">
+        <a:solidFill>
+          <a:schemeClr val="tx1"/>
+        </a:solidFill>
+        <a:latin typeface="+mn-lt"/>
+        <a:ea typeface="+mn-ea"/>
+        <a:cs typeface="+mn-cs"/>
+      </a:defRPr>
+    </a:lvl9pPr>
+  </p:notesStyle>
+</p:notesMaster>
+</file>
+
 <file path=ppt/slideLayouts/slideLayout1.xml><?xml version="1.0" encoding="utf-8"?>
 <p:sldLayout xmlns:a="http://schemas.openxmlformats.org/drawingml/2006/main" xmlns:r="http://schemas.openxmlformats.org/officeDocument/2006/relationships" xmlns:p="http://schemas.openxmlformats.org/presentationml/2006/main" type="title" preserve="1">
   <p:cSld name="Titelfolie">
@@ -413,7 +802,7 @@
           <a:p>
             <a:fld id="{FEA9118B-EB62-4AC7-B893-52C4CE8DA56F}" type="datetimeFigureOut">
               <a:rPr lang="de-DE" smtClean="0"/>
-              <a:t>13.11.2022</a:t>
+              <a:t>15.11.2022</a:t>
             </a:fld>
             <a:endParaRPr lang="de-DE"/>
           </a:p>
@@ -611,7 +1000,7 @@
           <a:p>
             <a:fld id="{FEA9118B-EB62-4AC7-B893-52C4CE8DA56F}" type="datetimeFigureOut">
               <a:rPr lang="de-DE" smtClean="0"/>
-              <a:t>13.11.2022</a:t>
+              <a:t>15.11.2022</a:t>
             </a:fld>
             <a:endParaRPr lang="de-DE"/>
           </a:p>
@@ -819,7 +1208,7 @@
           <a:p>
             <a:fld id="{FEA9118B-EB62-4AC7-B893-52C4CE8DA56F}" type="datetimeFigureOut">
               <a:rPr lang="de-DE" smtClean="0"/>
-              <a:t>13.11.2022</a:t>
+              <a:t>15.11.2022</a:t>
             </a:fld>
             <a:endParaRPr lang="de-DE"/>
           </a:p>
@@ -883,6 +1272,497 @@
     <p:extLst>
       <p:ext uri="{BB962C8B-B14F-4D97-AF65-F5344CB8AC3E}">
         <p14:creationId xmlns:p14="http://schemas.microsoft.com/office/powerpoint/2010/main" val="1763066796"/>
+      </p:ext>
+    </p:extLst>
+  </p:cSld>
+  <p:clrMapOvr>
+    <a:masterClrMapping/>
+  </p:clrMapOvr>
+</p:sldLayout>
+</file>
+
+<file path=ppt/slideLayouts/slideLayout12.xml><?xml version="1.0" encoding="utf-8"?>
+<p:sldLayout xmlns:a="http://schemas.openxmlformats.org/drawingml/2006/main" xmlns:r="http://schemas.openxmlformats.org/officeDocument/2006/relationships" xmlns:p="http://schemas.openxmlformats.org/presentationml/2006/main" userDrawn="1">
+  <p:cSld name="Title Slide_HL_short">
+    <p:spTree>
+      <p:nvGrpSpPr>
+        <p:cNvPr id="1" name=""/>
+        <p:cNvGrpSpPr/>
+        <p:nvPr/>
+      </p:nvGrpSpPr>
+      <p:grpSpPr>
+        <a:xfrm>
+          <a:off x="0" y="0"/>
+          <a:ext cx="0" cy="0"/>
+          <a:chOff x="0" y="0"/>
+          <a:chExt cx="0" cy="0"/>
+        </a:xfrm>
+      </p:grpSpPr>
+      <p:pic>
+        <p:nvPicPr>
+          <p:cNvPr id="2" name="Picture 1">
+            <a:extLst>
+              <a:ext uri="{FF2B5EF4-FFF2-40B4-BE49-F238E27FC236}">
+                <a16:creationId xmlns:a16="http://schemas.microsoft.com/office/drawing/2014/main" id="{EF15339A-358A-4B87-AE87-642DBC2C9733}"/>
+              </a:ext>
+            </a:extLst>
+          </p:cNvPr>
+          <p:cNvPicPr>
+            <a:picLocks noChangeAspect="1"/>
+          </p:cNvPicPr>
+          <p:nvPr userDrawn="1"/>
+        </p:nvPicPr>
+        <p:blipFill rotWithShape="1">
+          <a:blip r:embed="rId2" cstate="screen">
+            <a:extLst>
+              <a:ext uri="{28A0092B-C50C-407E-A947-70E740481C1C}">
+                <a14:useLocalDpi xmlns:a14="http://schemas.microsoft.com/office/drawing/2010/main"/>
+              </a:ext>
+            </a:extLst>
+          </a:blip>
+          <a:srcRect l="42407" t="24550" r="12531" b="8415"/>
+          <a:stretch/>
+        </p:blipFill>
+        <p:spPr>
+          <a:xfrm flipH="1">
+            <a:off x="-4" y="0"/>
+            <a:ext cx="12192003" cy="6850823"/>
+          </a:xfrm>
+          <a:prstGeom prst="rect">
+            <a:avLst/>
+          </a:prstGeom>
+        </p:spPr>
+      </p:pic>
+      <p:sp>
+        <p:nvSpPr>
+          <p:cNvPr id="9" name="TextBox 8">
+            <a:extLst>
+              <a:ext uri="{FF2B5EF4-FFF2-40B4-BE49-F238E27FC236}">
+                <a16:creationId xmlns:a16="http://schemas.microsoft.com/office/drawing/2014/main" id="{B2482E0C-A5D2-5747-9B5C-8D1BBA5823F5}"/>
+              </a:ext>
+            </a:extLst>
+          </p:cNvPr>
+          <p:cNvSpPr txBox="1"/>
+          <p:nvPr userDrawn="1"/>
+        </p:nvSpPr>
+        <p:spPr>
+          <a:xfrm>
+            <a:off x="6803062" y="6085846"/>
+            <a:ext cx="2529914" cy="523220"/>
+          </a:xfrm>
+          <a:prstGeom prst="rect">
+            <a:avLst/>
+          </a:prstGeom>
+          <a:noFill/>
+        </p:spPr>
+        <p:txBody>
+          <a:bodyPr wrap="square" rtlCol="0">
+            <a:spAutoFit/>
+          </a:bodyPr>
+          <a:lstStyle/>
+          <a:p>
+            <a:r>
+              <a:rPr lang="de-DE" sz="1400">
+                <a:solidFill>
+                  <a:schemeClr val="bg1">
+                    <a:alpha val="84000"/>
+                  </a:schemeClr>
+                </a:solidFill>
+                <a:effectLst>
+                  <a:reflection endPos="0" dist="50800" dir="5400000" sy="-100000" algn="bl" rotWithShape="0"/>
+                </a:effectLst>
+                <a:latin typeface="Franklin Gothic Medium" charset="0"/>
+                <a:ea typeface="Franklin Gothic Medium" charset="0"/>
+                <a:cs typeface="Franklin Gothic Medium" charset="0"/>
+              </a:rPr>
+              <a:t>Prof. Dr. Leif Döring</a:t>
+            </a:r>
+            <a:br>
+              <a:rPr lang="de-DE" sz="1400">
+                <a:solidFill>
+                  <a:schemeClr val="bg1">
+                    <a:alpha val="84000"/>
+                  </a:schemeClr>
+                </a:solidFill>
+                <a:effectLst>
+                  <a:reflection endPos="0" dist="50800" dir="5400000" sy="-100000" algn="bl" rotWithShape="0"/>
+                </a:effectLst>
+                <a:latin typeface="Franklin Gothic Medium" charset="0"/>
+                <a:ea typeface="Franklin Gothic Medium" charset="0"/>
+                <a:cs typeface="Franklin Gothic Medium" charset="0"/>
+              </a:rPr>
+            </a:br>
+            <a:r>
+              <a:rPr lang="de-DE" sz="1400">
+                <a:solidFill>
+                  <a:schemeClr val="bg1">
+                    <a:alpha val="84000"/>
+                  </a:schemeClr>
+                </a:solidFill>
+                <a:effectLst>
+                  <a:reflection endPos="0" dist="50800" dir="5400000" sy="-100000" algn="bl" rotWithShape="0"/>
+                </a:effectLst>
+                <a:latin typeface="Franklin Gothic Book" charset="0"/>
+                <a:ea typeface="Franklin Gothic Book" charset="0"/>
+                <a:cs typeface="Franklin Gothic Book" charset="0"/>
+              </a:rPr>
+              <a:t>Lehrstuhl für Stochastik</a:t>
+            </a:r>
+          </a:p>
+        </p:txBody>
+      </p:sp>
+      <p:sp>
+        <p:nvSpPr>
+          <p:cNvPr id="14" name="TextBox 13">
+            <a:extLst>
+              <a:ext uri="{FF2B5EF4-FFF2-40B4-BE49-F238E27FC236}">
+                <a16:creationId xmlns:a16="http://schemas.microsoft.com/office/drawing/2014/main" id="{8FCB8AD6-B591-B242-B23C-CF2C744C63C1}"/>
+              </a:ext>
+            </a:extLst>
+          </p:cNvPr>
+          <p:cNvSpPr txBox="1"/>
+          <p:nvPr userDrawn="1"/>
+        </p:nvSpPr>
+        <p:spPr>
+          <a:xfrm>
+            <a:off x="2755318" y="6085846"/>
+            <a:ext cx="3840480" cy="523220"/>
+          </a:xfrm>
+          <a:prstGeom prst="rect">
+            <a:avLst/>
+          </a:prstGeom>
+          <a:noFill/>
+        </p:spPr>
+        <p:txBody>
+          <a:bodyPr wrap="square" rtlCol="0">
+            <a:spAutoFit/>
+          </a:bodyPr>
+          <a:lstStyle/>
+          <a:p>
+            <a:r>
+              <a:rPr lang="de-DE" sz="1400">
+                <a:solidFill>
+                  <a:schemeClr val="bg1">
+                    <a:alpha val="84000"/>
+                  </a:schemeClr>
+                </a:solidFill>
+                <a:effectLst>
+                  <a:reflection endPos="0" dist="50800" dir="5400000" sy="-100000" algn="bl" rotWithShape="0"/>
+                </a:effectLst>
+                <a:latin typeface="Franklin Gothic Medium" charset="0"/>
+                <a:ea typeface="Franklin Gothic Medium" charset="0"/>
+                <a:cs typeface="Franklin Gothic Medium" charset="0"/>
+              </a:rPr>
+              <a:t>Prof. Dr. Martin </a:t>
+            </a:r>
+            <a:r>
+              <a:rPr lang="de-DE" sz="1400" err="1">
+                <a:solidFill>
+                  <a:schemeClr val="bg1">
+                    <a:alpha val="84000"/>
+                  </a:schemeClr>
+                </a:solidFill>
+                <a:effectLst>
+                  <a:reflection endPos="0" dist="50800" dir="5400000" sy="-100000" algn="bl" rotWithShape="0"/>
+                </a:effectLst>
+                <a:latin typeface="Franklin Gothic Medium" charset="0"/>
+                <a:ea typeface="Franklin Gothic Medium" charset="0"/>
+                <a:cs typeface="Franklin Gothic Medium" charset="0"/>
+              </a:rPr>
+              <a:t>Schlather</a:t>
+            </a:r>
+            <a:br>
+              <a:rPr lang="de-DE" sz="1400">
+                <a:solidFill>
+                  <a:schemeClr val="bg1">
+                    <a:alpha val="84000"/>
+                  </a:schemeClr>
+                </a:solidFill>
+                <a:effectLst>
+                  <a:reflection endPos="0" dist="50800" dir="5400000" sy="-100000" algn="bl" rotWithShape="0"/>
+                </a:effectLst>
+                <a:latin typeface="Franklin Gothic Medium" charset="0"/>
+                <a:ea typeface="Franklin Gothic Medium" charset="0"/>
+                <a:cs typeface="Franklin Gothic Medium" charset="0"/>
+              </a:rPr>
+            </a:br>
+            <a:r>
+              <a:rPr lang="de-DE" sz="1400">
+                <a:solidFill>
+                  <a:schemeClr val="bg1">
+                    <a:alpha val="84000"/>
+                  </a:schemeClr>
+                </a:solidFill>
+                <a:effectLst>
+                  <a:reflection endPos="0" dist="50800" dir="5400000" sy="-100000" algn="bl" rotWithShape="0"/>
+                </a:effectLst>
+                <a:latin typeface="Franklin Gothic Book" charset="0"/>
+                <a:ea typeface="Franklin Gothic Book" charset="0"/>
+                <a:cs typeface="Franklin Gothic Book" charset="0"/>
+              </a:rPr>
+              <a:t>Lehrstuhl für Stochastik und ihre Anwendungen</a:t>
+            </a:r>
+          </a:p>
+        </p:txBody>
+      </p:sp>
+      <p:sp>
+        <p:nvSpPr>
+          <p:cNvPr id="15" name="TextBox 14">
+            <a:extLst>
+              <a:ext uri="{FF2B5EF4-FFF2-40B4-BE49-F238E27FC236}">
+                <a16:creationId xmlns:a16="http://schemas.microsoft.com/office/drawing/2014/main" id="{4303B698-424C-144B-BEC8-AEDD48BAAE71}"/>
+              </a:ext>
+            </a:extLst>
+          </p:cNvPr>
+          <p:cNvSpPr txBox="1"/>
+          <p:nvPr userDrawn="1"/>
+        </p:nvSpPr>
+        <p:spPr>
+          <a:xfrm>
+            <a:off x="548566" y="6085846"/>
+            <a:ext cx="1999488" cy="307777"/>
+          </a:xfrm>
+          <a:prstGeom prst="rect">
+            <a:avLst/>
+          </a:prstGeom>
+          <a:noFill/>
+        </p:spPr>
+        <p:txBody>
+          <a:bodyPr wrap="square" rtlCol="0">
+            <a:spAutoFit/>
+          </a:bodyPr>
+          <a:lstStyle/>
+          <a:p>
+            <a:r>
+              <a:rPr lang="de-DE" sz="1400">
+                <a:solidFill>
+                  <a:schemeClr val="bg1">
+                    <a:alpha val="84000"/>
+                  </a:schemeClr>
+                </a:solidFill>
+                <a:effectLst>
+                  <a:reflection endPos="0" dist="50800" dir="5400000" sy="-100000" algn="bl" rotWithShape="0"/>
+                </a:effectLst>
+                <a:latin typeface="Franklin Gothic Book" charset="0"/>
+                <a:ea typeface="Franklin Gothic Book" charset="0"/>
+                <a:cs typeface="Franklin Gothic Book" charset="0"/>
+              </a:rPr>
+              <a:t>In </a:t>
+            </a:r>
+            <a:r>
+              <a:rPr lang="de-DE" sz="1400">
+                <a:solidFill>
+                  <a:schemeClr val="bg1">
+                    <a:alpha val="84000"/>
+                  </a:schemeClr>
+                </a:solidFill>
+                <a:effectLst>
+                  <a:reflection endPos="0" dist="50800" dir="5400000" sy="-100000" algn="bl" rotWithShape="0"/>
+                </a:effectLst>
+                <a:latin typeface="Franklin Gothic Medium" charset="0"/>
+                <a:ea typeface="Franklin Gothic Medium" charset="0"/>
+                <a:cs typeface="Franklin Gothic Medium" charset="0"/>
+              </a:rPr>
+              <a:t>Kooperation</a:t>
+            </a:r>
+            <a:r>
+              <a:rPr lang="de-DE" sz="1400">
+                <a:solidFill>
+                  <a:schemeClr val="bg1">
+                    <a:alpha val="84000"/>
+                  </a:schemeClr>
+                </a:solidFill>
+                <a:effectLst>
+                  <a:reflection endPos="0" dist="50800" dir="5400000" sy="-100000" algn="bl" rotWithShape="0"/>
+                </a:effectLst>
+                <a:latin typeface="Franklin Gothic Book" charset="0"/>
+                <a:ea typeface="Franklin Gothic Book" charset="0"/>
+                <a:cs typeface="Franklin Gothic Book" charset="0"/>
+              </a:rPr>
+              <a:t> mit</a:t>
+            </a:r>
+          </a:p>
+        </p:txBody>
+      </p:sp>
+      <p:sp>
+        <p:nvSpPr>
+          <p:cNvPr id="5" name="Text Placeholder 4">
+            <a:extLst>
+              <a:ext uri="{FF2B5EF4-FFF2-40B4-BE49-F238E27FC236}">
+                <a16:creationId xmlns:a16="http://schemas.microsoft.com/office/drawing/2014/main" id="{4F472D04-3E3E-2B44-BB6B-9C3D5399F368}"/>
+              </a:ext>
+            </a:extLst>
+          </p:cNvPr>
+          <p:cNvSpPr>
+            <a:spLocks noGrp="1"/>
+          </p:cNvSpPr>
+          <p:nvPr userDrawn="1">
+            <p:ph type="body" sz="quarter" idx="10" hasCustomPrompt="1"/>
+          </p:nvPr>
+        </p:nvSpPr>
+        <p:spPr>
+          <a:xfrm>
+            <a:off x="5538984" y="741250"/>
+            <a:ext cx="5157788" cy="954107"/>
+          </a:xfrm>
+          <a:prstGeom prst="rect">
+            <a:avLst/>
+          </a:prstGeom>
+        </p:spPr>
+        <p:txBody>
+          <a:bodyPr>
+            <a:noAutofit/>
+          </a:bodyPr>
+          <a:lstStyle>
+            <a:lvl1pPr marL="0" indent="0">
+              <a:lnSpc>
+                <a:spcPct val="100000"/>
+              </a:lnSpc>
+              <a:spcBef>
+                <a:spcPts val="0"/>
+              </a:spcBef>
+              <a:buNone/>
+              <a:defRPr sz="2800" b="0" i="0">
+                <a:solidFill>
+                  <a:schemeClr val="bg1">
+                    <a:alpha val="84000"/>
+                  </a:schemeClr>
+                </a:solidFill>
+                <a:latin typeface="Franklin Gothic Medium" panose="020B0603020102020204" pitchFamily="34" charset="0"/>
+              </a:defRPr>
+            </a:lvl1pPr>
+            <a:lvl2pPr marL="457200" indent="0">
+              <a:buNone/>
+              <a:defRPr sz="1800">
+                <a:solidFill>
+                  <a:schemeClr val="bg1"/>
+                </a:solidFill>
+              </a:defRPr>
+            </a:lvl2pPr>
+            <a:lvl3pPr marL="914400" indent="0">
+              <a:buNone/>
+              <a:defRPr sz="1800">
+                <a:solidFill>
+                  <a:schemeClr val="bg1"/>
+                </a:solidFill>
+              </a:defRPr>
+            </a:lvl3pPr>
+            <a:lvl4pPr marL="1371600" indent="0">
+              <a:buNone/>
+              <a:defRPr sz="1800">
+                <a:solidFill>
+                  <a:schemeClr val="bg1"/>
+                </a:solidFill>
+              </a:defRPr>
+            </a:lvl4pPr>
+            <a:lvl5pPr marL="1828800" indent="0">
+              <a:buNone/>
+              <a:defRPr sz="1800">
+                <a:solidFill>
+                  <a:schemeClr val="bg1"/>
+                </a:solidFill>
+              </a:defRPr>
+            </a:lvl5pPr>
+          </a:lstStyle>
+          <a:p>
+            <a:r>
+              <a:rPr lang="en-GB" sz="2800" err="1">
+                <a:solidFill>
+                  <a:schemeClr val="bg1">
+                    <a:alpha val="84000"/>
+                  </a:schemeClr>
+                </a:solidFill>
+                <a:effectLst>
+                  <a:reflection endPos="0" dist="50800" dir="5400000" sy="-100000" algn="bl" rotWithShape="0"/>
+                </a:effectLst>
+                <a:latin typeface="Franklin Gothic Medium" charset="0"/>
+                <a:ea typeface="Franklin Gothic Medium" charset="0"/>
+                <a:cs typeface="Franklin Gothic Medium" charset="0"/>
+              </a:rPr>
+              <a:t>Titel</a:t>
+            </a:r>
+            <a:r>
+              <a:rPr lang="en-GB" sz="2800">
+                <a:solidFill>
+                  <a:schemeClr val="bg1">
+                    <a:alpha val="84000"/>
+                  </a:schemeClr>
+                </a:solidFill>
+                <a:effectLst>
+                  <a:reflection endPos="0" dist="50800" dir="5400000" sy="-100000" algn="bl" rotWithShape="0"/>
+                </a:effectLst>
+                <a:latin typeface="Franklin Gothic Medium" charset="0"/>
+                <a:ea typeface="Franklin Gothic Medium" charset="0"/>
+                <a:cs typeface="Franklin Gothic Medium" charset="0"/>
+              </a:rPr>
+              <a:t> – </a:t>
+            </a:r>
+            <a:r>
+              <a:rPr lang="en-GB" sz="2800" err="1">
+                <a:solidFill>
+                  <a:schemeClr val="bg1">
+                    <a:alpha val="84000"/>
+                  </a:schemeClr>
+                </a:solidFill>
+                <a:effectLst>
+                  <a:reflection endPos="0" dist="50800" dir="5400000" sy="-100000" algn="bl" rotWithShape="0"/>
+                </a:effectLst>
+                <a:latin typeface="Franklin Gothic Medium" charset="0"/>
+                <a:ea typeface="Franklin Gothic Medium" charset="0"/>
+                <a:cs typeface="Franklin Gothic Medium" charset="0"/>
+              </a:rPr>
+              <a:t>zweizeilig</a:t>
+            </a:r>
+            <a:endParaRPr lang="en-GB" sz="2800">
+              <a:solidFill>
+                <a:schemeClr val="bg1">
+                  <a:alpha val="84000"/>
+                </a:schemeClr>
+              </a:solidFill>
+              <a:effectLst>
+                <a:reflection endPos="0" dist="50800" dir="5400000" sy="-100000" algn="bl" rotWithShape="0"/>
+              </a:effectLst>
+              <a:latin typeface="Franklin Gothic Medium" charset="0"/>
+              <a:ea typeface="Franklin Gothic Medium" charset="0"/>
+              <a:cs typeface="Franklin Gothic Medium" charset="0"/>
+            </a:endParaRPr>
+          </a:p>
+        </p:txBody>
+      </p:sp>
+      <p:pic>
+        <p:nvPicPr>
+          <p:cNvPr id="4" name="Picture 3" descr="Logo&#10;&#10;Description automatically generated">
+            <a:extLst>
+              <a:ext uri="{FF2B5EF4-FFF2-40B4-BE49-F238E27FC236}">
+                <a16:creationId xmlns:a16="http://schemas.microsoft.com/office/drawing/2014/main" id="{A88AEA41-3FC1-6B40-A654-5857D617DEB6}"/>
+              </a:ext>
+            </a:extLst>
+          </p:cNvPr>
+          <p:cNvPicPr>
+            <a:picLocks noChangeAspect="1"/>
+          </p:cNvPicPr>
+          <p:nvPr userDrawn="1"/>
+        </p:nvPicPr>
+        <p:blipFill>
+          <a:blip r:embed="rId3"/>
+          <a:stretch>
+            <a:fillRect/>
+          </a:stretch>
+        </p:blipFill>
+        <p:spPr>
+          <a:xfrm>
+            <a:off x="3004253" y="248935"/>
+            <a:ext cx="1938738" cy="1938738"/>
+          </a:xfrm>
+          <a:prstGeom prst="rect">
+            <a:avLst/>
+          </a:prstGeom>
+        </p:spPr>
+      </p:pic>
+    </p:spTree>
+    <p:extLst>
+      <p:ext uri="{BB962C8B-B14F-4D97-AF65-F5344CB8AC3E}">
+        <p14:creationId xmlns:p14="http://schemas.microsoft.com/office/powerpoint/2010/main" val="2973959283"/>
       </p:ext>
     </p:extLst>
   </p:cSld>
@@ -1017,7 +1897,7 @@
           <a:p>
             <a:fld id="{FEA9118B-EB62-4AC7-B893-52C4CE8DA56F}" type="datetimeFigureOut">
               <a:rPr lang="de-DE" smtClean="0"/>
-              <a:t>13.11.2022</a:t>
+              <a:t>15.11.2022</a:t>
             </a:fld>
             <a:endParaRPr lang="de-DE"/>
           </a:p>
@@ -1292,7 +2172,7 @@
           <a:p>
             <a:fld id="{FEA9118B-EB62-4AC7-B893-52C4CE8DA56F}" type="datetimeFigureOut">
               <a:rPr lang="de-DE" smtClean="0"/>
-              <a:t>13.11.2022</a:t>
+              <a:t>15.11.2022</a:t>
             </a:fld>
             <a:endParaRPr lang="de-DE"/>
           </a:p>
@@ -1557,7 +2437,7 @@
           <a:p>
             <a:fld id="{FEA9118B-EB62-4AC7-B893-52C4CE8DA56F}" type="datetimeFigureOut">
               <a:rPr lang="de-DE" smtClean="0"/>
-              <a:t>13.11.2022</a:t>
+              <a:t>15.11.2022</a:t>
             </a:fld>
             <a:endParaRPr lang="de-DE"/>
           </a:p>
@@ -1969,7 +2849,7 @@
           <a:p>
             <a:fld id="{FEA9118B-EB62-4AC7-B893-52C4CE8DA56F}" type="datetimeFigureOut">
               <a:rPr lang="de-DE" smtClean="0"/>
-              <a:t>13.11.2022</a:t>
+              <a:t>15.11.2022</a:t>
             </a:fld>
             <a:endParaRPr lang="de-DE"/>
           </a:p>
@@ -2110,7 +2990,7 @@
           <a:p>
             <a:fld id="{FEA9118B-EB62-4AC7-B893-52C4CE8DA56F}" type="datetimeFigureOut">
               <a:rPr lang="de-DE" smtClean="0"/>
-              <a:t>13.11.2022</a:t>
+              <a:t>15.11.2022</a:t>
             </a:fld>
             <a:endParaRPr lang="de-DE"/>
           </a:p>
@@ -2223,7 +3103,7 @@
           <a:p>
             <a:fld id="{FEA9118B-EB62-4AC7-B893-52C4CE8DA56F}" type="datetimeFigureOut">
               <a:rPr lang="de-DE" smtClean="0"/>
-              <a:t>13.11.2022</a:t>
+              <a:t>15.11.2022</a:t>
             </a:fld>
             <a:endParaRPr lang="de-DE"/>
           </a:p>
@@ -2534,7 +3414,7 @@
           <a:p>
             <a:fld id="{FEA9118B-EB62-4AC7-B893-52C4CE8DA56F}" type="datetimeFigureOut">
               <a:rPr lang="de-DE" smtClean="0"/>
-              <a:t>13.11.2022</a:t>
+              <a:t>15.11.2022</a:t>
             </a:fld>
             <a:endParaRPr lang="de-DE"/>
           </a:p>
@@ -2822,7 +3702,7 @@
           <a:p>
             <a:fld id="{FEA9118B-EB62-4AC7-B893-52C4CE8DA56F}" type="datetimeFigureOut">
               <a:rPr lang="de-DE" smtClean="0"/>
-              <a:t>13.11.2022</a:t>
+              <a:t>15.11.2022</a:t>
             </a:fld>
             <a:endParaRPr lang="de-DE"/>
           </a:p>
@@ -3063,7 +3943,7 @@
           <a:p>
             <a:fld id="{FEA9118B-EB62-4AC7-B893-52C4CE8DA56F}" type="datetimeFigureOut">
               <a:rPr lang="de-DE" smtClean="0"/>
-              <a:t>13.11.2022</a:t>
+              <a:t>15.11.2022</a:t>
             </a:fld>
             <a:endParaRPr lang="de-DE"/>
           </a:p>
@@ -3179,6 +4059,7 @@
     <p:sldLayoutId id="2147483657" r:id="rId9"/>
     <p:sldLayoutId id="2147483658" r:id="rId10"/>
     <p:sldLayoutId id="2147483659" r:id="rId11"/>
+    <p:sldLayoutId id="2147483660" r:id="rId12"/>
   </p:sldLayoutIdLst>
   <p:txStyles>
     <p:titleStyle>
@@ -3482,10 +4363,10 @@
       </p:grpSpPr>
       <p:sp>
         <p:nvSpPr>
-          <p:cNvPr id="2" name="Titel 1">
-            <a:extLst>
-              <a:ext uri="{FF2B5EF4-FFF2-40B4-BE49-F238E27FC236}">
-                <a16:creationId xmlns:a16="http://schemas.microsoft.com/office/drawing/2014/main" id="{2EEBE2A5-74B2-E49C-432E-78633F7E9BD3}"/>
+          <p:cNvPr id="4" name="Text Placeholder 3">
+            <a:extLst>
+              <a:ext uri="{FF2B5EF4-FFF2-40B4-BE49-F238E27FC236}">
+                <a16:creationId xmlns:a16="http://schemas.microsoft.com/office/drawing/2014/main" id="{1BA9E6FB-8466-954B-91F4-E485C3236894}"/>
               </a:ext>
             </a:extLst>
           </p:cNvPr>
@@ -3493,7 +4374,7 @@
             <a:spLocks noGrp="1"/>
           </p:cNvSpPr>
           <p:nvPr>
-            <p:ph type="ctrTitle"/>
+            <p:ph type="body" sz="quarter" idx="10"/>
           </p:nvPr>
         </p:nvSpPr>
         <p:spPr/>
@@ -3502,16 +4383,32 @@
           <a:lstStyle/>
           <a:p>
             <a:r>
-              <a:rPr lang="de-DE" dirty="0"/>
+              <a:rPr lang="de-DE" dirty="0">
+                <a:latin typeface="Franklin Gothic Book" panose="020B0503020102020204" pitchFamily="34" charset="0"/>
+              </a:rPr>
               <a:t>Markov Chain Monte Carlo</a:t>
             </a:r>
+            <a:br>
+              <a:rPr lang="de-DE" dirty="0">
+                <a:latin typeface="Franklin Gothic Book" panose="020B0503020102020204" pitchFamily="34" charset="0"/>
+              </a:rPr>
+            </a:br>
+            <a:r>
+              <a:rPr lang="de-DE" dirty="0">
+                <a:latin typeface="Franklin Gothic Book" panose="020B0503020102020204" pitchFamily="34" charset="0"/>
+              </a:rPr>
+              <a:t>Workshop, 22.11.22</a:t>
+            </a:r>
+            <a:endParaRPr lang="de-DE" noProof="0" dirty="0">
+              <a:latin typeface="Franklin Gothic Book" panose="020B0503020102020204" pitchFamily="34" charset="0"/>
+            </a:endParaRPr>
           </a:p>
         </p:txBody>
       </p:sp>
     </p:spTree>
     <p:extLst>
       <p:ext uri="{BB962C8B-B14F-4D97-AF65-F5344CB8AC3E}">
-        <p14:creationId xmlns:p14="http://schemas.microsoft.com/office/powerpoint/2010/main" val="2527004395"/>
+        <p14:creationId xmlns:p14="http://schemas.microsoft.com/office/powerpoint/2010/main" val="2658145770"/>
       </p:ext>
     </p:extLst>
   </p:cSld>
@@ -3560,7 +4457,11 @@
           <a:lstStyle/>
           <a:p>
             <a:r>
-              <a:rPr lang="de-DE" dirty="0"/>
+              <a:rPr lang="de-DE" dirty="0">
+                <a:solidFill>
+                  <a:srgbClr val="5C739C"/>
+                </a:solidFill>
+              </a:rPr>
               <a:t>Der Metropolis Hastings Algorithmus (MH)</a:t>
             </a:r>
           </a:p>
@@ -3609,7 +4510,7 @@
             </a:r>
             <a:r>
               <a:rPr lang="de-DE" dirty="0" err="1"/>
-              <a:t>Tensorflow</a:t>
+              <a:t>TensorFlow</a:t>
             </a:r>
             <a:r>
               <a:rPr lang="de-DE" dirty="0"/>
@@ -3618,6 +4519,36 @@
           </a:p>
         </p:txBody>
       </p:sp>
+      <p:pic>
+        <p:nvPicPr>
+          <p:cNvPr id="4" name="Grafik 3">
+            <a:extLst>
+              <a:ext uri="{FF2B5EF4-FFF2-40B4-BE49-F238E27FC236}">
+                <a16:creationId xmlns:a16="http://schemas.microsoft.com/office/drawing/2014/main" id="{6B0157F2-975D-7065-5582-4C696D4C088E}"/>
+              </a:ext>
+            </a:extLst>
+          </p:cNvPr>
+          <p:cNvPicPr>
+            <a:picLocks noChangeAspect="1"/>
+          </p:cNvPicPr>
+          <p:nvPr/>
+        </p:nvPicPr>
+        <p:blipFill>
+          <a:blip r:embed="rId2"/>
+          <a:stretch>
+            <a:fillRect/>
+          </a:stretch>
+        </p:blipFill>
+        <p:spPr>
+          <a:xfrm>
+            <a:off x="838200" y="6083243"/>
+            <a:ext cx="2057687" cy="409632"/>
+          </a:xfrm>
+          <a:prstGeom prst="rect">
+            <a:avLst/>
+          </a:prstGeom>
+        </p:spPr>
+      </p:pic>
     </p:spTree>
     <p:extLst>
       <p:ext uri="{BB962C8B-B14F-4D97-AF65-F5344CB8AC3E}">
@@ -3670,7 +4601,11 @@
           <a:lstStyle/>
           <a:p>
             <a:r>
-              <a:rPr lang="de-DE" dirty="0"/>
+              <a:rPr lang="de-DE" dirty="0">
+                <a:solidFill>
+                  <a:srgbClr val="5C739C"/>
+                </a:solidFill>
+              </a:rPr>
               <a:t>Der Metropolis Hastings Algorithmus (MH)</a:t>
             </a:r>
           </a:p>
@@ -3982,6 +4917,36 @@
           </a:p>
         </p:txBody>
       </p:sp>
+      <p:pic>
+        <p:nvPicPr>
+          <p:cNvPr id="4" name="Grafik 3">
+            <a:extLst>
+              <a:ext uri="{FF2B5EF4-FFF2-40B4-BE49-F238E27FC236}">
+                <a16:creationId xmlns:a16="http://schemas.microsoft.com/office/drawing/2014/main" id="{18633736-D6A8-7CC3-4901-C78855AF318F}"/>
+              </a:ext>
+            </a:extLst>
+          </p:cNvPr>
+          <p:cNvPicPr>
+            <a:picLocks noChangeAspect="1"/>
+          </p:cNvPicPr>
+          <p:nvPr/>
+        </p:nvPicPr>
+        <p:blipFill>
+          <a:blip r:embed="rId3"/>
+          <a:stretch>
+            <a:fillRect/>
+          </a:stretch>
+        </p:blipFill>
+        <p:spPr>
+          <a:xfrm>
+            <a:off x="838200" y="6083243"/>
+            <a:ext cx="2057687" cy="409632"/>
+          </a:xfrm>
+          <a:prstGeom prst="rect">
+            <a:avLst/>
+          </a:prstGeom>
+        </p:spPr>
+      </p:pic>
     </p:spTree>
     <p:extLst>
       <p:ext uri="{BB962C8B-B14F-4D97-AF65-F5344CB8AC3E}">
@@ -4039,7 +5004,11 @@
           <a:lstStyle/>
           <a:p>
             <a:r>
-              <a:rPr lang="de-DE" dirty="0"/>
+              <a:rPr lang="de-DE" dirty="0">
+                <a:solidFill>
+                  <a:srgbClr val="5C739C"/>
+                </a:solidFill>
+              </a:rPr>
               <a:t>Der Metropolis Hastings Algorithmus (MH)</a:t>
             </a:r>
           </a:p>
@@ -4232,6 +5201,36 @@
           </a:p>
         </p:txBody>
       </p:sp>
+      <p:pic>
+        <p:nvPicPr>
+          <p:cNvPr id="4" name="Grafik 3">
+            <a:extLst>
+              <a:ext uri="{FF2B5EF4-FFF2-40B4-BE49-F238E27FC236}">
+                <a16:creationId xmlns:a16="http://schemas.microsoft.com/office/drawing/2014/main" id="{2BF9C934-CC5F-7575-A916-4705CA9815E4}"/>
+              </a:ext>
+            </a:extLst>
+          </p:cNvPr>
+          <p:cNvPicPr>
+            <a:picLocks noChangeAspect="1"/>
+          </p:cNvPicPr>
+          <p:nvPr/>
+        </p:nvPicPr>
+        <p:blipFill>
+          <a:blip r:embed="rId3"/>
+          <a:stretch>
+            <a:fillRect/>
+          </a:stretch>
+        </p:blipFill>
+        <p:spPr>
+          <a:xfrm>
+            <a:off x="838200" y="6083243"/>
+            <a:ext cx="2057687" cy="409632"/>
+          </a:xfrm>
+          <a:prstGeom prst="rect">
+            <a:avLst/>
+          </a:prstGeom>
+        </p:spPr>
+      </p:pic>
     </p:spTree>
     <p:extLst>
       <p:ext uri="{BB962C8B-B14F-4D97-AF65-F5344CB8AC3E}">
@@ -4289,23 +5288,43 @@
           <a:lstStyle/>
           <a:p>
             <a:r>
-              <a:rPr lang="de-DE" dirty="0"/>
+              <a:rPr lang="de-DE" dirty="0">
+                <a:solidFill>
+                  <a:srgbClr val="5C739C"/>
+                </a:solidFill>
+              </a:rPr>
               <a:t>Der Metropolis </a:t>
             </a:r>
             <a:r>
-              <a:rPr lang="de-DE" dirty="0" err="1"/>
+              <a:rPr lang="de-DE" dirty="0" err="1">
+                <a:solidFill>
+                  <a:srgbClr val="5C739C"/>
+                </a:solidFill>
+              </a:rPr>
               <a:t>Adjusted</a:t>
             </a:r>
             <a:r>
-              <a:rPr lang="de-DE" dirty="0"/>
+              <a:rPr lang="de-DE" dirty="0">
+                <a:solidFill>
+                  <a:srgbClr val="5C739C"/>
+                </a:solidFill>
+              </a:rPr>
               <a:t> </a:t>
             </a:r>
             <a:r>
-              <a:rPr lang="de-DE" dirty="0" err="1"/>
+              <a:rPr lang="de-DE" dirty="0" err="1">
+                <a:solidFill>
+                  <a:srgbClr val="5C739C"/>
+                </a:solidFill>
+              </a:rPr>
               <a:t>Langevin</a:t>
             </a:r>
             <a:r>
-              <a:rPr lang="de-DE" dirty="0"/>
+              <a:rPr lang="de-DE" dirty="0">
+                <a:solidFill>
+                  <a:srgbClr val="5C739C"/>
+                </a:solidFill>
+              </a:rPr>
               <a:t> Algorithmus (MALA)</a:t>
             </a:r>
           </a:p>
@@ -4369,6 +5388,36 @@
           </a:p>
         </p:txBody>
       </p:sp>
+      <p:pic>
+        <p:nvPicPr>
+          <p:cNvPr id="4" name="Grafik 3">
+            <a:extLst>
+              <a:ext uri="{FF2B5EF4-FFF2-40B4-BE49-F238E27FC236}">
+                <a16:creationId xmlns:a16="http://schemas.microsoft.com/office/drawing/2014/main" id="{2251EC1A-907F-6E2A-C3F6-0FBF34BDC94A}"/>
+              </a:ext>
+            </a:extLst>
+          </p:cNvPr>
+          <p:cNvPicPr>
+            <a:picLocks noChangeAspect="1"/>
+          </p:cNvPicPr>
+          <p:nvPr/>
+        </p:nvPicPr>
+        <p:blipFill>
+          <a:blip r:embed="rId2"/>
+          <a:stretch>
+            <a:fillRect/>
+          </a:stretch>
+        </p:blipFill>
+        <p:spPr>
+          <a:xfrm>
+            <a:off x="838200" y="6083243"/>
+            <a:ext cx="2057687" cy="409632"/>
+          </a:xfrm>
+          <a:prstGeom prst="rect">
+            <a:avLst/>
+          </a:prstGeom>
+        </p:spPr>
+      </p:pic>
     </p:spTree>
     <p:extLst>
       <p:ext uri="{BB962C8B-B14F-4D97-AF65-F5344CB8AC3E}">
@@ -4421,23 +5470,43 @@
           <a:lstStyle/>
           <a:p>
             <a:r>
-              <a:rPr lang="de-DE" dirty="0"/>
+              <a:rPr lang="de-DE" dirty="0">
+                <a:solidFill>
+                  <a:srgbClr val="5C739C"/>
+                </a:solidFill>
+              </a:rPr>
               <a:t>Der Metropolis </a:t>
             </a:r>
             <a:r>
-              <a:rPr lang="de-DE" dirty="0" err="1"/>
+              <a:rPr lang="de-DE" dirty="0" err="1">
+                <a:solidFill>
+                  <a:srgbClr val="5C739C"/>
+                </a:solidFill>
+              </a:rPr>
               <a:t>Adjusted</a:t>
             </a:r>
             <a:r>
-              <a:rPr lang="de-DE" dirty="0"/>
+              <a:rPr lang="de-DE" dirty="0">
+                <a:solidFill>
+                  <a:srgbClr val="5C739C"/>
+                </a:solidFill>
+              </a:rPr>
               <a:t> </a:t>
             </a:r>
             <a:r>
-              <a:rPr lang="de-DE" dirty="0" err="1"/>
+              <a:rPr lang="de-DE" dirty="0" err="1">
+                <a:solidFill>
+                  <a:srgbClr val="5C739C"/>
+                </a:solidFill>
+              </a:rPr>
               <a:t>Langevin</a:t>
             </a:r>
             <a:r>
-              <a:rPr lang="de-DE" dirty="0"/>
+              <a:rPr lang="de-DE" dirty="0">
+                <a:solidFill>
+                  <a:srgbClr val="5C739C"/>
+                </a:solidFill>
+              </a:rPr>
               <a:t> Algorithmus (MALA)</a:t>
             </a:r>
           </a:p>
@@ -4666,6 +5735,36 @@
           </p:sp>
         </mc:Fallback>
       </mc:AlternateContent>
+      <p:pic>
+        <p:nvPicPr>
+          <p:cNvPr id="4" name="Grafik 3">
+            <a:extLst>
+              <a:ext uri="{FF2B5EF4-FFF2-40B4-BE49-F238E27FC236}">
+                <a16:creationId xmlns:a16="http://schemas.microsoft.com/office/drawing/2014/main" id="{A4F8012B-D642-AE0F-E991-C19C064AC30F}"/>
+              </a:ext>
+            </a:extLst>
+          </p:cNvPr>
+          <p:cNvPicPr>
+            <a:picLocks noChangeAspect="1"/>
+          </p:cNvPicPr>
+          <p:nvPr/>
+        </p:nvPicPr>
+        <p:blipFill>
+          <a:blip r:embed="rId4"/>
+          <a:stretch>
+            <a:fillRect/>
+          </a:stretch>
+        </p:blipFill>
+        <p:spPr>
+          <a:xfrm>
+            <a:off x="838200" y="6092768"/>
+            <a:ext cx="2057687" cy="409632"/>
+          </a:xfrm>
+          <a:prstGeom prst="rect">
+            <a:avLst/>
+          </a:prstGeom>
+        </p:spPr>
+      </p:pic>
     </p:spTree>
     <p:extLst>
       <p:ext uri="{BB962C8B-B14F-4D97-AF65-F5344CB8AC3E}">
@@ -4723,7 +5822,11 @@
           <a:lstStyle/>
           <a:p>
             <a:r>
-              <a:rPr lang="de-DE" dirty="0"/>
+              <a:rPr lang="de-DE" dirty="0">
+                <a:solidFill>
+                  <a:srgbClr val="5C739C"/>
+                </a:solidFill>
+              </a:rPr>
               <a:t>MALA - Intuition</a:t>
             </a:r>
           </a:p>
@@ -4912,6 +6015,36 @@
           </p:sp>
         </mc:Fallback>
       </mc:AlternateContent>
+      <p:pic>
+        <p:nvPicPr>
+          <p:cNvPr id="4" name="Grafik 3">
+            <a:extLst>
+              <a:ext uri="{FF2B5EF4-FFF2-40B4-BE49-F238E27FC236}">
+                <a16:creationId xmlns:a16="http://schemas.microsoft.com/office/drawing/2014/main" id="{AC5B4A74-03CA-AA22-D8BC-0B02384B8FB8}"/>
+              </a:ext>
+            </a:extLst>
+          </p:cNvPr>
+          <p:cNvPicPr>
+            <a:picLocks noChangeAspect="1"/>
+          </p:cNvPicPr>
+          <p:nvPr/>
+        </p:nvPicPr>
+        <p:blipFill>
+          <a:blip r:embed="rId3"/>
+          <a:stretch>
+            <a:fillRect/>
+          </a:stretch>
+        </p:blipFill>
+        <p:spPr>
+          <a:xfrm>
+            <a:off x="838200" y="6083243"/>
+            <a:ext cx="2057687" cy="409632"/>
+          </a:xfrm>
+          <a:prstGeom prst="rect">
+            <a:avLst/>
+          </a:prstGeom>
+        </p:spPr>
+      </p:pic>
     </p:spTree>
     <p:extLst>
       <p:ext uri="{BB962C8B-B14F-4D97-AF65-F5344CB8AC3E}">
@@ -4964,7 +6097,11 @@
           <a:lstStyle/>
           <a:p>
             <a:r>
-              <a:rPr lang="de-DE" dirty="0"/>
+              <a:rPr lang="de-DE" dirty="0">
+                <a:solidFill>
+                  <a:srgbClr val="5C739C"/>
+                </a:solidFill>
+              </a:rPr>
               <a:t>MALA - Intuition</a:t>
             </a:r>
           </a:p>
@@ -5293,6 +6430,36 @@
           </p:sp>
         </mc:Fallback>
       </mc:AlternateContent>
+      <p:pic>
+        <p:nvPicPr>
+          <p:cNvPr id="4" name="Grafik 3">
+            <a:extLst>
+              <a:ext uri="{FF2B5EF4-FFF2-40B4-BE49-F238E27FC236}">
+                <a16:creationId xmlns:a16="http://schemas.microsoft.com/office/drawing/2014/main" id="{9F476917-3D5D-054C-C3C0-9445233487A6}"/>
+              </a:ext>
+            </a:extLst>
+          </p:cNvPr>
+          <p:cNvPicPr>
+            <a:picLocks noChangeAspect="1"/>
+          </p:cNvPicPr>
+          <p:nvPr/>
+        </p:nvPicPr>
+        <p:blipFill>
+          <a:blip r:embed="rId3"/>
+          <a:stretch>
+            <a:fillRect/>
+          </a:stretch>
+        </p:blipFill>
+        <p:spPr>
+          <a:xfrm>
+            <a:off x="838200" y="6083243"/>
+            <a:ext cx="2057687" cy="409632"/>
+          </a:xfrm>
+          <a:prstGeom prst="rect">
+            <a:avLst/>
+          </a:prstGeom>
+        </p:spPr>
+      </p:pic>
     </p:spTree>
     <p:extLst>
       <p:ext uri="{BB962C8B-B14F-4D97-AF65-F5344CB8AC3E}">
@@ -5345,7 +6512,11 @@
           <a:lstStyle/>
           <a:p>
             <a:r>
-              <a:rPr lang="de-DE" dirty="0"/>
+              <a:rPr lang="de-DE" dirty="0">
+                <a:solidFill>
+                  <a:srgbClr val="5C739C"/>
+                </a:solidFill>
+              </a:rPr>
               <a:t>MALA - Intuition</a:t>
             </a:r>
           </a:p>
@@ -5543,6 +6714,36 @@
           </p:sp>
         </mc:Fallback>
       </mc:AlternateContent>
+      <p:pic>
+        <p:nvPicPr>
+          <p:cNvPr id="4" name="Grafik 3">
+            <a:extLst>
+              <a:ext uri="{FF2B5EF4-FFF2-40B4-BE49-F238E27FC236}">
+                <a16:creationId xmlns:a16="http://schemas.microsoft.com/office/drawing/2014/main" id="{93E256E1-29A9-ED03-ACA2-062FE30C16BC}"/>
+              </a:ext>
+            </a:extLst>
+          </p:cNvPr>
+          <p:cNvPicPr>
+            <a:picLocks noChangeAspect="1"/>
+          </p:cNvPicPr>
+          <p:nvPr/>
+        </p:nvPicPr>
+        <p:blipFill>
+          <a:blip r:embed="rId3"/>
+          <a:stretch>
+            <a:fillRect/>
+          </a:stretch>
+        </p:blipFill>
+        <p:spPr>
+          <a:xfrm>
+            <a:off x="838200" y="6083243"/>
+            <a:ext cx="2057687" cy="409632"/>
+          </a:xfrm>
+          <a:prstGeom prst="rect">
+            <a:avLst/>
+          </a:prstGeom>
+        </p:spPr>
+      </p:pic>
     </p:spTree>
     <p:extLst>
       <p:ext uri="{BB962C8B-B14F-4D97-AF65-F5344CB8AC3E}">
@@ -5595,7 +6796,11 @@
           <a:lstStyle/>
           <a:p>
             <a:r>
-              <a:rPr lang="de-DE" dirty="0"/>
+              <a:rPr lang="de-DE" dirty="0">
+                <a:solidFill>
+                  <a:srgbClr val="5C739C"/>
+                </a:solidFill>
+              </a:rPr>
               <a:t>MALA - Diskussion</a:t>
             </a:r>
           </a:p>
@@ -5791,6 +6996,36 @@
           </a:p>
         </p:txBody>
       </p:sp>
+      <p:pic>
+        <p:nvPicPr>
+          <p:cNvPr id="4" name="Grafik 3">
+            <a:extLst>
+              <a:ext uri="{FF2B5EF4-FFF2-40B4-BE49-F238E27FC236}">
+                <a16:creationId xmlns:a16="http://schemas.microsoft.com/office/drawing/2014/main" id="{C918309C-0EC9-B557-9E34-F5C067DF36FA}"/>
+              </a:ext>
+            </a:extLst>
+          </p:cNvPr>
+          <p:cNvPicPr>
+            <a:picLocks noChangeAspect="1"/>
+          </p:cNvPicPr>
+          <p:nvPr/>
+        </p:nvPicPr>
+        <p:blipFill>
+          <a:blip r:embed="rId2"/>
+          <a:stretch>
+            <a:fillRect/>
+          </a:stretch>
+        </p:blipFill>
+        <p:spPr>
+          <a:xfrm>
+            <a:off x="838200" y="6083243"/>
+            <a:ext cx="2057687" cy="409632"/>
+          </a:xfrm>
+          <a:prstGeom prst="rect">
+            <a:avLst/>
+          </a:prstGeom>
+        </p:spPr>
+      </p:pic>
     </p:spTree>
     <p:extLst>
       <p:ext uri="{BB962C8B-B14F-4D97-AF65-F5344CB8AC3E}">
@@ -5843,11 +7078,19 @@
           <a:lstStyle/>
           <a:p>
             <a:r>
-              <a:rPr lang="de-DE" dirty="0" err="1"/>
+              <a:rPr lang="de-DE" dirty="0" err="1">
+                <a:solidFill>
+                  <a:srgbClr val="5C739C"/>
+                </a:solidFill>
+              </a:rPr>
               <a:t>Hamiltonian</a:t>
             </a:r>
             <a:r>
-              <a:rPr lang="de-DE" dirty="0"/>
+              <a:rPr lang="de-DE" dirty="0">
+                <a:solidFill>
+                  <a:srgbClr val="5C739C"/>
+                </a:solidFill>
+              </a:rPr>
               <a:t> Monte Carlo (HMC)</a:t>
             </a:r>
           </a:p>
@@ -5942,6 +7185,36 @@
           </a:p>
         </p:txBody>
       </p:sp>
+      <p:pic>
+        <p:nvPicPr>
+          <p:cNvPr id="4" name="Grafik 3">
+            <a:extLst>
+              <a:ext uri="{FF2B5EF4-FFF2-40B4-BE49-F238E27FC236}">
+                <a16:creationId xmlns:a16="http://schemas.microsoft.com/office/drawing/2014/main" id="{A377294C-2138-605B-783B-EA718DC87D30}"/>
+              </a:ext>
+            </a:extLst>
+          </p:cNvPr>
+          <p:cNvPicPr>
+            <a:picLocks noChangeAspect="1"/>
+          </p:cNvPicPr>
+          <p:nvPr/>
+        </p:nvPicPr>
+        <p:blipFill>
+          <a:blip r:embed="rId2"/>
+          <a:stretch>
+            <a:fillRect/>
+          </a:stretch>
+        </p:blipFill>
+        <p:spPr>
+          <a:xfrm>
+            <a:off x="838200" y="6083243"/>
+            <a:ext cx="2057687" cy="409632"/>
+          </a:xfrm>
+          <a:prstGeom prst="rect">
+            <a:avLst/>
+          </a:prstGeom>
+        </p:spPr>
+      </p:pic>
     </p:spTree>
     <p:extLst>
       <p:ext uri="{BB962C8B-B14F-4D97-AF65-F5344CB8AC3E}">
@@ -5990,11 +7263,17 @@
         </p:nvSpPr>
         <p:spPr/>
         <p:txBody>
-          <a:bodyPr/>
+          <a:bodyPr>
+            <a:normAutofit/>
+          </a:bodyPr>
           <a:lstStyle/>
           <a:p>
             <a:r>
-              <a:rPr lang="de-DE" dirty="0"/>
+              <a:rPr lang="de-DE" dirty="0">
+                <a:solidFill>
+                  <a:srgbClr val="5C739C"/>
+                </a:solidFill>
+              </a:rPr>
               <a:t>Grundlagen – Monte Carlo I</a:t>
             </a:r>
           </a:p>
@@ -6058,6 +7337,36 @@
           <a:xfrm>
             <a:off x="1228427" y="2266862"/>
             <a:ext cx="3523973" cy="1038313"/>
+          </a:xfrm>
+          <a:prstGeom prst="rect">
+            <a:avLst/>
+          </a:prstGeom>
+        </p:spPr>
+      </p:pic>
+      <p:pic>
+        <p:nvPicPr>
+          <p:cNvPr id="6" name="Grafik 5">
+            <a:extLst>
+              <a:ext uri="{FF2B5EF4-FFF2-40B4-BE49-F238E27FC236}">
+                <a16:creationId xmlns:a16="http://schemas.microsoft.com/office/drawing/2014/main" id="{8CD5D32C-06A4-A697-2916-D685FF5EEE71}"/>
+              </a:ext>
+            </a:extLst>
+          </p:cNvPr>
+          <p:cNvPicPr>
+            <a:picLocks noChangeAspect="1"/>
+          </p:cNvPicPr>
+          <p:nvPr/>
+        </p:nvPicPr>
+        <p:blipFill>
+          <a:blip r:embed="rId3"/>
+          <a:stretch>
+            <a:fillRect/>
+          </a:stretch>
+        </p:blipFill>
+        <p:spPr>
+          <a:xfrm>
+            <a:off x="838200" y="6083243"/>
+            <a:ext cx="2057687" cy="409632"/>
           </a:xfrm>
           <a:prstGeom prst="rect">
             <a:avLst/>
@@ -6116,14 +7425,26 @@
           <a:lstStyle/>
           <a:p>
             <a:r>
-              <a:rPr lang="de-DE" dirty="0"/>
+              <a:rPr lang="de-DE" dirty="0">
+                <a:solidFill>
+                  <a:srgbClr val="5C739C"/>
+                </a:solidFill>
+              </a:rPr>
               <a:t>HMC – Hamilton </a:t>
             </a:r>
             <a:r>
-              <a:rPr lang="de-DE" dirty="0" err="1"/>
+              <a:rPr lang="de-DE" dirty="0" err="1">
+                <a:solidFill>
+                  <a:srgbClr val="5C739C"/>
+                </a:solidFill>
+              </a:rPr>
               <a:t>Equations</a:t>
             </a:r>
-            <a:endParaRPr lang="de-DE" dirty="0"/>
+            <a:endParaRPr lang="de-DE" dirty="0">
+              <a:solidFill>
+                <a:srgbClr val="5C739C"/>
+              </a:solidFill>
+            </a:endParaRPr>
           </a:p>
         </p:txBody>
       </p:sp>
@@ -6191,6 +7512,36 @@
           <a:xfrm>
             <a:off x="1666257" y="1825625"/>
             <a:ext cx="8859486" cy="4115374"/>
+          </a:xfrm>
+          <a:prstGeom prst="rect">
+            <a:avLst/>
+          </a:prstGeom>
+        </p:spPr>
+      </p:pic>
+      <p:pic>
+        <p:nvPicPr>
+          <p:cNvPr id="4" name="Grafik 3">
+            <a:extLst>
+              <a:ext uri="{FF2B5EF4-FFF2-40B4-BE49-F238E27FC236}">
+                <a16:creationId xmlns:a16="http://schemas.microsoft.com/office/drawing/2014/main" id="{295A061A-F9B8-8D69-8FC8-6793716E9E22}"/>
+              </a:ext>
+            </a:extLst>
+          </p:cNvPr>
+          <p:cNvPicPr>
+            <a:picLocks noChangeAspect="1"/>
+          </p:cNvPicPr>
+          <p:nvPr/>
+        </p:nvPicPr>
+        <p:blipFill>
+          <a:blip r:embed="rId3"/>
+          <a:stretch>
+            <a:fillRect/>
+          </a:stretch>
+        </p:blipFill>
+        <p:spPr>
+          <a:xfrm>
+            <a:off x="838200" y="6083243"/>
+            <a:ext cx="2057687" cy="409632"/>
           </a:xfrm>
           <a:prstGeom prst="rect">
             <a:avLst/>
@@ -6249,14 +7600,18 @@
           <a:lstStyle/>
           <a:p>
             <a:r>
-              <a:rPr lang="de-DE" dirty="0"/>
+              <a:rPr lang="de-DE" dirty="0">
+                <a:solidFill>
+                  <a:srgbClr val="5C739C"/>
+                </a:solidFill>
+              </a:rPr>
               <a:t>HMC - Algorithmus</a:t>
             </a:r>
           </a:p>
         </p:txBody>
       </p:sp>
-      <mc:AlternateContent xmlns:mc="http://schemas.openxmlformats.org/markup-compatibility/2006">
-        <mc:Choice xmlns:a14="http://schemas.microsoft.com/office/drawing/2010/main" Requires="a14">
+      <mc:AlternateContent xmlns:mc="http://schemas.openxmlformats.org/markup-compatibility/2006" xmlns:a14="http://schemas.microsoft.com/office/drawing/2010/main">
+        <mc:Choice Requires="a14">
           <p:sp>
             <p:nvSpPr>
               <p:cNvPr id="3" name="Inhaltsplatzhalter 2">
@@ -6735,7 +8090,7 @@
             </p:txBody>
           </p:sp>
         </mc:Choice>
-        <mc:Fallback>
+        <mc:Fallback xmlns="">
           <p:sp>
             <p:nvSpPr>
               <p:cNvPr id="3" name="Inhaltsplatzhalter 2">
@@ -6775,6 +8130,36 @@
           </p:sp>
         </mc:Fallback>
       </mc:AlternateContent>
+      <p:pic>
+        <p:nvPicPr>
+          <p:cNvPr id="4" name="Grafik 3">
+            <a:extLst>
+              <a:ext uri="{FF2B5EF4-FFF2-40B4-BE49-F238E27FC236}">
+                <a16:creationId xmlns:a16="http://schemas.microsoft.com/office/drawing/2014/main" id="{5A3E04F7-D54B-A920-F873-6657D14F2CC9}"/>
+              </a:ext>
+            </a:extLst>
+          </p:cNvPr>
+          <p:cNvPicPr>
+            <a:picLocks noChangeAspect="1"/>
+          </p:cNvPicPr>
+          <p:nvPr/>
+        </p:nvPicPr>
+        <p:blipFill>
+          <a:blip r:embed="rId3"/>
+          <a:stretch>
+            <a:fillRect/>
+          </a:stretch>
+        </p:blipFill>
+        <p:spPr>
+          <a:xfrm>
+            <a:off x="838200" y="6083243"/>
+            <a:ext cx="2057687" cy="409632"/>
+          </a:xfrm>
+          <a:prstGeom prst="rect">
+            <a:avLst/>
+          </a:prstGeom>
+        </p:spPr>
+      </p:pic>
     </p:spTree>
     <p:extLst>
       <p:ext uri="{BB962C8B-B14F-4D97-AF65-F5344CB8AC3E}">
@@ -6827,7 +8212,11 @@
           <a:lstStyle/>
           <a:p>
             <a:r>
-              <a:rPr lang="de-DE" dirty="0"/>
+              <a:rPr lang="de-DE" dirty="0">
+                <a:solidFill>
+                  <a:srgbClr val="5C739C"/>
+                </a:solidFill>
+              </a:rPr>
               <a:t>HMC - Interpretation</a:t>
             </a:r>
           </a:p>
@@ -7219,6 +8608,36 @@
           </p:sp>
         </mc:Fallback>
       </mc:AlternateContent>
+      <p:pic>
+        <p:nvPicPr>
+          <p:cNvPr id="4" name="Grafik 3">
+            <a:extLst>
+              <a:ext uri="{FF2B5EF4-FFF2-40B4-BE49-F238E27FC236}">
+                <a16:creationId xmlns:a16="http://schemas.microsoft.com/office/drawing/2014/main" id="{274F325E-6A59-B4C6-B609-C85B066DFEE7}"/>
+              </a:ext>
+            </a:extLst>
+          </p:cNvPr>
+          <p:cNvPicPr>
+            <a:picLocks noChangeAspect="1"/>
+          </p:cNvPicPr>
+          <p:nvPr/>
+        </p:nvPicPr>
+        <p:blipFill>
+          <a:blip r:embed="rId4"/>
+          <a:stretch>
+            <a:fillRect/>
+          </a:stretch>
+        </p:blipFill>
+        <p:spPr>
+          <a:xfrm>
+            <a:off x="838200" y="6083243"/>
+            <a:ext cx="2057687" cy="409632"/>
+          </a:xfrm>
+          <a:prstGeom prst="rect">
+            <a:avLst/>
+          </a:prstGeom>
+        </p:spPr>
+      </p:pic>
     </p:spTree>
     <p:extLst>
       <p:ext uri="{BB962C8B-B14F-4D97-AF65-F5344CB8AC3E}">
@@ -7276,7 +8695,11 @@
           <a:lstStyle/>
           <a:p>
             <a:r>
-              <a:rPr lang="de-DE" dirty="0"/>
+              <a:rPr lang="de-DE" dirty="0">
+                <a:solidFill>
+                  <a:srgbClr val="5C739C"/>
+                </a:solidFill>
+              </a:rPr>
               <a:t>HMC – Hyperparameter</a:t>
             </a:r>
           </a:p>
@@ -7446,6 +8869,36 @@
           </a:p>
         </p:txBody>
       </p:sp>
+      <p:pic>
+        <p:nvPicPr>
+          <p:cNvPr id="4" name="Grafik 3">
+            <a:extLst>
+              <a:ext uri="{FF2B5EF4-FFF2-40B4-BE49-F238E27FC236}">
+                <a16:creationId xmlns:a16="http://schemas.microsoft.com/office/drawing/2014/main" id="{6861EF2C-663B-805C-6BBA-306ADF12478D}"/>
+              </a:ext>
+            </a:extLst>
+          </p:cNvPr>
+          <p:cNvPicPr>
+            <a:picLocks noChangeAspect="1"/>
+          </p:cNvPicPr>
+          <p:nvPr/>
+        </p:nvPicPr>
+        <p:blipFill>
+          <a:blip r:embed="rId2"/>
+          <a:stretch>
+            <a:fillRect/>
+          </a:stretch>
+        </p:blipFill>
+        <p:spPr>
+          <a:xfrm>
+            <a:off x="838200" y="6083243"/>
+            <a:ext cx="2057687" cy="409632"/>
+          </a:xfrm>
+          <a:prstGeom prst="rect">
+            <a:avLst/>
+          </a:prstGeom>
+        </p:spPr>
+      </p:pic>
     </p:spTree>
     <p:extLst>
       <p:ext uri="{BB962C8B-B14F-4D97-AF65-F5344CB8AC3E}">
@@ -7498,15 +8951,27 @@
           <a:lstStyle/>
           <a:p>
             <a:r>
-              <a:rPr lang="de-DE" dirty="0"/>
+              <a:rPr lang="de-DE" dirty="0">
+                <a:solidFill>
+                  <a:srgbClr val="5C739C"/>
+                </a:solidFill>
+              </a:rPr>
               <a:t>Der </a:t>
             </a:r>
             <a:r>
-              <a:rPr lang="de-DE" dirty="0" err="1"/>
+              <a:rPr lang="de-DE" dirty="0" err="1">
+                <a:solidFill>
+                  <a:srgbClr val="5C739C"/>
+                </a:solidFill>
+              </a:rPr>
               <a:t>No</a:t>
             </a:r>
             <a:r>
-              <a:rPr lang="de-DE" dirty="0"/>
+              <a:rPr lang="de-DE" dirty="0">
+                <a:solidFill>
+                  <a:srgbClr val="5C739C"/>
+                </a:solidFill>
+              </a:rPr>
               <a:t> U-Turn Sampler (NUTS)</a:t>
             </a:r>
           </a:p>
@@ -7621,6 +9086,36 @@
           </a:p>
         </p:txBody>
       </p:sp>
+      <p:pic>
+        <p:nvPicPr>
+          <p:cNvPr id="4" name="Grafik 3">
+            <a:extLst>
+              <a:ext uri="{FF2B5EF4-FFF2-40B4-BE49-F238E27FC236}">
+                <a16:creationId xmlns:a16="http://schemas.microsoft.com/office/drawing/2014/main" id="{FD4FF622-E38A-2D62-6929-55429FBC2880}"/>
+              </a:ext>
+            </a:extLst>
+          </p:cNvPr>
+          <p:cNvPicPr>
+            <a:picLocks noChangeAspect="1"/>
+          </p:cNvPicPr>
+          <p:nvPr/>
+        </p:nvPicPr>
+        <p:blipFill>
+          <a:blip r:embed="rId2"/>
+          <a:stretch>
+            <a:fillRect/>
+          </a:stretch>
+        </p:blipFill>
+        <p:spPr>
+          <a:xfrm>
+            <a:off x="838200" y="6083243"/>
+            <a:ext cx="2057687" cy="409632"/>
+          </a:xfrm>
+          <a:prstGeom prst="rect">
+            <a:avLst/>
+          </a:prstGeom>
+        </p:spPr>
+      </p:pic>
     </p:spTree>
     <p:extLst>
       <p:ext uri="{BB962C8B-B14F-4D97-AF65-F5344CB8AC3E}">
@@ -7673,14 +9168,26 @@
           <a:lstStyle/>
           <a:p>
             <a:r>
-              <a:rPr lang="de-DE" dirty="0"/>
+              <a:rPr lang="de-DE" dirty="0">
+                <a:solidFill>
+                  <a:srgbClr val="5C739C"/>
+                </a:solidFill>
+              </a:rPr>
               <a:t>MCMC </a:t>
             </a:r>
             <a:r>
-              <a:rPr lang="de-DE" dirty="0" err="1"/>
+              <a:rPr lang="de-DE" dirty="0" err="1">
+                <a:solidFill>
+                  <a:srgbClr val="5C739C"/>
+                </a:solidFill>
+              </a:rPr>
               <a:t>Diagnostics</a:t>
             </a:r>
-            <a:endParaRPr lang="de-DE" dirty="0"/>
+            <a:endParaRPr lang="de-DE" dirty="0">
+              <a:solidFill>
+                <a:srgbClr val="5C739C"/>
+              </a:solidFill>
+            </a:endParaRPr>
           </a:p>
         </p:txBody>
       </p:sp>
@@ -7839,6 +9346,36 @@
           </a:p>
         </p:txBody>
       </p:sp>
+      <p:pic>
+        <p:nvPicPr>
+          <p:cNvPr id="4" name="Grafik 3">
+            <a:extLst>
+              <a:ext uri="{FF2B5EF4-FFF2-40B4-BE49-F238E27FC236}">
+                <a16:creationId xmlns:a16="http://schemas.microsoft.com/office/drawing/2014/main" id="{FB3723ED-F5CD-04B4-3C09-F831A0475607}"/>
+              </a:ext>
+            </a:extLst>
+          </p:cNvPr>
+          <p:cNvPicPr>
+            <a:picLocks noChangeAspect="1"/>
+          </p:cNvPicPr>
+          <p:nvPr/>
+        </p:nvPicPr>
+        <p:blipFill>
+          <a:blip r:embed="rId3"/>
+          <a:stretch>
+            <a:fillRect/>
+          </a:stretch>
+        </p:blipFill>
+        <p:spPr>
+          <a:xfrm>
+            <a:off x="838200" y="6083243"/>
+            <a:ext cx="2057687" cy="409632"/>
+          </a:xfrm>
+          <a:prstGeom prst="rect">
+            <a:avLst/>
+          </a:prstGeom>
+        </p:spPr>
+      </p:pic>
     </p:spTree>
     <p:extLst>
       <p:ext uri="{BB962C8B-B14F-4D97-AF65-F5344CB8AC3E}">
@@ -7896,14 +9433,26 @@
           <a:lstStyle/>
           <a:p>
             <a:r>
-              <a:rPr lang="de-DE" dirty="0"/>
+              <a:rPr lang="de-DE" dirty="0">
+                <a:solidFill>
+                  <a:srgbClr val="5C739C"/>
+                </a:solidFill>
+              </a:rPr>
               <a:t>MCMC </a:t>
             </a:r>
             <a:r>
-              <a:rPr lang="de-DE" dirty="0" err="1"/>
+              <a:rPr lang="de-DE" dirty="0" err="1">
+                <a:solidFill>
+                  <a:srgbClr val="5C739C"/>
+                </a:solidFill>
+              </a:rPr>
               <a:t>Diagnostics</a:t>
             </a:r>
-            <a:endParaRPr lang="de-DE" dirty="0"/>
+            <a:endParaRPr lang="de-DE" dirty="0">
+              <a:solidFill>
+                <a:srgbClr val="5C739C"/>
+              </a:solidFill>
+            </a:endParaRPr>
           </a:p>
         </p:txBody>
       </p:sp>
@@ -7931,6 +9480,36 @@
           <a:xfrm>
             <a:off x="3558802" y="1481328"/>
             <a:ext cx="5074396" cy="5376672"/>
+          </a:xfrm>
+          <a:prstGeom prst="rect">
+            <a:avLst/>
+          </a:prstGeom>
+        </p:spPr>
+      </p:pic>
+      <p:pic>
+        <p:nvPicPr>
+          <p:cNvPr id="3" name="Grafik 2">
+            <a:extLst>
+              <a:ext uri="{FF2B5EF4-FFF2-40B4-BE49-F238E27FC236}">
+                <a16:creationId xmlns:a16="http://schemas.microsoft.com/office/drawing/2014/main" id="{3D9362B8-8D92-C794-381D-A4F1D2C3E72B}"/>
+              </a:ext>
+            </a:extLst>
+          </p:cNvPr>
+          <p:cNvPicPr>
+            <a:picLocks noChangeAspect="1"/>
+          </p:cNvPicPr>
+          <p:nvPr/>
+        </p:nvPicPr>
+        <p:blipFill>
+          <a:blip r:embed="rId3"/>
+          <a:stretch>
+            <a:fillRect/>
+          </a:stretch>
+        </p:blipFill>
+        <p:spPr>
+          <a:xfrm>
+            <a:off x="838200" y="6083243"/>
+            <a:ext cx="2057687" cy="409632"/>
           </a:xfrm>
           <a:prstGeom prst="rect">
             <a:avLst/>
@@ -7989,7 +9568,11 @@
           <a:lstStyle/>
           <a:p>
             <a:r>
-              <a:rPr lang="de-DE" dirty="0"/>
+              <a:rPr lang="de-DE" dirty="0">
+                <a:solidFill>
+                  <a:srgbClr val="5C739C"/>
+                </a:solidFill>
+              </a:rPr>
               <a:t>Grundlagen – Monte Carlo I</a:t>
             </a:r>
           </a:p>
@@ -8104,6 +9687,36 @@
           <a:xfrm>
             <a:off x="1228427" y="2266862"/>
             <a:ext cx="3523973" cy="1038313"/>
+          </a:xfrm>
+          <a:prstGeom prst="rect">
+            <a:avLst/>
+          </a:prstGeom>
+        </p:spPr>
+      </p:pic>
+      <p:pic>
+        <p:nvPicPr>
+          <p:cNvPr id="4" name="Grafik 3">
+            <a:extLst>
+              <a:ext uri="{FF2B5EF4-FFF2-40B4-BE49-F238E27FC236}">
+                <a16:creationId xmlns:a16="http://schemas.microsoft.com/office/drawing/2014/main" id="{D0C352D1-B09E-0434-E077-0B3AC5E819BC}"/>
+              </a:ext>
+            </a:extLst>
+          </p:cNvPr>
+          <p:cNvPicPr>
+            <a:picLocks noChangeAspect="1"/>
+          </p:cNvPicPr>
+          <p:nvPr/>
+        </p:nvPicPr>
+        <p:blipFill>
+          <a:blip r:embed="rId3"/>
+          <a:stretch>
+            <a:fillRect/>
+          </a:stretch>
+        </p:blipFill>
+        <p:spPr>
+          <a:xfrm>
+            <a:off x="838200" y="6083243"/>
+            <a:ext cx="2057687" cy="409632"/>
           </a:xfrm>
           <a:prstGeom prst="rect">
             <a:avLst/>
@@ -8162,7 +9775,11 @@
           <a:lstStyle/>
           <a:p>
             <a:r>
-              <a:rPr lang="de-DE" dirty="0"/>
+              <a:rPr lang="de-DE" dirty="0">
+                <a:solidFill>
+                  <a:srgbClr val="5C739C"/>
+                </a:solidFill>
+              </a:rPr>
               <a:t>Grundlagen – Monte Carlo II</a:t>
             </a:r>
           </a:p>
@@ -8402,6 +10019,36 @@
           <a:xfrm>
             <a:off x="1228427" y="2266862"/>
             <a:ext cx="3523973" cy="1038313"/>
+          </a:xfrm>
+          <a:prstGeom prst="rect">
+            <a:avLst/>
+          </a:prstGeom>
+        </p:spPr>
+      </p:pic>
+      <p:pic>
+        <p:nvPicPr>
+          <p:cNvPr id="4" name="Grafik 3">
+            <a:extLst>
+              <a:ext uri="{FF2B5EF4-FFF2-40B4-BE49-F238E27FC236}">
+                <a16:creationId xmlns:a16="http://schemas.microsoft.com/office/drawing/2014/main" id="{7FC8F7F7-850A-9855-9AFA-4142020E2131}"/>
+              </a:ext>
+            </a:extLst>
+          </p:cNvPr>
+          <p:cNvPicPr>
+            <a:picLocks noChangeAspect="1"/>
+          </p:cNvPicPr>
+          <p:nvPr/>
+        </p:nvPicPr>
+        <p:blipFill>
+          <a:blip r:embed="rId7"/>
+          <a:stretch>
+            <a:fillRect/>
+          </a:stretch>
+        </p:blipFill>
+        <p:spPr>
+          <a:xfrm>
+            <a:off x="838200" y="6083243"/>
+            <a:ext cx="2057687" cy="409632"/>
           </a:xfrm>
           <a:prstGeom prst="rect">
             <a:avLst/>
@@ -8460,7 +10107,11 @@
           <a:lstStyle/>
           <a:p>
             <a:r>
-              <a:rPr lang="de-DE" dirty="0"/>
+              <a:rPr lang="de-DE" dirty="0">
+                <a:solidFill>
+                  <a:srgbClr val="5C739C"/>
+                </a:solidFill>
+              </a:rPr>
               <a:t>Grundlagen – Monte Carlo III</a:t>
             </a:r>
           </a:p>
@@ -8631,6 +10282,36 @@
           <a:xfrm>
             <a:off x="1228427" y="2266862"/>
             <a:ext cx="3523973" cy="1038313"/>
+          </a:xfrm>
+          <a:prstGeom prst="rect">
+            <a:avLst/>
+          </a:prstGeom>
+        </p:spPr>
+      </p:pic>
+      <p:pic>
+        <p:nvPicPr>
+          <p:cNvPr id="4" name="Grafik 3">
+            <a:extLst>
+              <a:ext uri="{FF2B5EF4-FFF2-40B4-BE49-F238E27FC236}">
+                <a16:creationId xmlns:a16="http://schemas.microsoft.com/office/drawing/2014/main" id="{272C87EF-0A7A-AAF0-1A15-715D354E3824}"/>
+              </a:ext>
+            </a:extLst>
+          </p:cNvPr>
+          <p:cNvPicPr>
+            <a:picLocks noChangeAspect="1"/>
+          </p:cNvPicPr>
+          <p:nvPr/>
+        </p:nvPicPr>
+        <p:blipFill>
+          <a:blip r:embed="rId5"/>
+          <a:stretch>
+            <a:fillRect/>
+          </a:stretch>
+        </p:blipFill>
+        <p:spPr>
+          <a:xfrm>
+            <a:off x="838200" y="6083243"/>
+            <a:ext cx="2057687" cy="409632"/>
           </a:xfrm>
           <a:prstGeom prst="rect">
             <a:avLst/>
@@ -8689,7 +10370,11 @@
           <a:lstStyle/>
           <a:p>
             <a:r>
-              <a:rPr lang="de-DE" dirty="0"/>
+              <a:rPr lang="de-DE" dirty="0">
+                <a:solidFill>
+                  <a:srgbClr val="5C739C"/>
+                </a:solidFill>
+              </a:rPr>
               <a:t>Wieso Markov Chain Monte Carlo?</a:t>
             </a:r>
           </a:p>
@@ -8829,6 +10514,36 @@
           <a:xfrm>
             <a:off x="1228427" y="2266862"/>
             <a:ext cx="3523973" cy="1038313"/>
+          </a:xfrm>
+          <a:prstGeom prst="rect">
+            <a:avLst/>
+          </a:prstGeom>
+        </p:spPr>
+      </p:pic>
+      <p:pic>
+        <p:nvPicPr>
+          <p:cNvPr id="4" name="Grafik 3">
+            <a:extLst>
+              <a:ext uri="{FF2B5EF4-FFF2-40B4-BE49-F238E27FC236}">
+                <a16:creationId xmlns:a16="http://schemas.microsoft.com/office/drawing/2014/main" id="{668ADE48-A306-7085-A746-5DF6AFC422FF}"/>
+              </a:ext>
+            </a:extLst>
+          </p:cNvPr>
+          <p:cNvPicPr>
+            <a:picLocks noChangeAspect="1"/>
+          </p:cNvPicPr>
+          <p:nvPr/>
+        </p:nvPicPr>
+        <p:blipFill>
+          <a:blip r:embed="rId3"/>
+          <a:stretch>
+            <a:fillRect/>
+          </a:stretch>
+        </p:blipFill>
+        <p:spPr>
+          <a:xfrm>
+            <a:off x="838200" y="6083243"/>
+            <a:ext cx="2057687" cy="409632"/>
           </a:xfrm>
           <a:prstGeom prst="rect">
             <a:avLst/>
@@ -8887,7 +10602,11 @@
           <a:lstStyle/>
           <a:p>
             <a:r>
-              <a:rPr lang="de-DE" dirty="0"/>
+              <a:rPr lang="de-DE" dirty="0">
+                <a:solidFill>
+                  <a:srgbClr val="5C739C"/>
+                </a:solidFill>
+              </a:rPr>
               <a:t>Die zentrale Idee hinter MCMC I</a:t>
             </a:r>
           </a:p>
@@ -8942,6 +10661,36 @@
           </a:p>
         </p:txBody>
       </p:sp>
+      <p:pic>
+        <p:nvPicPr>
+          <p:cNvPr id="4" name="Grafik 3">
+            <a:extLst>
+              <a:ext uri="{FF2B5EF4-FFF2-40B4-BE49-F238E27FC236}">
+                <a16:creationId xmlns:a16="http://schemas.microsoft.com/office/drawing/2014/main" id="{3E27E559-EB2B-D1C3-8567-5B35BF7CA37E}"/>
+              </a:ext>
+            </a:extLst>
+          </p:cNvPr>
+          <p:cNvPicPr>
+            <a:picLocks noChangeAspect="1"/>
+          </p:cNvPicPr>
+          <p:nvPr/>
+        </p:nvPicPr>
+        <p:blipFill>
+          <a:blip r:embed="rId2"/>
+          <a:stretch>
+            <a:fillRect/>
+          </a:stretch>
+        </p:blipFill>
+        <p:spPr>
+          <a:xfrm>
+            <a:off x="838200" y="6083243"/>
+            <a:ext cx="2057687" cy="409632"/>
+          </a:xfrm>
+          <a:prstGeom prst="rect">
+            <a:avLst/>
+          </a:prstGeom>
+        </p:spPr>
+      </p:pic>
     </p:spTree>
     <p:extLst>
       <p:ext uri="{BB962C8B-B14F-4D97-AF65-F5344CB8AC3E}">
@@ -8994,7 +10743,11 @@
           <a:lstStyle/>
           <a:p>
             <a:r>
-              <a:rPr lang="de-DE" dirty="0"/>
+              <a:rPr lang="de-DE" dirty="0">
+                <a:solidFill>
+                  <a:srgbClr val="5C739C"/>
+                </a:solidFill>
+              </a:rPr>
               <a:t>Die zentrale Idee hinter MCMC II</a:t>
             </a:r>
           </a:p>
@@ -9064,6 +10817,36 @@
           </a:p>
         </p:txBody>
       </p:sp>
+      <p:pic>
+        <p:nvPicPr>
+          <p:cNvPr id="4" name="Grafik 3">
+            <a:extLst>
+              <a:ext uri="{FF2B5EF4-FFF2-40B4-BE49-F238E27FC236}">
+                <a16:creationId xmlns:a16="http://schemas.microsoft.com/office/drawing/2014/main" id="{D0B4B9EE-19D8-70FA-0237-CC011ABD3B95}"/>
+              </a:ext>
+            </a:extLst>
+          </p:cNvPr>
+          <p:cNvPicPr>
+            <a:picLocks noChangeAspect="1"/>
+          </p:cNvPicPr>
+          <p:nvPr/>
+        </p:nvPicPr>
+        <p:blipFill>
+          <a:blip r:embed="rId2"/>
+          <a:stretch>
+            <a:fillRect/>
+          </a:stretch>
+        </p:blipFill>
+        <p:spPr>
+          <a:xfrm>
+            <a:off x="838200" y="6083243"/>
+            <a:ext cx="2057687" cy="409632"/>
+          </a:xfrm>
+          <a:prstGeom prst="rect">
+            <a:avLst/>
+          </a:prstGeom>
+        </p:spPr>
+      </p:pic>
     </p:spTree>
     <p:extLst>
       <p:ext uri="{BB962C8B-B14F-4D97-AF65-F5344CB8AC3E}">
@@ -9116,7 +10899,11 @@
           <a:lstStyle/>
           <a:p>
             <a:r>
-              <a:rPr lang="de-DE" dirty="0"/>
+              <a:rPr lang="de-DE" dirty="0">
+                <a:solidFill>
+                  <a:srgbClr val="5C739C"/>
+                </a:solidFill>
+              </a:rPr>
               <a:t>Die zentrale Idee hinter MCMC II</a:t>
             </a:r>
           </a:p>
@@ -9276,6 +11063,36 @@
           </a:p>
         </p:txBody>
       </p:sp>
+      <p:pic>
+        <p:nvPicPr>
+          <p:cNvPr id="4" name="Grafik 3">
+            <a:extLst>
+              <a:ext uri="{FF2B5EF4-FFF2-40B4-BE49-F238E27FC236}">
+                <a16:creationId xmlns:a16="http://schemas.microsoft.com/office/drawing/2014/main" id="{5B0ED522-8C9F-3DD4-41A9-FAAA4E8DE107}"/>
+              </a:ext>
+            </a:extLst>
+          </p:cNvPr>
+          <p:cNvPicPr>
+            <a:picLocks noChangeAspect="1"/>
+          </p:cNvPicPr>
+          <p:nvPr/>
+        </p:nvPicPr>
+        <p:blipFill>
+          <a:blip r:embed="rId2"/>
+          <a:stretch>
+            <a:fillRect/>
+          </a:stretch>
+        </p:blipFill>
+        <p:spPr>
+          <a:xfrm>
+            <a:off x="838200" y="6083243"/>
+            <a:ext cx="2057687" cy="409632"/>
+          </a:xfrm>
+          <a:prstGeom prst="rect">
+            <a:avLst/>
+          </a:prstGeom>
+        </p:spPr>
+      </p:pic>
     </p:spTree>
     <p:extLst>
       <p:ext uri="{BB962C8B-B14F-4D97-AF65-F5344CB8AC3E}">
@@ -9582,4 +11399,299 @@
     </a:ext>
   </a:extLst>
 </a:theme>
+</file>
+
+<file path=ppt/theme/theme2.xml><?xml version="1.0" encoding="utf-8"?>
+<a:theme xmlns:a="http://schemas.openxmlformats.org/drawingml/2006/main" name="Office">
+  <a:themeElements>
+    <a:clrScheme name="Office">
+      <a:dk1>
+        <a:sysClr val="windowText" lastClr="000000"/>
+      </a:dk1>
+      <a:lt1>
+        <a:sysClr val="window" lastClr="FFFFFF"/>
+      </a:lt1>
+      <a:dk2>
+        <a:srgbClr val="44546A"/>
+      </a:dk2>
+      <a:lt2>
+        <a:srgbClr val="E7E6E6"/>
+      </a:lt2>
+      <a:accent1>
+        <a:srgbClr val="4472C4"/>
+      </a:accent1>
+      <a:accent2>
+        <a:srgbClr val="ED7D31"/>
+      </a:accent2>
+      <a:accent3>
+        <a:srgbClr val="A5A5A5"/>
+      </a:accent3>
+      <a:accent4>
+        <a:srgbClr val="FFC000"/>
+      </a:accent4>
+      <a:accent5>
+        <a:srgbClr val="5B9BD5"/>
+      </a:accent5>
+      <a:accent6>
+        <a:srgbClr val="70AD47"/>
+      </a:accent6>
+      <a:hlink>
+        <a:srgbClr val="0563C1"/>
+      </a:hlink>
+      <a:folHlink>
+        <a:srgbClr val="954F72"/>
+      </a:folHlink>
+    </a:clrScheme>
+    <a:fontScheme name="Office">
+      <a:majorFont>
+        <a:latin typeface="Calibri Light" panose="020F0302020204030204"/>
+        <a:ea typeface=""/>
+        <a:cs typeface=""/>
+        <a:font script="Jpan" typeface="游ゴシック Light"/>
+        <a:font script="Hang" typeface="맑은 고딕"/>
+        <a:font script="Hans" typeface="等线 Light"/>
+        <a:font script="Hant" typeface="新細明體"/>
+        <a:font script="Arab" typeface="Times New Roman"/>
+        <a:font script="Hebr" typeface="Times New Roman"/>
+        <a:font script="Thai" typeface="Angsana New"/>
+        <a:font script="Ethi" typeface="Nyala"/>
+        <a:font script="Beng" typeface="Vrinda"/>
+        <a:font script="Gujr" typeface="Shruti"/>
+        <a:font script="Khmr" typeface="MoolBoran"/>
+        <a:font script="Knda" typeface="Tunga"/>
+        <a:font script="Guru" typeface="Raavi"/>
+        <a:font script="Cans" typeface="Euphemia"/>
+        <a:font script="Cher" typeface="Plantagenet Cherokee"/>
+        <a:font script="Yiii" typeface="Microsoft Yi Baiti"/>
+        <a:font script="Tibt" typeface="Microsoft Himalaya"/>
+        <a:font script="Thaa" typeface="MV Boli"/>
+        <a:font script="Deva" typeface="Mangal"/>
+        <a:font script="Telu" typeface="Gautami"/>
+        <a:font script="Taml" typeface="Latha"/>
+        <a:font script="Syrc" typeface="Estrangelo Edessa"/>
+        <a:font script="Orya" typeface="Kalinga"/>
+        <a:font script="Mlym" typeface="Kartika"/>
+        <a:font script="Laoo" typeface="DokChampa"/>
+        <a:font script="Sinh" typeface="Iskoola Pota"/>
+        <a:font script="Mong" typeface="Mongolian Baiti"/>
+        <a:font script="Viet" typeface="Times New Roman"/>
+        <a:font script="Uigh" typeface="Microsoft Uighur"/>
+        <a:font script="Geor" typeface="Sylfaen"/>
+        <a:font script="Armn" typeface="Arial"/>
+        <a:font script="Bugi" typeface="Leelawadee UI"/>
+        <a:font script="Bopo" typeface="Microsoft JhengHei"/>
+        <a:font script="Java" typeface="Javanese Text"/>
+        <a:font script="Lisu" typeface="Segoe UI"/>
+        <a:font script="Mymr" typeface="Myanmar Text"/>
+        <a:font script="Nkoo" typeface="Ebrima"/>
+        <a:font script="Olck" typeface="Nirmala UI"/>
+        <a:font script="Osma" typeface="Ebrima"/>
+        <a:font script="Phag" typeface="Phagspa"/>
+        <a:font script="Syrn" typeface="Estrangelo Edessa"/>
+        <a:font script="Syrj" typeface="Estrangelo Edessa"/>
+        <a:font script="Syre" typeface="Estrangelo Edessa"/>
+        <a:font script="Sora" typeface="Nirmala UI"/>
+        <a:font script="Tale" typeface="Microsoft Tai Le"/>
+        <a:font script="Talu" typeface="Microsoft New Tai Lue"/>
+        <a:font script="Tfng" typeface="Ebrima"/>
+      </a:majorFont>
+      <a:minorFont>
+        <a:latin typeface="Calibri" panose="020F0502020204030204"/>
+        <a:ea typeface=""/>
+        <a:cs typeface=""/>
+        <a:font script="Jpan" typeface="游ゴシック"/>
+        <a:font script="Hang" typeface="맑은 고딕"/>
+        <a:font script="Hans" typeface="等线"/>
+        <a:font script="Hant" typeface="新細明體"/>
+        <a:font script="Arab" typeface="Arial"/>
+        <a:font script="Hebr" typeface="Arial"/>
+        <a:font script="Thai" typeface="Cordia New"/>
+        <a:font script="Ethi" typeface="Nyala"/>
+        <a:font script="Beng" typeface="Vrinda"/>
+        <a:font script="Gujr" typeface="Shruti"/>
+        <a:font script="Khmr" typeface="DaunPenh"/>
+        <a:font script="Knda" typeface="Tunga"/>
+        <a:font script="Guru" typeface="Raavi"/>
+        <a:font script="Cans" typeface="Euphemia"/>
+        <a:font script="Cher" typeface="Plantagenet Cherokee"/>
+        <a:font script="Yiii" typeface="Microsoft Yi Baiti"/>
+        <a:font script="Tibt" typeface="Microsoft Himalaya"/>
+        <a:font script="Thaa" typeface="MV Boli"/>
+        <a:font script="Deva" typeface="Mangal"/>
+        <a:font script="Telu" typeface="Gautami"/>
+        <a:font script="Taml" typeface="Latha"/>
+        <a:font script="Syrc" typeface="Estrangelo Edessa"/>
+        <a:font script="Orya" typeface="Kalinga"/>
+        <a:font script="Mlym" typeface="Kartika"/>
+        <a:font script="Laoo" typeface="DokChampa"/>
+        <a:font script="Sinh" typeface="Iskoola Pota"/>
+        <a:font script="Mong" typeface="Mongolian Baiti"/>
+        <a:font script="Viet" typeface="Arial"/>
+        <a:font script="Uigh" typeface="Microsoft Uighur"/>
+        <a:font script="Geor" typeface="Sylfaen"/>
+        <a:font script="Armn" typeface="Arial"/>
+        <a:font script="Bugi" typeface="Leelawadee UI"/>
+        <a:font script="Bopo" typeface="Microsoft JhengHei"/>
+        <a:font script="Java" typeface="Javanese Text"/>
+        <a:font script="Lisu" typeface="Segoe UI"/>
+        <a:font script="Mymr" typeface="Myanmar Text"/>
+        <a:font script="Nkoo" typeface="Ebrima"/>
+        <a:font script="Olck" typeface="Nirmala UI"/>
+        <a:font script="Osma" typeface="Ebrima"/>
+        <a:font script="Phag" typeface="Phagspa"/>
+        <a:font script="Syrn" typeface="Estrangelo Edessa"/>
+        <a:font script="Syrj" typeface="Estrangelo Edessa"/>
+        <a:font script="Syre" typeface="Estrangelo Edessa"/>
+        <a:font script="Sora" typeface="Nirmala UI"/>
+        <a:font script="Tale" typeface="Microsoft Tai Le"/>
+        <a:font script="Talu" typeface="Microsoft New Tai Lue"/>
+        <a:font script="Tfng" typeface="Ebrima"/>
+      </a:minorFont>
+    </a:fontScheme>
+    <a:fmtScheme name="Office">
+      <a:fillStyleLst>
+        <a:solidFill>
+          <a:schemeClr val="phClr"/>
+        </a:solidFill>
+        <a:gradFill rotWithShape="1">
+          <a:gsLst>
+            <a:gs pos="0">
+              <a:schemeClr val="phClr">
+                <a:lumMod val="110000"/>
+                <a:satMod val="105000"/>
+                <a:tint val="67000"/>
+              </a:schemeClr>
+            </a:gs>
+            <a:gs pos="50000">
+              <a:schemeClr val="phClr">
+                <a:lumMod val="105000"/>
+                <a:satMod val="103000"/>
+                <a:tint val="73000"/>
+              </a:schemeClr>
+            </a:gs>
+            <a:gs pos="100000">
+              <a:schemeClr val="phClr">
+                <a:lumMod val="105000"/>
+                <a:satMod val="109000"/>
+                <a:tint val="81000"/>
+              </a:schemeClr>
+            </a:gs>
+          </a:gsLst>
+          <a:lin ang="5400000" scaled="0"/>
+        </a:gradFill>
+        <a:gradFill rotWithShape="1">
+          <a:gsLst>
+            <a:gs pos="0">
+              <a:schemeClr val="phClr">
+                <a:satMod val="103000"/>
+                <a:lumMod val="102000"/>
+                <a:tint val="94000"/>
+              </a:schemeClr>
+            </a:gs>
+            <a:gs pos="50000">
+              <a:schemeClr val="phClr">
+                <a:satMod val="110000"/>
+                <a:lumMod val="100000"/>
+                <a:shade val="100000"/>
+              </a:schemeClr>
+            </a:gs>
+            <a:gs pos="100000">
+              <a:schemeClr val="phClr">
+                <a:lumMod val="99000"/>
+                <a:satMod val="120000"/>
+                <a:shade val="78000"/>
+              </a:schemeClr>
+            </a:gs>
+          </a:gsLst>
+          <a:lin ang="5400000" scaled="0"/>
+        </a:gradFill>
+      </a:fillStyleLst>
+      <a:lnStyleLst>
+        <a:ln w="6350" cap="flat" cmpd="sng" algn="ctr">
+          <a:solidFill>
+            <a:schemeClr val="phClr"/>
+          </a:solidFill>
+          <a:prstDash val="solid"/>
+          <a:miter lim="800000"/>
+        </a:ln>
+        <a:ln w="12700" cap="flat" cmpd="sng" algn="ctr">
+          <a:solidFill>
+            <a:schemeClr val="phClr"/>
+          </a:solidFill>
+          <a:prstDash val="solid"/>
+          <a:miter lim="800000"/>
+        </a:ln>
+        <a:ln w="19050" cap="flat" cmpd="sng" algn="ctr">
+          <a:solidFill>
+            <a:schemeClr val="phClr"/>
+          </a:solidFill>
+          <a:prstDash val="solid"/>
+          <a:miter lim="800000"/>
+        </a:ln>
+      </a:lnStyleLst>
+      <a:effectStyleLst>
+        <a:effectStyle>
+          <a:effectLst/>
+        </a:effectStyle>
+        <a:effectStyle>
+          <a:effectLst/>
+        </a:effectStyle>
+        <a:effectStyle>
+          <a:effectLst>
+            <a:outerShdw blurRad="57150" dist="19050" dir="5400000" algn="ctr" rotWithShape="0">
+              <a:srgbClr val="000000">
+                <a:alpha val="63000"/>
+              </a:srgbClr>
+            </a:outerShdw>
+          </a:effectLst>
+        </a:effectStyle>
+      </a:effectStyleLst>
+      <a:bgFillStyleLst>
+        <a:solidFill>
+          <a:schemeClr val="phClr"/>
+        </a:solidFill>
+        <a:solidFill>
+          <a:schemeClr val="phClr">
+            <a:tint val="95000"/>
+            <a:satMod val="170000"/>
+          </a:schemeClr>
+        </a:solidFill>
+        <a:gradFill rotWithShape="1">
+          <a:gsLst>
+            <a:gs pos="0">
+              <a:schemeClr val="phClr">
+                <a:tint val="93000"/>
+                <a:satMod val="150000"/>
+                <a:shade val="98000"/>
+                <a:lumMod val="102000"/>
+              </a:schemeClr>
+            </a:gs>
+            <a:gs pos="50000">
+              <a:schemeClr val="phClr">
+                <a:tint val="98000"/>
+                <a:satMod val="130000"/>
+                <a:shade val="90000"/>
+                <a:lumMod val="103000"/>
+              </a:schemeClr>
+            </a:gs>
+            <a:gs pos="100000">
+              <a:schemeClr val="phClr">
+                <a:shade val="63000"/>
+                <a:satMod val="120000"/>
+              </a:schemeClr>
+            </a:gs>
+          </a:gsLst>
+          <a:lin ang="5400000" scaled="0"/>
+        </a:gradFill>
+      </a:bgFillStyleLst>
+    </a:fmtScheme>
+  </a:themeElements>
+  <a:objectDefaults/>
+  <a:extraClrSchemeLst/>
+  <a:extLst>
+    <a:ext uri="{05A4C25C-085E-4340-85A3-A5531E510DB2}">
+      <thm15:themeFamily xmlns:thm15="http://schemas.microsoft.com/office/thememl/2012/main" name="Office Theme" id="{62F939B6-93AF-4DB8-9C6B-D6C7DFDC589F}" vid="{4A3C46E8-61CC-4603-A589-7422A47A8E4A}"/>
+    </a:ext>
+  </a:extLst>
+</a:theme>
 </file>
</xml_diff>

<commit_message>
add example images to ppt
</commit_message>
<xml_diff>
--- a/Präsentation_MonteCarlo.pptx
+++ b/Präsentation_MonteCarlo.pptx
@@ -5,7 +5,7 @@
     <p:sldMasterId id="2147483648" r:id="rId1"/>
   </p:sldMasterIdLst>
   <p:notesMasterIdLst>
-    <p:notesMasterId r:id="rId28"/>
+    <p:notesMasterId r:id="rId29"/>
   </p:notesMasterIdLst>
   <p:sldIdLst>
     <p:sldId id="552" r:id="rId2"/>
@@ -19,21 +19,22 @@
     <p:sldId id="265" r:id="rId10"/>
     <p:sldId id="267" r:id="rId11"/>
     <p:sldId id="268" r:id="rId12"/>
-    <p:sldId id="269" r:id="rId13"/>
-    <p:sldId id="270" r:id="rId14"/>
-    <p:sldId id="275" r:id="rId15"/>
-    <p:sldId id="271" r:id="rId16"/>
-    <p:sldId id="273" r:id="rId17"/>
-    <p:sldId id="272" r:id="rId18"/>
-    <p:sldId id="274" r:id="rId19"/>
-    <p:sldId id="276" r:id="rId20"/>
-    <p:sldId id="278" r:id="rId21"/>
-    <p:sldId id="277" r:id="rId22"/>
-    <p:sldId id="281" r:id="rId23"/>
-    <p:sldId id="280" r:id="rId24"/>
-    <p:sldId id="282" r:id="rId25"/>
-    <p:sldId id="283" r:id="rId26"/>
-    <p:sldId id="284" r:id="rId27"/>
+    <p:sldId id="553" r:id="rId13"/>
+    <p:sldId id="269" r:id="rId14"/>
+    <p:sldId id="270" r:id="rId15"/>
+    <p:sldId id="275" r:id="rId16"/>
+    <p:sldId id="271" r:id="rId17"/>
+    <p:sldId id="273" r:id="rId18"/>
+    <p:sldId id="272" r:id="rId19"/>
+    <p:sldId id="274" r:id="rId20"/>
+    <p:sldId id="276" r:id="rId21"/>
+    <p:sldId id="278" r:id="rId22"/>
+    <p:sldId id="277" r:id="rId23"/>
+    <p:sldId id="281" r:id="rId24"/>
+    <p:sldId id="280" r:id="rId25"/>
+    <p:sldId id="282" r:id="rId26"/>
+    <p:sldId id="283" r:id="rId27"/>
+    <p:sldId id="284" r:id="rId28"/>
   </p:sldIdLst>
   <p:sldSz cx="12192000" cy="6858000"/>
   <p:notesSz cx="6858000" cy="9144000"/>
@@ -151,6 +152,7 @@
             <p14:sldId id="265"/>
             <p14:sldId id="267"/>
             <p14:sldId id="268"/>
+            <p14:sldId id="553"/>
             <p14:sldId id="269"/>
             <p14:sldId id="270"/>
             <p14:sldId id="275"/>
@@ -306,6 +308,43 @@
 </p188:cmLst>
 </file>
 
+<file path=ppt/comments/modernComment_229_596C2A97.xml><?xml version="1.0" encoding="utf-8"?>
+<p188:cmLst xmlns:a="http://schemas.openxmlformats.org/drawingml/2006/main" xmlns:r="http://schemas.openxmlformats.org/officeDocument/2006/relationships" xmlns:p188="http://schemas.microsoft.com/office/powerpoint/2018/8/main">
+  <p188:cm id="{1B37EBB9-C72B-4D53-8945-9A502A085E86}" authorId="{738DA873-DB13-F91F-A9E2-F1ED84C0CE71}" created="2022-11-13T10:27:54.470">
+    <pc:sldMkLst xmlns:pc="http://schemas.microsoft.com/office/powerpoint/2013/main/command">
+      <pc:docMk/>
+      <pc:sldMk cId="2681267588" sldId="268"/>
+    </pc:sldMkLst>
+    <p188:replyLst>
+      <p188:reply id="{875BB5D3-70FE-460F-8448-60F3F33C2E11}" authorId="{738DA873-DB13-F91F-A9E2-F1ED84C0CE71}" created="2022-11-13T10:29:44.261">
+        <p188:txBody>
+          <a:bodyPr/>
+          <a:lstStyle/>
+          <a:p>
+            <a:r>
+              <a:rPr lang="de-DE"/>
+              <a:t>Hat jemand Fragen?</a:t>
+            </a:r>
+          </a:p>
+        </p188:txBody>
+      </p188:reply>
+    </p188:replyLst>
+    <p188:txBody>
+      <a:bodyPr/>
+      <a:lstStyle/>
+      <a:p>
+        <a:r>
+          <a:rPr lang="de-DE"/>
+          <a:t>1.  Wie funktioniert Algo aufmalen
+2. Warum nehme ich manchmal auch weniger wahrscheinliche Punkte?
+Aufmalen</a:t>
+        </a:r>
+      </a:p>
+    </p188:txBody>
+  </p188:cm>
+</p188:cmLst>
+</file>
+
 <file path=ppt/notesMasters/notesMaster1.xml><?xml version="1.0" encoding="utf-8"?>
 <p:notesMaster xmlns:a="http://schemas.openxmlformats.org/drawingml/2006/main" xmlns:r="http://schemas.openxmlformats.org/officeDocument/2006/relationships" xmlns:p="http://schemas.openxmlformats.org/presentationml/2006/main">
   <p:cSld>
@@ -388,7 +427,7 @@
           <a:p>
             <a:fld id="{041CD2E6-840F-44C5-A2A9-5138604D20B7}" type="datetimeFigureOut">
               <a:rPr lang="de-DE" smtClean="0"/>
-              <a:t>15.11.2022</a:t>
+              <a:t>16.11.2022</a:t>
             </a:fld>
             <a:endParaRPr lang="de-DE"/>
           </a:p>
@@ -802,7 +841,7 @@
           <a:p>
             <a:fld id="{FEA9118B-EB62-4AC7-B893-52C4CE8DA56F}" type="datetimeFigureOut">
               <a:rPr lang="de-DE" smtClean="0"/>
-              <a:t>15.11.2022</a:t>
+              <a:t>16.11.2022</a:t>
             </a:fld>
             <a:endParaRPr lang="de-DE"/>
           </a:p>
@@ -1000,7 +1039,7 @@
           <a:p>
             <a:fld id="{FEA9118B-EB62-4AC7-B893-52C4CE8DA56F}" type="datetimeFigureOut">
               <a:rPr lang="de-DE" smtClean="0"/>
-              <a:t>15.11.2022</a:t>
+              <a:t>16.11.2022</a:t>
             </a:fld>
             <a:endParaRPr lang="de-DE"/>
           </a:p>
@@ -1208,7 +1247,7 @@
           <a:p>
             <a:fld id="{FEA9118B-EB62-4AC7-B893-52C4CE8DA56F}" type="datetimeFigureOut">
               <a:rPr lang="de-DE" smtClean="0"/>
-              <a:t>15.11.2022</a:t>
+              <a:t>16.11.2022</a:t>
             </a:fld>
             <a:endParaRPr lang="de-DE"/>
           </a:p>
@@ -1897,7 +1936,7 @@
           <a:p>
             <a:fld id="{FEA9118B-EB62-4AC7-B893-52C4CE8DA56F}" type="datetimeFigureOut">
               <a:rPr lang="de-DE" smtClean="0"/>
-              <a:t>15.11.2022</a:t>
+              <a:t>16.11.2022</a:t>
             </a:fld>
             <a:endParaRPr lang="de-DE"/>
           </a:p>
@@ -2172,7 +2211,7 @@
           <a:p>
             <a:fld id="{FEA9118B-EB62-4AC7-B893-52C4CE8DA56F}" type="datetimeFigureOut">
               <a:rPr lang="de-DE" smtClean="0"/>
-              <a:t>15.11.2022</a:t>
+              <a:t>16.11.2022</a:t>
             </a:fld>
             <a:endParaRPr lang="de-DE"/>
           </a:p>
@@ -2437,7 +2476,7 @@
           <a:p>
             <a:fld id="{FEA9118B-EB62-4AC7-B893-52C4CE8DA56F}" type="datetimeFigureOut">
               <a:rPr lang="de-DE" smtClean="0"/>
-              <a:t>15.11.2022</a:t>
+              <a:t>16.11.2022</a:t>
             </a:fld>
             <a:endParaRPr lang="de-DE"/>
           </a:p>
@@ -2849,7 +2888,7 @@
           <a:p>
             <a:fld id="{FEA9118B-EB62-4AC7-B893-52C4CE8DA56F}" type="datetimeFigureOut">
               <a:rPr lang="de-DE" smtClean="0"/>
-              <a:t>15.11.2022</a:t>
+              <a:t>16.11.2022</a:t>
             </a:fld>
             <a:endParaRPr lang="de-DE"/>
           </a:p>
@@ -2990,7 +3029,7 @@
           <a:p>
             <a:fld id="{FEA9118B-EB62-4AC7-B893-52C4CE8DA56F}" type="datetimeFigureOut">
               <a:rPr lang="de-DE" smtClean="0"/>
-              <a:t>15.11.2022</a:t>
+              <a:t>16.11.2022</a:t>
             </a:fld>
             <a:endParaRPr lang="de-DE"/>
           </a:p>
@@ -3103,7 +3142,7 @@
           <a:p>
             <a:fld id="{FEA9118B-EB62-4AC7-B893-52C4CE8DA56F}" type="datetimeFigureOut">
               <a:rPr lang="de-DE" smtClean="0"/>
-              <a:t>15.11.2022</a:t>
+              <a:t>16.11.2022</a:t>
             </a:fld>
             <a:endParaRPr lang="de-DE"/>
           </a:p>
@@ -3414,7 +3453,7 @@
           <a:p>
             <a:fld id="{FEA9118B-EB62-4AC7-B893-52C4CE8DA56F}" type="datetimeFigureOut">
               <a:rPr lang="de-DE" smtClean="0"/>
-              <a:t>15.11.2022</a:t>
+              <a:t>16.11.2022</a:t>
             </a:fld>
             <a:endParaRPr lang="de-DE"/>
           </a:p>
@@ -3702,7 +3741,7 @@
           <a:p>
             <a:fld id="{FEA9118B-EB62-4AC7-B893-52C4CE8DA56F}" type="datetimeFigureOut">
               <a:rPr lang="de-DE" smtClean="0"/>
-              <a:t>15.11.2022</a:t>
+              <a:t>16.11.2022</a:t>
             </a:fld>
             <a:endParaRPr lang="de-DE"/>
           </a:p>
@@ -3943,7 +3982,7 @@
           <a:p>
             <a:fld id="{FEA9118B-EB62-4AC7-B893-52C4CE8DA56F}" type="datetimeFigureOut">
               <a:rPr lang="de-DE" smtClean="0"/>
-              <a:t>15.11.2022</a:t>
+              <a:t>16.11.2022</a:t>
             </a:fld>
             <a:endParaRPr lang="de-DE"/>
           </a:p>
@@ -5009,6 +5048,545 @@
                   <a:srgbClr val="5C739C"/>
                 </a:solidFill>
               </a:rPr>
+              <a:t>Metropolis Hastings - Intuition</a:t>
+            </a:r>
+          </a:p>
+        </p:txBody>
+      </p:sp>
+      <p:sp>
+        <p:nvSpPr>
+          <p:cNvPr id="3" name="Inhaltsplatzhalter 2">
+            <a:extLst>
+              <a:ext uri="{FF2B5EF4-FFF2-40B4-BE49-F238E27FC236}">
+                <a16:creationId xmlns:a16="http://schemas.microsoft.com/office/drawing/2014/main" id="{232E5703-9081-45BF-35E8-3E0D697B74CF}"/>
+              </a:ext>
+            </a:extLst>
+          </p:cNvPr>
+          <p:cNvSpPr>
+            <a:spLocks noGrp="1"/>
+          </p:cNvSpPr>
+          <p:nvPr>
+            <p:ph idx="1"/>
+          </p:nvPr>
+        </p:nvSpPr>
+        <p:spPr>
+          <a:xfrm>
+            <a:off x="838201" y="1825625"/>
+            <a:ext cx="6546574" cy="4351338"/>
+          </a:xfrm>
+        </p:spPr>
+        <p:txBody>
+          <a:bodyPr>
+            <a:normAutofit/>
+          </a:bodyPr>
+          <a:lstStyle/>
+          <a:p>
+            <a:pPr marL="0" indent="0">
+              <a:buNone/>
+            </a:pPr>
+            <a:r>
+              <a:rPr lang="de-DE" sz="2000" b="1" dirty="0"/>
+              <a:t>Algorithmus:</a:t>
+            </a:r>
+          </a:p>
+          <a:p>
+            <a:pPr marL="457200" lvl="1" indent="0">
+              <a:buNone/>
+            </a:pPr>
+            <a:r>
+              <a:rPr lang="de-DE" sz="1800" b="1" dirty="0"/>
+              <a:t>(0) </a:t>
+            </a:r>
+            <a:r>
+              <a:rPr lang="de-DE" sz="1800" b="1" dirty="0" err="1"/>
+              <a:t>Initialise</a:t>
+            </a:r>
+            <a:r>
+              <a:rPr lang="de-DE" sz="1800" b="1" dirty="0"/>
+              <a:t>:</a:t>
+            </a:r>
+          </a:p>
+          <a:p>
+            <a:pPr marL="457200" lvl="1" indent="0">
+              <a:buNone/>
+            </a:pPr>
+            <a:r>
+              <a:rPr lang="de-DE" sz="1800" dirty="0"/>
+              <a:t>Initialisiere x</a:t>
+            </a:r>
+            <a:r>
+              <a:rPr lang="de-DE" sz="1800" baseline="-25000" dirty="0"/>
+              <a:t>0 </a:t>
+            </a:r>
+            <a:r>
+              <a:rPr lang="de-DE" sz="1800" dirty="0" err="1"/>
+              <a:t>irgendiwe</a:t>
+            </a:r>
+            <a:r>
+              <a:rPr lang="de-DE" sz="1800" dirty="0"/>
+              <a:t>, bspw. setze x</a:t>
+            </a:r>
+            <a:r>
+              <a:rPr lang="de-DE" sz="1800" baseline="-25000" dirty="0"/>
+              <a:t>0</a:t>
+            </a:r>
+            <a:r>
+              <a:rPr lang="de-DE" sz="1800" dirty="0"/>
+              <a:t> = 1</a:t>
+            </a:r>
+          </a:p>
+          <a:p>
+            <a:pPr marL="457200" lvl="1" indent="0">
+              <a:buNone/>
+            </a:pPr>
+            <a:r>
+              <a:rPr lang="de-DE" sz="1800" b="1" dirty="0"/>
+              <a:t>(i) </a:t>
+            </a:r>
+            <a:r>
+              <a:rPr lang="de-DE" sz="1800" b="1" dirty="0" err="1"/>
+              <a:t>Propose</a:t>
+            </a:r>
+            <a:r>
+              <a:rPr lang="de-DE" sz="1800" b="1" dirty="0"/>
+              <a:t>:</a:t>
+            </a:r>
+          </a:p>
+          <a:p>
+            <a:pPr marL="457200" lvl="1" indent="0">
+              <a:buNone/>
+            </a:pPr>
+            <a:r>
+              <a:rPr lang="de-DE" sz="1800" dirty="0"/>
+              <a:t>Schlage einen neuen Punkt x̂ vor, wobei x̂ normalverteilt mit N(x</a:t>
+            </a:r>
+            <a:r>
+              <a:rPr lang="de-DE" sz="1800" baseline="-25000" dirty="0"/>
+              <a:t>n-1</a:t>
+            </a:r>
+            <a:r>
+              <a:rPr lang="de-DE" sz="1800" dirty="0"/>
+              <a:t>,10)</a:t>
+            </a:r>
+          </a:p>
+          <a:p>
+            <a:pPr marL="457200" lvl="1" indent="0">
+              <a:buNone/>
+            </a:pPr>
+            <a:r>
+              <a:rPr lang="de-DE" sz="1800" b="1" dirty="0"/>
+              <a:t>(ii) </a:t>
+            </a:r>
+            <a:r>
+              <a:rPr lang="de-DE" sz="1800" b="1" dirty="0" err="1"/>
+              <a:t>Compare</a:t>
+            </a:r>
+            <a:r>
+              <a:rPr lang="de-DE" sz="1800" b="1" dirty="0"/>
+              <a:t>:</a:t>
+            </a:r>
+          </a:p>
+          <a:p>
+            <a:pPr marL="457200" lvl="1" indent="0">
+              <a:buNone/>
+            </a:pPr>
+            <a:r>
+              <a:rPr lang="de-DE" sz="1800" dirty="0"/>
+              <a:t>Berechne </a:t>
+            </a:r>
+            <a:r>
+              <a:rPr lang="el-GR" sz="1800" dirty="0">
+                <a:effectLst/>
+                <a:latin typeface="u0000"/>
+              </a:rPr>
+              <a:t>α</a:t>
+            </a:r>
+            <a:r>
+              <a:rPr lang="de-DE" sz="1800" dirty="0"/>
+              <a:t> = </a:t>
+            </a:r>
+            <a:r>
+              <a:rPr lang="el-GR" sz="1800" dirty="0"/>
+              <a:t>π</a:t>
+            </a:r>
+            <a:r>
+              <a:rPr lang="de-DE" sz="1800" dirty="0"/>
+              <a:t>(x̂)/</a:t>
+            </a:r>
+            <a:r>
+              <a:rPr lang="el-GR" sz="1800" dirty="0"/>
+              <a:t> π</a:t>
+            </a:r>
+            <a:r>
+              <a:rPr lang="de-DE" sz="1800" dirty="0"/>
+              <a:t>(x</a:t>
+            </a:r>
+            <a:r>
+              <a:rPr lang="de-DE" sz="1800" baseline="-25000" dirty="0"/>
+              <a:t>n-1</a:t>
+            </a:r>
+            <a:r>
+              <a:rPr lang="de-DE" sz="1800" dirty="0"/>
+              <a:t>) </a:t>
+            </a:r>
+          </a:p>
+          <a:p>
+            <a:pPr marL="457200" lvl="1" indent="0">
+              <a:buNone/>
+            </a:pPr>
+            <a:r>
+              <a:rPr lang="de-DE" sz="1800" dirty="0"/>
+              <a:t>(„welcher Punkt ist wahrscheinlicher laut unserer Verteilung </a:t>
+            </a:r>
+            <a:r>
+              <a:rPr lang="el-GR" sz="1800" dirty="0"/>
+              <a:t>π</a:t>
+            </a:r>
+            <a:r>
+              <a:rPr lang="de-DE" sz="1800" dirty="0"/>
+              <a:t>?)</a:t>
+            </a:r>
+          </a:p>
+          <a:p>
+            <a:pPr marL="457200" lvl="1" indent="0">
+              <a:buNone/>
+            </a:pPr>
+            <a:r>
+              <a:rPr lang="de-DE" sz="1800" b="1" dirty="0"/>
+              <a:t>(iii) </a:t>
+            </a:r>
+            <a:r>
+              <a:rPr lang="de-DE" sz="1800" b="1" dirty="0" err="1"/>
+              <a:t>Accept</a:t>
+            </a:r>
+            <a:r>
+              <a:rPr lang="de-DE" sz="1800" b="1" dirty="0"/>
+              <a:t> </a:t>
+            </a:r>
+            <a:r>
+              <a:rPr lang="de-DE" sz="1800" b="1" dirty="0" err="1"/>
+              <a:t>or</a:t>
+            </a:r>
+            <a:r>
+              <a:rPr lang="de-DE" sz="1800" b="1" dirty="0"/>
+              <a:t> </a:t>
+            </a:r>
+            <a:r>
+              <a:rPr lang="de-DE" sz="1800" b="1" dirty="0" err="1"/>
+              <a:t>Reject</a:t>
+            </a:r>
+            <a:r>
+              <a:rPr lang="de-DE" sz="1800" b="1" dirty="0"/>
+              <a:t>:</a:t>
+            </a:r>
+          </a:p>
+          <a:p>
+            <a:pPr marL="457200" lvl="1" indent="0">
+              <a:buNone/>
+            </a:pPr>
+            <a:r>
+              <a:rPr lang="de-DE" sz="1800" dirty="0"/>
+              <a:t>Mit Wahrscheinlichkeit </a:t>
+            </a:r>
+            <a:r>
+              <a:rPr lang="el-GR" sz="1800" dirty="0">
+                <a:effectLst/>
+                <a:latin typeface="u0000"/>
+              </a:rPr>
+              <a:t>α</a:t>
+            </a:r>
+            <a:r>
+              <a:rPr lang="de-DE" sz="1800" dirty="0"/>
+              <a:t> setze </a:t>
+            </a:r>
+            <a:r>
+              <a:rPr lang="de-DE" sz="1800" dirty="0" err="1"/>
+              <a:t>x</a:t>
+            </a:r>
+            <a:r>
+              <a:rPr lang="de-DE" sz="1800" baseline="-25000" dirty="0" err="1"/>
+              <a:t>n</a:t>
+            </a:r>
+            <a:r>
+              <a:rPr lang="de-DE" sz="1800" baseline="-25000" dirty="0"/>
+              <a:t> </a:t>
+            </a:r>
+            <a:r>
+              <a:rPr lang="de-DE" sz="1800" dirty="0"/>
+              <a:t>= x̂, sonst </a:t>
+            </a:r>
+            <a:r>
+              <a:rPr lang="de-DE" sz="1800" dirty="0" err="1"/>
+              <a:t>x</a:t>
+            </a:r>
+            <a:r>
+              <a:rPr lang="de-DE" sz="1800" baseline="-25000" dirty="0" err="1"/>
+              <a:t>n</a:t>
+            </a:r>
+            <a:r>
+              <a:rPr lang="de-DE" sz="1800" baseline="-25000" dirty="0"/>
+              <a:t> </a:t>
+            </a:r>
+            <a:r>
+              <a:rPr lang="de-DE" sz="1800" dirty="0"/>
+              <a:t>= x</a:t>
+            </a:r>
+            <a:r>
+              <a:rPr lang="de-DE" sz="1800" baseline="-25000" dirty="0"/>
+              <a:t>n-1</a:t>
+            </a:r>
+            <a:endParaRPr lang="de-DE" sz="1800" dirty="0"/>
+          </a:p>
+          <a:p>
+            <a:pPr marL="457200" lvl="1" indent="0">
+              <a:buNone/>
+            </a:pPr>
+            <a:r>
+              <a:rPr lang="de-DE" sz="1800" dirty="0"/>
+              <a:t>(iv) Wiederhole (i) – (iii) n-mal, um Stichproben x</a:t>
+            </a:r>
+            <a:r>
+              <a:rPr lang="de-DE" sz="1800" baseline="-25000" dirty="0"/>
+              <a:t>1</a:t>
+            </a:r>
+            <a:r>
+              <a:rPr lang="de-DE" sz="1800" dirty="0"/>
+              <a:t>,…, </a:t>
+            </a:r>
+            <a:r>
+              <a:rPr lang="de-DE" sz="1800" dirty="0" err="1"/>
+              <a:t>x</a:t>
+            </a:r>
+            <a:r>
+              <a:rPr lang="de-DE" sz="1800" baseline="-25000" dirty="0" err="1"/>
+              <a:t>n</a:t>
+            </a:r>
+            <a:r>
+              <a:rPr lang="de-DE" sz="1800" dirty="0"/>
+              <a:t> zu generieren</a:t>
+            </a:r>
+          </a:p>
+        </p:txBody>
+      </p:sp>
+      <p:pic>
+        <p:nvPicPr>
+          <p:cNvPr id="4" name="Grafik 3">
+            <a:extLst>
+              <a:ext uri="{FF2B5EF4-FFF2-40B4-BE49-F238E27FC236}">
+                <a16:creationId xmlns:a16="http://schemas.microsoft.com/office/drawing/2014/main" id="{18633736-D6A8-7CC3-4901-C78855AF318F}"/>
+              </a:ext>
+            </a:extLst>
+          </p:cNvPr>
+          <p:cNvPicPr>
+            <a:picLocks noChangeAspect="1"/>
+          </p:cNvPicPr>
+          <p:nvPr/>
+        </p:nvPicPr>
+        <p:blipFill>
+          <a:blip r:embed="rId3"/>
+          <a:stretch>
+            <a:fillRect/>
+          </a:stretch>
+        </p:blipFill>
+        <p:spPr>
+          <a:xfrm>
+            <a:off x="838200" y="6083243"/>
+            <a:ext cx="2057687" cy="409632"/>
+          </a:xfrm>
+          <a:prstGeom prst="rect">
+            <a:avLst/>
+          </a:prstGeom>
+        </p:spPr>
+      </p:pic>
+      <p:sp>
+        <p:nvSpPr>
+          <p:cNvPr id="6" name="Textfeld 5">
+            <a:extLst>
+              <a:ext uri="{FF2B5EF4-FFF2-40B4-BE49-F238E27FC236}">
+                <a16:creationId xmlns:a16="http://schemas.microsoft.com/office/drawing/2014/main" id="{A57457D9-40CA-D7F9-D030-98BF7BD55BA1}"/>
+              </a:ext>
+            </a:extLst>
+          </p:cNvPr>
+          <p:cNvSpPr txBox="1"/>
+          <p:nvPr/>
+        </p:nvSpPr>
+        <p:spPr>
+          <a:xfrm>
+            <a:off x="7832035" y="1787329"/>
+            <a:ext cx="3796748" cy="5262979"/>
+          </a:xfrm>
+          <a:prstGeom prst="rect">
+            <a:avLst/>
+          </a:prstGeom>
+          <a:noFill/>
+        </p:spPr>
+        <p:txBody>
+          <a:bodyPr wrap="square" rtlCol="0">
+            <a:spAutoFit/>
+          </a:bodyPr>
+          <a:lstStyle/>
+          <a:p>
+            <a:r>
+              <a:rPr lang="de-DE" sz="2400" b="1" dirty="0"/>
+              <a:t>Intuition:</a:t>
+            </a:r>
+          </a:p>
+          <a:p>
+            <a:r>
+              <a:rPr lang="de-DE" sz="2400" b="1" dirty="0"/>
+              <a:t>(i) </a:t>
+            </a:r>
+            <a:r>
+              <a:rPr lang="de-DE" sz="2400" b="1" dirty="0" err="1"/>
+              <a:t>Propose</a:t>
+            </a:r>
+            <a:r>
+              <a:rPr lang="de-DE" sz="2400" b="1" dirty="0"/>
+              <a:t>:</a:t>
+            </a:r>
+          </a:p>
+          <a:p>
+            <a:r>
+              <a:rPr lang="de-DE" sz="2400" dirty="0"/>
+              <a:t>Schlage einen neuen Punkt in der Nähe des vorherigen Punktes vor, die Varianz (10) bestimmt „wie nah“ am alten Punkt</a:t>
+            </a:r>
+          </a:p>
+          <a:p>
+            <a:r>
+              <a:rPr lang="de-DE" sz="2400" b="1" dirty="0"/>
+              <a:t>(ii) </a:t>
+            </a:r>
+            <a:r>
+              <a:rPr lang="de-DE" sz="2400" b="1" dirty="0" err="1"/>
+              <a:t>Accept</a:t>
+            </a:r>
+            <a:r>
+              <a:rPr lang="de-DE" sz="2400" b="1" dirty="0"/>
+              <a:t> </a:t>
+            </a:r>
+            <a:r>
+              <a:rPr lang="de-DE" sz="2400" b="1" dirty="0" err="1"/>
+              <a:t>or</a:t>
+            </a:r>
+            <a:r>
+              <a:rPr lang="de-DE" sz="2400" b="1" dirty="0"/>
+              <a:t> </a:t>
+            </a:r>
+            <a:r>
+              <a:rPr lang="de-DE" sz="2400" b="1" dirty="0" err="1"/>
+              <a:t>Reject</a:t>
+            </a:r>
+            <a:r>
+              <a:rPr lang="de-DE" sz="2400" b="1" dirty="0"/>
+              <a:t>:</a:t>
+            </a:r>
+          </a:p>
+          <a:p>
+            <a:r>
+              <a:rPr lang="de-DE" sz="2400" dirty="0"/>
+              <a:t>Nehme </a:t>
+            </a:r>
+            <a:r>
+              <a:rPr lang="de-DE" sz="2400" u="sng" dirty="0"/>
+              <a:t>immer</a:t>
+            </a:r>
+            <a:r>
+              <a:rPr lang="de-DE" sz="2400" dirty="0"/>
+              <a:t> wahrscheinlichere Punkte und </a:t>
+            </a:r>
+            <a:r>
+              <a:rPr lang="de-DE" sz="2400" u="sng" dirty="0"/>
+              <a:t>manchmal </a:t>
+            </a:r>
+            <a:r>
+              <a:rPr lang="de-DE" sz="2400" dirty="0"/>
+              <a:t>weniger wahrscheinliche Punkte (</a:t>
+            </a:r>
+            <a:r>
+              <a:rPr lang="de-DE" sz="2400" dirty="0" err="1"/>
+              <a:t>exploration</a:t>
+            </a:r>
+            <a:r>
+              <a:rPr lang="de-DE" sz="2400" dirty="0"/>
+              <a:t> vs. </a:t>
+            </a:r>
+            <a:r>
+              <a:rPr lang="de-DE" sz="2400" dirty="0" err="1"/>
+              <a:t>exploitation</a:t>
+            </a:r>
+            <a:r>
+              <a:rPr lang="de-DE" sz="2400" dirty="0"/>
+              <a:t>)</a:t>
+            </a:r>
+            <a:endParaRPr lang="de-DE" sz="2400" u="sng" dirty="0"/>
+          </a:p>
+          <a:p>
+            <a:endParaRPr lang="de-DE" sz="2400" dirty="0"/>
+          </a:p>
+        </p:txBody>
+      </p:sp>
+    </p:spTree>
+    <p:extLst>
+      <p:ext uri="{BB962C8B-B14F-4D97-AF65-F5344CB8AC3E}">
+        <p14:creationId xmlns:p14="http://schemas.microsoft.com/office/powerpoint/2010/main" val="1500261015"/>
+      </p:ext>
+    </p:extLst>
+  </p:cSld>
+  <p:clrMapOvr>
+    <a:masterClrMapping/>
+  </p:clrMapOvr>
+  <p:extLst>
+    <p:ext uri="{6950BFC3-D8DA-4A85-94F7-54DA5524770B}">
+      <p188:commentRel xmlns:p188="http://schemas.microsoft.com/office/powerpoint/2018/8/main" r:id="rId2"/>
+    </p:ext>
+  </p:extLst>
+</p:sld>
+</file>
+
+<file path=ppt/slides/slide13.xml><?xml version="1.0" encoding="utf-8"?>
+<p:sld xmlns:a="http://schemas.openxmlformats.org/drawingml/2006/main" xmlns:r="http://schemas.openxmlformats.org/officeDocument/2006/relationships" xmlns:p="http://schemas.openxmlformats.org/presentationml/2006/main">
+  <p:cSld>
+    <p:spTree>
+      <p:nvGrpSpPr>
+        <p:cNvPr id="1" name=""/>
+        <p:cNvGrpSpPr/>
+        <p:nvPr/>
+      </p:nvGrpSpPr>
+      <p:grpSpPr>
+        <a:xfrm>
+          <a:off x="0" y="0"/>
+          <a:ext cx="0" cy="0"/>
+          <a:chOff x="0" y="0"/>
+          <a:chExt cx="0" cy="0"/>
+        </a:xfrm>
+      </p:grpSpPr>
+      <p:sp>
+        <p:nvSpPr>
+          <p:cNvPr id="2" name="Titel 1">
+            <a:extLst>
+              <a:ext uri="{FF2B5EF4-FFF2-40B4-BE49-F238E27FC236}">
+                <a16:creationId xmlns:a16="http://schemas.microsoft.com/office/drawing/2014/main" id="{2E6BC7E1-A156-9D7E-460C-E68BF34680AC}"/>
+              </a:ext>
+            </a:extLst>
+          </p:cNvPr>
+          <p:cNvSpPr>
+            <a:spLocks noGrp="1"/>
+          </p:cNvSpPr>
+          <p:nvPr>
+            <p:ph type="title"/>
+          </p:nvPr>
+        </p:nvSpPr>
+        <p:spPr/>
+        <p:txBody>
+          <a:bodyPr/>
+          <a:lstStyle/>
+          <a:p>
+            <a:r>
+              <a:rPr lang="de-DE" dirty="0">
+                <a:solidFill>
+                  <a:srgbClr val="5C739C"/>
+                </a:solidFill>
+              </a:rPr>
               <a:t>Der Metropolis Hastings Algorithmus (MH)</a:t>
             </a:r>
           </a:p>
@@ -5249,7 +5827,7 @@
 </p:sld>
 </file>
 
-<file path=ppt/slides/slide13.xml><?xml version="1.0" encoding="utf-8"?>
+<file path=ppt/slides/slide14.xml><?xml version="1.0" encoding="utf-8"?>
 <p:sld xmlns:a="http://schemas.openxmlformats.org/drawingml/2006/main" xmlns:r="http://schemas.openxmlformats.org/officeDocument/2006/relationships" xmlns:p="http://schemas.openxmlformats.org/presentationml/2006/main">
   <p:cSld>
     <p:spTree>
@@ -5431,7 +6009,7 @@
 </p:sld>
 </file>
 
-<file path=ppt/slides/slide14.xml><?xml version="1.0" encoding="utf-8"?>
+<file path=ppt/slides/slide15.xml><?xml version="1.0" encoding="utf-8"?>
 <p:sld xmlns:a="http://schemas.openxmlformats.org/drawingml/2006/main" xmlns:r="http://schemas.openxmlformats.org/officeDocument/2006/relationships" xmlns:p="http://schemas.openxmlformats.org/presentationml/2006/main">
   <p:cSld>
     <p:spTree>
@@ -5765,6 +6343,42 @@
           </a:prstGeom>
         </p:spPr>
       </p:pic>
+      <p:pic>
+        <p:nvPicPr>
+          <p:cNvPr id="6" name="Grafik 5">
+            <a:extLst>
+              <a:ext uri="{FF2B5EF4-FFF2-40B4-BE49-F238E27FC236}">
+                <a16:creationId xmlns:a16="http://schemas.microsoft.com/office/drawing/2014/main" id="{2F95AD0A-E591-8208-915A-7E405A6D4C4E}"/>
+              </a:ext>
+            </a:extLst>
+          </p:cNvPr>
+          <p:cNvPicPr>
+            <a:picLocks noChangeAspect="1"/>
+          </p:cNvPicPr>
+          <p:nvPr/>
+        </p:nvPicPr>
+        <p:blipFill>
+          <a:blip r:embed="rId5">
+            <a:extLst>
+              <a:ext uri="{28A0092B-C50C-407E-A947-70E740481C1C}">
+                <a14:useLocalDpi xmlns:a14="http://schemas.microsoft.com/office/drawing/2010/main" val="0"/>
+              </a:ext>
+            </a:extLst>
+          </a:blip>
+          <a:stretch>
+            <a:fillRect/>
+          </a:stretch>
+        </p:blipFill>
+        <p:spPr>
+          <a:xfrm>
+            <a:off x="8772525" y="3199408"/>
+            <a:ext cx="2581275" cy="1451967"/>
+          </a:xfrm>
+          <a:prstGeom prst="rect">
+            <a:avLst/>
+          </a:prstGeom>
+        </p:spPr>
+      </p:pic>
     </p:spTree>
     <p:extLst>
       <p:ext uri="{BB962C8B-B14F-4D97-AF65-F5344CB8AC3E}">
@@ -5783,7 +6397,7 @@
 </p:sld>
 </file>
 
-<file path=ppt/slides/slide15.xml><?xml version="1.0" encoding="utf-8"?>
+<file path=ppt/slides/slide16.xml><?xml version="1.0" encoding="utf-8"?>
 <p:sld xmlns:a="http://schemas.openxmlformats.org/drawingml/2006/main" xmlns:r="http://schemas.openxmlformats.org/officeDocument/2006/relationships" xmlns:p="http://schemas.openxmlformats.org/presentationml/2006/main">
   <p:cSld>
     <p:spTree>
@@ -6058,7 +6672,7 @@
 </p:sld>
 </file>
 
-<file path=ppt/slides/slide16.xml><?xml version="1.0" encoding="utf-8"?>
+<file path=ppt/slides/slide17.xml><?xml version="1.0" encoding="utf-8"?>
 <p:sld xmlns:a="http://schemas.openxmlformats.org/drawingml/2006/main" xmlns:r="http://schemas.openxmlformats.org/officeDocument/2006/relationships" xmlns:p="http://schemas.openxmlformats.org/presentationml/2006/main">
   <p:cSld>
     <p:spTree>
@@ -6473,7 +7087,7 @@
 </p:sld>
 </file>
 
-<file path=ppt/slides/slide17.xml><?xml version="1.0" encoding="utf-8"?>
+<file path=ppt/slides/slide18.xml><?xml version="1.0" encoding="utf-8"?>
 <p:sld xmlns:a="http://schemas.openxmlformats.org/drawingml/2006/main" xmlns:r="http://schemas.openxmlformats.org/officeDocument/2006/relationships" xmlns:p="http://schemas.openxmlformats.org/presentationml/2006/main">
   <p:cSld>
     <p:spTree>
@@ -6757,7 +7371,7 @@
 </p:sld>
 </file>
 
-<file path=ppt/slides/slide18.xml><?xml version="1.0" encoding="utf-8"?>
+<file path=ppt/slides/slide19.xml><?xml version="1.0" encoding="utf-8"?>
 <p:sld xmlns:a="http://schemas.openxmlformats.org/drawingml/2006/main" xmlns:r="http://schemas.openxmlformats.org/officeDocument/2006/relationships" xmlns:p="http://schemas.openxmlformats.org/presentationml/2006/main">
   <p:cSld>
     <p:spTree>
@@ -7030,195 +7644,6 @@
     <p:extLst>
       <p:ext uri="{BB962C8B-B14F-4D97-AF65-F5344CB8AC3E}">
         <p14:creationId xmlns:p14="http://schemas.microsoft.com/office/powerpoint/2010/main" val="1776766607"/>
-      </p:ext>
-    </p:extLst>
-  </p:cSld>
-  <p:clrMapOvr>
-    <a:masterClrMapping/>
-  </p:clrMapOvr>
-</p:sld>
-</file>
-
-<file path=ppt/slides/slide19.xml><?xml version="1.0" encoding="utf-8"?>
-<p:sld xmlns:a="http://schemas.openxmlformats.org/drawingml/2006/main" xmlns:r="http://schemas.openxmlformats.org/officeDocument/2006/relationships" xmlns:p="http://schemas.openxmlformats.org/presentationml/2006/main">
-  <p:cSld>
-    <p:spTree>
-      <p:nvGrpSpPr>
-        <p:cNvPr id="1" name=""/>
-        <p:cNvGrpSpPr/>
-        <p:nvPr/>
-      </p:nvGrpSpPr>
-      <p:grpSpPr>
-        <a:xfrm>
-          <a:off x="0" y="0"/>
-          <a:ext cx="0" cy="0"/>
-          <a:chOff x="0" y="0"/>
-          <a:chExt cx="0" cy="0"/>
-        </a:xfrm>
-      </p:grpSpPr>
-      <p:sp>
-        <p:nvSpPr>
-          <p:cNvPr id="2" name="Titel 1">
-            <a:extLst>
-              <a:ext uri="{FF2B5EF4-FFF2-40B4-BE49-F238E27FC236}">
-                <a16:creationId xmlns:a16="http://schemas.microsoft.com/office/drawing/2014/main" id="{2E6BC7E1-A156-9D7E-460C-E68BF34680AC}"/>
-              </a:ext>
-            </a:extLst>
-          </p:cNvPr>
-          <p:cNvSpPr>
-            <a:spLocks noGrp="1"/>
-          </p:cNvSpPr>
-          <p:nvPr>
-            <p:ph type="title"/>
-          </p:nvPr>
-        </p:nvSpPr>
-        <p:spPr/>
-        <p:txBody>
-          <a:bodyPr/>
-          <a:lstStyle/>
-          <a:p>
-            <a:r>
-              <a:rPr lang="de-DE" dirty="0" err="1">
-                <a:solidFill>
-                  <a:srgbClr val="5C739C"/>
-                </a:solidFill>
-              </a:rPr>
-              <a:t>Hamiltonian</a:t>
-            </a:r>
-            <a:r>
-              <a:rPr lang="de-DE" dirty="0">
-                <a:solidFill>
-                  <a:srgbClr val="5C739C"/>
-                </a:solidFill>
-              </a:rPr>
-              <a:t> Monte Carlo (HMC)</a:t>
-            </a:r>
-          </a:p>
-        </p:txBody>
-      </p:sp>
-      <p:sp>
-        <p:nvSpPr>
-          <p:cNvPr id="3" name="Inhaltsplatzhalter 2">
-            <a:extLst>
-              <a:ext uri="{FF2B5EF4-FFF2-40B4-BE49-F238E27FC236}">
-                <a16:creationId xmlns:a16="http://schemas.microsoft.com/office/drawing/2014/main" id="{232E5703-9081-45BF-35E8-3E0D697B74CF}"/>
-              </a:ext>
-            </a:extLst>
-          </p:cNvPr>
-          <p:cNvSpPr>
-            <a:spLocks noGrp="1"/>
-          </p:cNvSpPr>
-          <p:nvPr>
-            <p:ph idx="1"/>
-          </p:nvPr>
-        </p:nvSpPr>
-        <p:spPr/>
-        <p:txBody>
-          <a:bodyPr>
-            <a:normAutofit/>
-          </a:bodyPr>
-          <a:lstStyle/>
-          <a:p>
-            <a:r>
-              <a:rPr lang="de-DE" sz="2600" dirty="0">
-                <a:sym typeface="Wingdings" panose="05000000000000000000" pitchFamily="2" charset="2"/>
-              </a:rPr>
-              <a:t>Idee: benutze MALA, aber mache mehrere Schritte auf einmal, um ein </a:t>
-            </a:r>
-            <a:r>
-              <a:rPr lang="de-DE" sz="2600" dirty="0" err="1">
-                <a:sym typeface="Wingdings" panose="05000000000000000000" pitchFamily="2" charset="2"/>
-              </a:rPr>
-              <a:t>Proposal</a:t>
-            </a:r>
-            <a:r>
-              <a:rPr lang="de-DE" sz="2600" dirty="0">
-                <a:sym typeface="Wingdings" panose="05000000000000000000" pitchFamily="2" charset="2"/>
-              </a:rPr>
-              <a:t> zu generieren  weniger Korrelation zwischen </a:t>
-            </a:r>
-            <a:r>
-              <a:rPr lang="de-DE" sz="2600" dirty="0" err="1">
-                <a:sym typeface="Wingdings" panose="05000000000000000000" pitchFamily="2" charset="2"/>
-              </a:rPr>
-              <a:t>states</a:t>
-            </a:r>
-            <a:r>
-              <a:rPr lang="de-DE" sz="2600" dirty="0">
-                <a:sym typeface="Wingdings" panose="05000000000000000000" pitchFamily="2" charset="2"/>
-              </a:rPr>
-              <a:t>, aber gleichzeitig hohe Annahmewahrscheinlichkeit.</a:t>
-            </a:r>
-          </a:p>
-          <a:p>
-            <a:r>
-              <a:rPr lang="de-DE" sz="2600" dirty="0">
-                <a:sym typeface="Wingdings" panose="05000000000000000000" pitchFamily="2" charset="2"/>
-              </a:rPr>
-              <a:t>Wie kann ich mehrere Schritte auf einmal durchführen? Hamilton </a:t>
-            </a:r>
-            <a:r>
-              <a:rPr lang="de-DE" sz="2600" dirty="0" err="1">
-                <a:sym typeface="Wingdings" panose="05000000000000000000" pitchFamily="2" charset="2"/>
-              </a:rPr>
-              <a:t>Equations</a:t>
-            </a:r>
-            <a:endParaRPr lang="de-DE" sz="2600" dirty="0">
-              <a:sym typeface="Wingdings" panose="05000000000000000000" pitchFamily="2" charset="2"/>
-            </a:endParaRPr>
-          </a:p>
-          <a:p>
-            <a:pPr marL="0" indent="0">
-              <a:buNone/>
-            </a:pPr>
-            <a:endParaRPr lang="de-DE" sz="2400" dirty="0">
-              <a:sym typeface="Wingdings" panose="05000000000000000000" pitchFamily="2" charset="2"/>
-            </a:endParaRPr>
-          </a:p>
-          <a:p>
-            <a:pPr marL="0" indent="0">
-              <a:buNone/>
-            </a:pPr>
-            <a:endParaRPr lang="de-DE" sz="2600" dirty="0">
-              <a:sym typeface="Wingdings" panose="05000000000000000000" pitchFamily="2" charset="2"/>
-            </a:endParaRPr>
-          </a:p>
-        </p:txBody>
-      </p:sp>
-      <p:pic>
-        <p:nvPicPr>
-          <p:cNvPr id="4" name="Grafik 3">
-            <a:extLst>
-              <a:ext uri="{FF2B5EF4-FFF2-40B4-BE49-F238E27FC236}">
-                <a16:creationId xmlns:a16="http://schemas.microsoft.com/office/drawing/2014/main" id="{A377294C-2138-605B-783B-EA718DC87D30}"/>
-              </a:ext>
-            </a:extLst>
-          </p:cNvPr>
-          <p:cNvPicPr>
-            <a:picLocks noChangeAspect="1"/>
-          </p:cNvPicPr>
-          <p:nvPr/>
-        </p:nvPicPr>
-        <p:blipFill>
-          <a:blip r:embed="rId2"/>
-          <a:stretch>
-            <a:fillRect/>
-          </a:stretch>
-        </p:blipFill>
-        <p:spPr>
-          <a:xfrm>
-            <a:off x="838200" y="6083243"/>
-            <a:ext cx="2057687" cy="409632"/>
-          </a:xfrm>
-          <a:prstGeom prst="rect">
-            <a:avLst/>
-          </a:prstGeom>
-        </p:spPr>
-      </p:pic>
-    </p:spTree>
-    <p:extLst>
-      <p:ext uri="{BB962C8B-B14F-4D97-AF65-F5344CB8AC3E}">
-        <p14:creationId xmlns:p14="http://schemas.microsoft.com/office/powerpoint/2010/main" val="3709066685"/>
       </p:ext>
     </p:extLst>
   </p:cSld>
@@ -7425,6 +7850,195 @@
           <a:lstStyle/>
           <a:p>
             <a:r>
+              <a:rPr lang="de-DE" dirty="0" err="1">
+                <a:solidFill>
+                  <a:srgbClr val="5C739C"/>
+                </a:solidFill>
+              </a:rPr>
+              <a:t>Hamiltonian</a:t>
+            </a:r>
+            <a:r>
+              <a:rPr lang="de-DE" dirty="0">
+                <a:solidFill>
+                  <a:srgbClr val="5C739C"/>
+                </a:solidFill>
+              </a:rPr>
+              <a:t> Monte Carlo (HMC)</a:t>
+            </a:r>
+          </a:p>
+        </p:txBody>
+      </p:sp>
+      <p:sp>
+        <p:nvSpPr>
+          <p:cNvPr id="3" name="Inhaltsplatzhalter 2">
+            <a:extLst>
+              <a:ext uri="{FF2B5EF4-FFF2-40B4-BE49-F238E27FC236}">
+                <a16:creationId xmlns:a16="http://schemas.microsoft.com/office/drawing/2014/main" id="{232E5703-9081-45BF-35E8-3E0D697B74CF}"/>
+              </a:ext>
+            </a:extLst>
+          </p:cNvPr>
+          <p:cNvSpPr>
+            <a:spLocks noGrp="1"/>
+          </p:cNvSpPr>
+          <p:nvPr>
+            <p:ph idx="1"/>
+          </p:nvPr>
+        </p:nvSpPr>
+        <p:spPr/>
+        <p:txBody>
+          <a:bodyPr>
+            <a:normAutofit/>
+          </a:bodyPr>
+          <a:lstStyle/>
+          <a:p>
+            <a:r>
+              <a:rPr lang="de-DE" sz="2600" dirty="0">
+                <a:sym typeface="Wingdings" panose="05000000000000000000" pitchFamily="2" charset="2"/>
+              </a:rPr>
+              <a:t>Idee: benutze MALA, aber mache mehrere Schritte auf einmal, um ein </a:t>
+            </a:r>
+            <a:r>
+              <a:rPr lang="de-DE" sz="2600" dirty="0" err="1">
+                <a:sym typeface="Wingdings" panose="05000000000000000000" pitchFamily="2" charset="2"/>
+              </a:rPr>
+              <a:t>Proposal</a:t>
+            </a:r>
+            <a:r>
+              <a:rPr lang="de-DE" sz="2600" dirty="0">
+                <a:sym typeface="Wingdings" panose="05000000000000000000" pitchFamily="2" charset="2"/>
+              </a:rPr>
+              <a:t> zu generieren  weniger Korrelation zwischen </a:t>
+            </a:r>
+            <a:r>
+              <a:rPr lang="de-DE" sz="2600" dirty="0" err="1">
+                <a:sym typeface="Wingdings" panose="05000000000000000000" pitchFamily="2" charset="2"/>
+              </a:rPr>
+              <a:t>states</a:t>
+            </a:r>
+            <a:r>
+              <a:rPr lang="de-DE" sz="2600" dirty="0">
+                <a:sym typeface="Wingdings" panose="05000000000000000000" pitchFamily="2" charset="2"/>
+              </a:rPr>
+              <a:t>, aber gleichzeitig hohe Annahmewahrscheinlichkeit.</a:t>
+            </a:r>
+          </a:p>
+          <a:p>
+            <a:r>
+              <a:rPr lang="de-DE" sz="2600" dirty="0">
+                <a:sym typeface="Wingdings" panose="05000000000000000000" pitchFamily="2" charset="2"/>
+              </a:rPr>
+              <a:t>Wie kann ich mehrere Schritte auf einmal durchführen? Hamilton </a:t>
+            </a:r>
+            <a:r>
+              <a:rPr lang="de-DE" sz="2600" dirty="0" err="1">
+                <a:sym typeface="Wingdings" panose="05000000000000000000" pitchFamily="2" charset="2"/>
+              </a:rPr>
+              <a:t>Equations</a:t>
+            </a:r>
+            <a:endParaRPr lang="de-DE" sz="2600" dirty="0">
+              <a:sym typeface="Wingdings" panose="05000000000000000000" pitchFamily="2" charset="2"/>
+            </a:endParaRPr>
+          </a:p>
+          <a:p>
+            <a:pPr marL="0" indent="0">
+              <a:buNone/>
+            </a:pPr>
+            <a:endParaRPr lang="de-DE" sz="2400" dirty="0">
+              <a:sym typeface="Wingdings" panose="05000000000000000000" pitchFamily="2" charset="2"/>
+            </a:endParaRPr>
+          </a:p>
+          <a:p>
+            <a:pPr marL="0" indent="0">
+              <a:buNone/>
+            </a:pPr>
+            <a:endParaRPr lang="de-DE" sz="2600" dirty="0">
+              <a:sym typeface="Wingdings" panose="05000000000000000000" pitchFamily="2" charset="2"/>
+            </a:endParaRPr>
+          </a:p>
+        </p:txBody>
+      </p:sp>
+      <p:pic>
+        <p:nvPicPr>
+          <p:cNvPr id="4" name="Grafik 3">
+            <a:extLst>
+              <a:ext uri="{FF2B5EF4-FFF2-40B4-BE49-F238E27FC236}">
+                <a16:creationId xmlns:a16="http://schemas.microsoft.com/office/drawing/2014/main" id="{A377294C-2138-605B-783B-EA718DC87D30}"/>
+              </a:ext>
+            </a:extLst>
+          </p:cNvPr>
+          <p:cNvPicPr>
+            <a:picLocks noChangeAspect="1"/>
+          </p:cNvPicPr>
+          <p:nvPr/>
+        </p:nvPicPr>
+        <p:blipFill>
+          <a:blip r:embed="rId2"/>
+          <a:stretch>
+            <a:fillRect/>
+          </a:stretch>
+        </p:blipFill>
+        <p:spPr>
+          <a:xfrm>
+            <a:off x="838200" y="6083243"/>
+            <a:ext cx="2057687" cy="409632"/>
+          </a:xfrm>
+          <a:prstGeom prst="rect">
+            <a:avLst/>
+          </a:prstGeom>
+        </p:spPr>
+      </p:pic>
+    </p:spTree>
+    <p:extLst>
+      <p:ext uri="{BB962C8B-B14F-4D97-AF65-F5344CB8AC3E}">
+        <p14:creationId xmlns:p14="http://schemas.microsoft.com/office/powerpoint/2010/main" val="3709066685"/>
+      </p:ext>
+    </p:extLst>
+  </p:cSld>
+  <p:clrMapOvr>
+    <a:masterClrMapping/>
+  </p:clrMapOvr>
+</p:sld>
+</file>
+
+<file path=ppt/slides/slide21.xml><?xml version="1.0" encoding="utf-8"?>
+<p:sld xmlns:a="http://schemas.openxmlformats.org/drawingml/2006/main" xmlns:r="http://schemas.openxmlformats.org/officeDocument/2006/relationships" xmlns:p="http://schemas.openxmlformats.org/presentationml/2006/main">
+  <p:cSld>
+    <p:spTree>
+      <p:nvGrpSpPr>
+        <p:cNvPr id="1" name=""/>
+        <p:cNvGrpSpPr/>
+        <p:nvPr/>
+      </p:nvGrpSpPr>
+      <p:grpSpPr>
+        <a:xfrm>
+          <a:off x="0" y="0"/>
+          <a:ext cx="0" cy="0"/>
+          <a:chOff x="0" y="0"/>
+          <a:chExt cx="0" cy="0"/>
+        </a:xfrm>
+      </p:grpSpPr>
+      <p:sp>
+        <p:nvSpPr>
+          <p:cNvPr id="2" name="Titel 1">
+            <a:extLst>
+              <a:ext uri="{FF2B5EF4-FFF2-40B4-BE49-F238E27FC236}">
+                <a16:creationId xmlns:a16="http://schemas.microsoft.com/office/drawing/2014/main" id="{2E6BC7E1-A156-9D7E-460C-E68BF34680AC}"/>
+              </a:ext>
+            </a:extLst>
+          </p:cNvPr>
+          <p:cNvSpPr>
+            <a:spLocks noGrp="1"/>
+          </p:cNvSpPr>
+          <p:nvPr>
+            <p:ph type="title"/>
+          </p:nvPr>
+        </p:nvSpPr>
+        <p:spPr/>
+        <p:txBody>
+          <a:bodyPr/>
+          <a:lstStyle/>
+          <a:p>
+            <a:r>
               <a:rPr lang="de-DE" dirty="0">
                 <a:solidFill>
                   <a:srgbClr val="5C739C"/>
@@ -7561,7 +8175,7 @@
 </p:sld>
 </file>
 
-<file path=ppt/slides/slide21.xml><?xml version="1.0" encoding="utf-8"?>
+<file path=ppt/slides/slide22.xml><?xml version="1.0" encoding="utf-8"?>
 <p:sld xmlns:a="http://schemas.openxmlformats.org/drawingml/2006/main" xmlns:r="http://schemas.openxmlformats.org/officeDocument/2006/relationships" xmlns:p="http://schemas.openxmlformats.org/presentationml/2006/main">
   <p:cSld>
     <p:spTree>
@@ -7610,8 +8224,8 @@
           </a:p>
         </p:txBody>
       </p:sp>
-      <mc:AlternateContent xmlns:mc="http://schemas.openxmlformats.org/markup-compatibility/2006" xmlns:a14="http://schemas.microsoft.com/office/drawing/2010/main">
-        <mc:Choice Requires="a14">
+      <mc:AlternateContent xmlns:mc="http://schemas.openxmlformats.org/markup-compatibility/2006">
+        <mc:Choice xmlns:a14="http://schemas.microsoft.com/office/drawing/2010/main" Requires="a14">
           <p:sp>
             <p:nvSpPr>
               <p:cNvPr id="3" name="Inhaltsplatzhalter 2">
@@ -7628,10 +8242,15 @@
                 <p:ph idx="1"/>
               </p:nvPr>
             </p:nvSpPr>
-            <p:spPr/>
+            <p:spPr>
+              <a:xfrm>
+                <a:off x="838200" y="1825625"/>
+                <a:ext cx="6962775" cy="4351338"/>
+              </a:xfrm>
+            </p:spPr>
             <p:txBody>
               <a:bodyPr>
-                <a:normAutofit/>
+                <a:normAutofit lnSpcReduction="10000"/>
               </a:bodyPr>
               <a:lstStyle/>
               <a:p>
@@ -8070,27 +8689,14 @@
                   <a:rPr lang="de-DE" sz="2600" dirty="0"/>
                   <a:t> an/ lehne es ab wie in MH</a:t>
                 </a:r>
-              </a:p>
-              <a:p>
-                <a:pPr marL="0" indent="0">
-                  <a:buNone/>
-                </a:pPr>
                 <a:endParaRPr lang="de-DE" sz="2400" dirty="0">
-                  <a:sym typeface="Wingdings" panose="05000000000000000000" pitchFamily="2" charset="2"/>
-                </a:endParaRPr>
-              </a:p>
-              <a:p>
-                <a:pPr marL="0" indent="0">
-                  <a:buNone/>
-                </a:pPr>
-                <a:endParaRPr lang="de-DE" sz="2600" dirty="0">
                   <a:sym typeface="Wingdings" panose="05000000000000000000" pitchFamily="2" charset="2"/>
                 </a:endParaRPr>
               </a:p>
             </p:txBody>
           </p:sp>
         </mc:Choice>
-        <mc:Fallback xmlns="">
+        <mc:Fallback>
           <p:sp>
             <p:nvSpPr>
               <p:cNvPr id="3" name="Inhaltsplatzhalter 2">
@@ -8108,10 +8714,14 @@
               </p:nvPr>
             </p:nvSpPr>
             <p:spPr>
+              <a:xfrm>
+                <a:off x="838200" y="1825625"/>
+                <a:ext cx="6962775" cy="4351338"/>
+              </a:xfrm>
               <a:blipFill>
                 <a:blip r:embed="rId2"/>
                 <a:stretch>
-                  <a:fillRect l="-1101" t="-2241"/>
+                  <a:fillRect l="-1664" t="-2941" r="-2189"/>
                 </a:stretch>
               </a:blipFill>
             </p:spPr>
@@ -8160,6 +8770,36 @@
           </a:prstGeom>
         </p:spPr>
       </p:pic>
+      <p:pic>
+        <p:nvPicPr>
+          <p:cNvPr id="6" name="Grafik 5">
+            <a:extLst>
+              <a:ext uri="{FF2B5EF4-FFF2-40B4-BE49-F238E27FC236}">
+                <a16:creationId xmlns:a16="http://schemas.microsoft.com/office/drawing/2014/main" id="{2C9EBE37-FDE2-DC93-C63B-4E8CE8B1FBE4}"/>
+              </a:ext>
+            </a:extLst>
+          </p:cNvPr>
+          <p:cNvPicPr>
+            <a:picLocks noChangeAspect="1"/>
+          </p:cNvPicPr>
+          <p:nvPr/>
+        </p:nvPicPr>
+        <p:blipFill>
+          <a:blip r:embed="rId4"/>
+          <a:stretch>
+            <a:fillRect/>
+          </a:stretch>
+        </p:blipFill>
+        <p:spPr>
+          <a:xfrm>
+            <a:off x="7495565" y="3309607"/>
+            <a:ext cx="4372585" cy="2367293"/>
+          </a:xfrm>
+          <a:prstGeom prst="rect">
+            <a:avLst/>
+          </a:prstGeom>
+        </p:spPr>
+      </p:pic>
     </p:spTree>
     <p:extLst>
       <p:ext uri="{BB962C8B-B14F-4D97-AF65-F5344CB8AC3E}">
@@ -8173,7 +8813,7 @@
 </p:sld>
 </file>
 
-<file path=ppt/slides/slide22.xml><?xml version="1.0" encoding="utf-8"?>
+<file path=ppt/slides/slide23.xml><?xml version="1.0" encoding="utf-8"?>
 <p:sld xmlns:a="http://schemas.openxmlformats.org/drawingml/2006/main" xmlns:r="http://schemas.openxmlformats.org/officeDocument/2006/relationships" xmlns:p="http://schemas.openxmlformats.org/presentationml/2006/main">
   <p:cSld>
     <p:spTree>
@@ -8656,7 +9296,7 @@
 </p:sld>
 </file>
 
-<file path=ppt/slides/slide23.xml><?xml version="1.0" encoding="utf-8"?>
+<file path=ppt/slides/slide24.xml><?xml version="1.0" encoding="utf-8"?>
 <p:sld xmlns:a="http://schemas.openxmlformats.org/drawingml/2006/main" xmlns:r="http://schemas.openxmlformats.org/officeDocument/2006/relationships" xmlns:p="http://schemas.openxmlformats.org/presentationml/2006/main">
   <p:cSld>
     <p:spTree>
@@ -8912,7 +9552,7 @@
 </p:sld>
 </file>
 
-<file path=ppt/slides/slide24.xml><?xml version="1.0" encoding="utf-8"?>
+<file path=ppt/slides/slide25.xml><?xml version="1.0" encoding="utf-8"?>
 <p:sld xmlns:a="http://schemas.openxmlformats.org/drawingml/2006/main" xmlns:r="http://schemas.openxmlformats.org/officeDocument/2006/relationships" xmlns:p="http://schemas.openxmlformats.org/presentationml/2006/main">
   <p:cSld>
     <p:spTree>
@@ -8993,10 +9633,15 @@
             <p:ph idx="1"/>
           </p:nvPr>
         </p:nvSpPr>
-        <p:spPr/>
+        <p:spPr>
+          <a:xfrm>
+            <a:off x="838200" y="1825625"/>
+            <a:ext cx="7991475" cy="4351338"/>
+          </a:xfrm>
+        </p:spPr>
         <p:txBody>
           <a:bodyPr>
-            <a:normAutofit/>
+            <a:normAutofit lnSpcReduction="10000"/>
           </a:bodyPr>
           <a:lstStyle/>
           <a:p>
@@ -9116,6 +9761,36 @@
           </a:prstGeom>
         </p:spPr>
       </p:pic>
+      <p:pic>
+        <p:nvPicPr>
+          <p:cNvPr id="6" name="Grafik 5">
+            <a:extLst>
+              <a:ext uri="{FF2B5EF4-FFF2-40B4-BE49-F238E27FC236}">
+                <a16:creationId xmlns:a16="http://schemas.microsoft.com/office/drawing/2014/main" id="{DC1B85C2-CD76-6106-997D-DAFF6B9A6E2A}"/>
+              </a:ext>
+            </a:extLst>
+          </p:cNvPr>
+          <p:cNvPicPr>
+            <a:picLocks noChangeAspect="1"/>
+          </p:cNvPicPr>
+          <p:nvPr/>
+        </p:nvPicPr>
+        <p:blipFill>
+          <a:blip r:embed="rId3"/>
+          <a:stretch>
+            <a:fillRect/>
+          </a:stretch>
+        </p:blipFill>
+        <p:spPr>
+          <a:xfrm>
+            <a:off x="8469047" y="1943099"/>
+            <a:ext cx="2969976" cy="3495675"/>
+          </a:xfrm>
+          <a:prstGeom prst="rect">
+            <a:avLst/>
+          </a:prstGeom>
+        </p:spPr>
+      </p:pic>
     </p:spTree>
     <p:extLst>
       <p:ext uri="{BB962C8B-B14F-4D97-AF65-F5344CB8AC3E}">
@@ -9129,7 +9804,7 @@
 </p:sld>
 </file>
 
-<file path=ppt/slides/slide25.xml><?xml version="1.0" encoding="utf-8"?>
+<file path=ppt/slides/slide26.xml><?xml version="1.0" encoding="utf-8"?>
 <p:sld xmlns:a="http://schemas.openxmlformats.org/drawingml/2006/main" xmlns:r="http://schemas.openxmlformats.org/officeDocument/2006/relationships" xmlns:p="http://schemas.openxmlformats.org/presentationml/2006/main">
   <p:cSld>
     <p:spTree>
@@ -9260,6 +9935,30 @@
             </a:r>
           </a:p>
           <a:p>
+            <a:pPr lvl="1">
+              <a:buFont typeface="Wingdings" panose="05000000000000000000" pitchFamily="2" charset="2"/>
+              <a:buChar char="à"/>
+            </a:pPr>
+            <a:r>
+              <a:rPr lang="de-DE" sz="2200" dirty="0">
+                <a:sym typeface="Wingdings" panose="05000000000000000000" pitchFamily="2" charset="2"/>
+              </a:rPr>
+              <a:t>Wie vielen </a:t>
+            </a:r>
+            <a:r>
+              <a:rPr lang="de-DE" sz="2200" dirty="0" err="1">
+                <a:sym typeface="Wingdings" panose="05000000000000000000" pitchFamily="2" charset="2"/>
+              </a:rPr>
+              <a:t>u.i.v</a:t>
+            </a:r>
+            <a:r>
+              <a:rPr lang="de-DE" sz="2200" dirty="0">
+                <a:sym typeface="Wingdings" panose="05000000000000000000" pitchFamily="2" charset="2"/>
+              </a:rPr>
+              <a:t>. Stichproben entsprechen meine Stichproben? Je höher, desto besser.</a:t>
+            </a:r>
+          </a:p>
+          <a:p>
             <a:pPr>
               <a:buFont typeface="Wingdings" panose="05000000000000000000" pitchFamily="2" charset="2"/>
               <a:buChar char="à"/>
@@ -9329,16 +10028,10 @@
               <a:buNone/>
             </a:pPr>
             <a:r>
-              <a:rPr lang="de-DE" sz="2600" dirty="0">
+              <a:rPr lang="de-DE" sz="2600">
                 <a:sym typeface="Wingdings" panose="05000000000000000000" pitchFamily="2" charset="2"/>
               </a:rPr>
-              <a:t> </a:t>
-            </a:r>
-            <a:r>
-              <a:rPr lang="de-DE" sz="2600" dirty="0" err="1">
-                <a:sym typeface="Wingdings" panose="05000000000000000000" pitchFamily="2" charset="2"/>
-              </a:rPr>
-              <a:t>Burnin</a:t>
+              <a:t>Burnin</a:t>
             </a:r>
             <a:endParaRPr lang="de-DE" sz="2600" dirty="0">
               <a:sym typeface="Wingdings" panose="05000000000000000000" pitchFamily="2" charset="2"/>
@@ -9394,7 +10087,7 @@
 </p:sld>
 </file>
 
-<file path=ppt/slides/slide26.xml><?xml version="1.0" encoding="utf-8"?>
+<file path=ppt/slides/slide27.xml><?xml version="1.0" encoding="utf-8"?>
 <p:sld xmlns:a="http://schemas.openxmlformats.org/drawingml/2006/main" xmlns:r="http://schemas.openxmlformats.org/officeDocument/2006/relationships" xmlns:p="http://schemas.openxmlformats.org/presentationml/2006/main">
   <p:cSld>
     <p:spTree>

</xml_diff>

<commit_message>
add overview in presentation
</commit_message>
<xml_diff>
--- a/Präsentation_MonteCarlo.pptx
+++ b/Präsentation_MonteCarlo.pptx
@@ -5,7 +5,7 @@
     <p:sldMasterId id="2147483648" r:id="rId1"/>
   </p:sldMasterIdLst>
   <p:notesMasterIdLst>
-    <p:notesMasterId r:id="rId29"/>
+    <p:notesMasterId r:id="rId30"/>
   </p:notesMasterIdLst>
   <p:sldIdLst>
     <p:sldId id="552" r:id="rId2"/>
@@ -35,6 +35,7 @@
     <p:sldId id="282" r:id="rId26"/>
     <p:sldId id="283" r:id="rId27"/>
     <p:sldId id="284" r:id="rId28"/>
+    <p:sldId id="554" r:id="rId29"/>
   </p:sldIdLst>
   <p:sldSz cx="12192000" cy="6858000"/>
   <p:notesSz cx="6858000" cy="9144000"/>
@@ -168,6 +169,7 @@
             <p14:sldId id="282"/>
             <p14:sldId id="283"/>
             <p14:sldId id="284"/>
+            <p14:sldId id="554"/>
           </p14:sldIdLst>
         </p14:section>
       </p14:sectionLst>
@@ -358,6 +360,27 @@
           <a:t>1.  Wie funktioniert Algo aufmalen
 2. Warum nehme ich manchmal auch weniger wahrscheinliche Punkte?
 Aufmalen</a:t>
+        </a:r>
+      </a:p>
+    </p188:txBody>
+  </p188:cm>
+</p188:cmLst>
+</file>
+
+<file path=ppt/comments/modernComment_22A_3155705E.xml><?xml version="1.0" encoding="utf-8"?>
+<p188:cmLst xmlns:a="http://schemas.openxmlformats.org/drawingml/2006/main" xmlns:r="http://schemas.openxmlformats.org/officeDocument/2006/relationships" xmlns:p188="http://schemas.microsoft.com/office/powerpoint/2018/8/main">
+  <p188:cm id="{DC85E501-1661-4F90-AAFE-D1E40485553E}" authorId="{738DA873-DB13-F91F-A9E2-F1ED84C0CE71}" created="2022-11-18T10:58:08.087">
+    <pc:sldMkLst xmlns:pc="http://schemas.microsoft.com/office/powerpoint/2013/main/command">
+      <pc:docMk/>
+      <pc:sldMk cId="3784736823" sldId="284"/>
+    </pc:sldMkLst>
+    <p188:txBody>
+      <a:bodyPr/>
+      <a:lstStyle/>
+      <a:p>
+        <a:r>
+          <a:rPr lang="de-DE"/>
+          <a:t>Übersicht über alle Algorithmen</a:t>
         </a:r>
       </a:p>
     </p188:txBody>
@@ -10231,6 +10254,822 @@
     <p:extLst>
       <p:ext uri="{BB962C8B-B14F-4D97-AF65-F5344CB8AC3E}">
         <p14:creationId xmlns:p14="http://schemas.microsoft.com/office/powerpoint/2010/main" val="3784736823"/>
+      </p:ext>
+    </p:extLst>
+  </p:cSld>
+  <p:clrMapOvr>
+    <a:masterClrMapping/>
+  </p:clrMapOvr>
+  <p:extLst>
+    <p:ext uri="{6950BFC3-D8DA-4A85-94F7-54DA5524770B}">
+      <p188:commentRel xmlns:p188="http://schemas.microsoft.com/office/powerpoint/2018/8/main" r:id="rId2"/>
+    </p:ext>
+  </p:extLst>
+</p:sld>
+</file>
+
+<file path=ppt/slides/slide28.xml><?xml version="1.0" encoding="utf-8"?>
+<p:sld xmlns:a="http://schemas.openxmlformats.org/drawingml/2006/main" xmlns:r="http://schemas.openxmlformats.org/officeDocument/2006/relationships" xmlns:p="http://schemas.openxmlformats.org/presentationml/2006/main">
+  <p:cSld>
+    <p:spTree>
+      <p:nvGrpSpPr>
+        <p:cNvPr id="1" name=""/>
+        <p:cNvGrpSpPr/>
+        <p:nvPr/>
+      </p:nvGrpSpPr>
+      <p:grpSpPr>
+        <a:xfrm>
+          <a:off x="0" y="0"/>
+          <a:ext cx="0" cy="0"/>
+          <a:chOff x="0" y="0"/>
+          <a:chExt cx="0" cy="0"/>
+        </a:xfrm>
+      </p:grpSpPr>
+      <p:sp>
+        <p:nvSpPr>
+          <p:cNvPr id="2" name="Titel 1">
+            <a:extLst>
+              <a:ext uri="{FF2B5EF4-FFF2-40B4-BE49-F238E27FC236}">
+                <a16:creationId xmlns:a16="http://schemas.microsoft.com/office/drawing/2014/main" id="{2E6BC7E1-A156-9D7E-460C-E68BF34680AC}"/>
+              </a:ext>
+            </a:extLst>
+          </p:cNvPr>
+          <p:cNvSpPr>
+            <a:spLocks noGrp="1"/>
+          </p:cNvSpPr>
+          <p:nvPr>
+            <p:ph type="title"/>
+          </p:nvPr>
+        </p:nvSpPr>
+        <p:spPr/>
+        <p:txBody>
+          <a:bodyPr/>
+          <a:lstStyle/>
+          <a:p>
+            <a:r>
+              <a:rPr lang="de-DE" dirty="0">
+                <a:solidFill>
+                  <a:srgbClr val="5C739C"/>
+                </a:solidFill>
+              </a:rPr>
+              <a:t>Übersicht über alle Algorithmen</a:t>
+            </a:r>
+          </a:p>
+        </p:txBody>
+      </p:sp>
+      <p:pic>
+        <p:nvPicPr>
+          <p:cNvPr id="3" name="Grafik 2">
+            <a:extLst>
+              <a:ext uri="{FF2B5EF4-FFF2-40B4-BE49-F238E27FC236}">
+                <a16:creationId xmlns:a16="http://schemas.microsoft.com/office/drawing/2014/main" id="{3D9362B8-8D92-C794-381D-A4F1D2C3E72B}"/>
+              </a:ext>
+            </a:extLst>
+          </p:cNvPr>
+          <p:cNvPicPr>
+            <a:picLocks noChangeAspect="1"/>
+          </p:cNvPicPr>
+          <p:nvPr/>
+        </p:nvPicPr>
+        <p:blipFill>
+          <a:blip r:embed="rId3"/>
+          <a:stretch>
+            <a:fillRect/>
+          </a:stretch>
+        </p:blipFill>
+        <p:spPr>
+          <a:xfrm>
+            <a:off x="838200" y="6083243"/>
+            <a:ext cx="2057687" cy="409632"/>
+          </a:xfrm>
+          <a:prstGeom prst="rect">
+            <a:avLst/>
+          </a:prstGeom>
+        </p:spPr>
+      </p:pic>
+      <p:graphicFrame>
+        <p:nvGraphicFramePr>
+          <p:cNvPr id="4" name="Tabelle 5">
+            <a:extLst>
+              <a:ext uri="{FF2B5EF4-FFF2-40B4-BE49-F238E27FC236}">
+                <a16:creationId xmlns:a16="http://schemas.microsoft.com/office/drawing/2014/main" id="{830FAD35-B69A-ED04-5BA2-47A6E0F9EB5C}"/>
+              </a:ext>
+            </a:extLst>
+          </p:cNvPr>
+          <p:cNvGraphicFramePr>
+            <a:graphicFrameLocks noGrp="1"/>
+          </p:cNvGraphicFramePr>
+          <p:nvPr>
+            <p:extLst>
+              <p:ext uri="{D42A27DB-BD31-4B8C-83A1-F6EECF244321}">
+                <p14:modId xmlns:p14="http://schemas.microsoft.com/office/powerpoint/2010/main" val="2264465681"/>
+              </p:ext>
+            </p:extLst>
+          </p:nvPr>
+        </p:nvGraphicFramePr>
+        <p:xfrm>
+          <a:off x="838200" y="1314450"/>
+          <a:ext cx="10515600" cy="4740486"/>
+        </p:xfrm>
+        <a:graphic>
+          <a:graphicData uri="http://schemas.openxmlformats.org/drawingml/2006/table">
+            <a:tbl>
+              <a:tblPr firstRow="1" bandRow="1">
+                <a:tableStyleId>{5C22544A-7EE6-4342-B048-85BDC9FD1C3A}</a:tableStyleId>
+              </a:tblPr>
+              <a:tblGrid>
+                <a:gridCol w="2103120">
+                  <a:extLst>
+                    <a:ext uri="{9D8B030D-6E8A-4147-A177-3AD203B41FA5}">
+                      <a16:colId xmlns:a16="http://schemas.microsoft.com/office/drawing/2014/main" val="2236327597"/>
+                    </a:ext>
+                  </a:extLst>
+                </a:gridCol>
+                <a:gridCol w="2103120">
+                  <a:extLst>
+                    <a:ext uri="{9D8B030D-6E8A-4147-A177-3AD203B41FA5}">
+                      <a16:colId xmlns:a16="http://schemas.microsoft.com/office/drawing/2014/main" val="3563289942"/>
+                    </a:ext>
+                  </a:extLst>
+                </a:gridCol>
+                <a:gridCol w="2103120">
+                  <a:extLst>
+                    <a:ext uri="{9D8B030D-6E8A-4147-A177-3AD203B41FA5}">
+                      <a16:colId xmlns:a16="http://schemas.microsoft.com/office/drawing/2014/main" val="3572830648"/>
+                    </a:ext>
+                  </a:extLst>
+                </a:gridCol>
+                <a:gridCol w="2103120">
+                  <a:extLst>
+                    <a:ext uri="{9D8B030D-6E8A-4147-A177-3AD203B41FA5}">
+                      <a16:colId xmlns:a16="http://schemas.microsoft.com/office/drawing/2014/main" val="3479823090"/>
+                    </a:ext>
+                  </a:extLst>
+                </a:gridCol>
+                <a:gridCol w="2103120">
+                  <a:extLst>
+                    <a:ext uri="{9D8B030D-6E8A-4147-A177-3AD203B41FA5}">
+                      <a16:colId xmlns:a16="http://schemas.microsoft.com/office/drawing/2014/main" val="1936383238"/>
+                    </a:ext>
+                  </a:extLst>
+                </a:gridCol>
+              </a:tblGrid>
+              <a:tr h="434763">
+                <a:tc>
+                  <a:txBody>
+                    <a:bodyPr/>
+                    <a:lstStyle/>
+                    <a:p>
+                      <a:endParaRPr lang="de-DE" sz="1400"/>
+                    </a:p>
+                  </a:txBody>
+                  <a:tcPr/>
+                </a:tc>
+                <a:tc>
+                  <a:txBody>
+                    <a:bodyPr/>
+                    <a:lstStyle/>
+                    <a:p>
+                      <a:r>
+                        <a:rPr lang="de-DE" sz="1400" dirty="0"/>
+                        <a:t>Metropolis Hastings</a:t>
+                      </a:r>
+                      <a:br>
+                        <a:rPr lang="de-DE" sz="1400" dirty="0"/>
+                      </a:br>
+                      <a:r>
+                        <a:rPr lang="de-DE" sz="1400" dirty="0"/>
+                        <a:t>(MH)</a:t>
+                      </a:r>
+                    </a:p>
+                  </a:txBody>
+                  <a:tcPr/>
+                </a:tc>
+                <a:tc>
+                  <a:txBody>
+                    <a:bodyPr/>
+                    <a:lstStyle/>
+                    <a:p>
+                      <a:r>
+                        <a:rPr lang="de-DE" sz="1400" dirty="0"/>
+                        <a:t>Metropolis </a:t>
+                      </a:r>
+                      <a:r>
+                        <a:rPr lang="de-DE" sz="1400" dirty="0" err="1"/>
+                        <a:t>Adjusted</a:t>
+                      </a:r>
+                      <a:br>
+                        <a:rPr lang="de-DE" sz="1400" dirty="0"/>
+                      </a:br>
+                      <a:r>
+                        <a:rPr lang="de-DE" sz="1400" dirty="0" err="1"/>
+                        <a:t>Langevin</a:t>
+                      </a:r>
+                      <a:r>
+                        <a:rPr lang="de-DE" sz="1400" dirty="0"/>
+                        <a:t> </a:t>
+                      </a:r>
+                      <a:r>
+                        <a:rPr lang="de-DE" sz="1400" dirty="0" err="1"/>
+                        <a:t>Algorithm</a:t>
+                      </a:r>
+                      <a:br>
+                        <a:rPr lang="de-DE" sz="1400" dirty="0"/>
+                      </a:br>
+                      <a:r>
+                        <a:rPr lang="de-DE" sz="1400" dirty="0"/>
+                        <a:t>(MALA)</a:t>
+                      </a:r>
+                    </a:p>
+                  </a:txBody>
+                  <a:tcPr/>
+                </a:tc>
+                <a:tc>
+                  <a:txBody>
+                    <a:bodyPr/>
+                    <a:lstStyle/>
+                    <a:p>
+                      <a:r>
+                        <a:rPr lang="de-DE" sz="1400" dirty="0" err="1"/>
+                        <a:t>Hamiltonian</a:t>
+                      </a:r>
+                      <a:r>
+                        <a:rPr lang="de-DE" sz="1400" dirty="0"/>
+                        <a:t> Monte</a:t>
+                      </a:r>
+                      <a:br>
+                        <a:rPr lang="de-DE" sz="1400" dirty="0"/>
+                      </a:br>
+                      <a:r>
+                        <a:rPr lang="de-DE" sz="1400" dirty="0"/>
+                        <a:t>Carlo (HMC)</a:t>
+                      </a:r>
+                    </a:p>
+                  </a:txBody>
+                  <a:tcPr/>
+                </a:tc>
+                <a:tc>
+                  <a:txBody>
+                    <a:bodyPr/>
+                    <a:lstStyle/>
+                    <a:p>
+                      <a:r>
+                        <a:rPr lang="de-DE" sz="1400" dirty="0" err="1"/>
+                        <a:t>No</a:t>
+                      </a:r>
+                      <a:r>
+                        <a:rPr lang="de-DE" sz="1400" dirty="0"/>
+                        <a:t> U-Turn Samples</a:t>
+                      </a:r>
+                      <a:br>
+                        <a:rPr lang="de-DE" sz="1400" dirty="0"/>
+                      </a:br>
+                      <a:r>
+                        <a:rPr lang="de-DE" sz="1400" dirty="0"/>
+                        <a:t>(NUTS)</a:t>
+                      </a:r>
+                    </a:p>
+                  </a:txBody>
+                  <a:tcPr/>
+                </a:tc>
+                <a:extLst>
+                  <a:ext uri="{0D108BD9-81ED-4DB2-BD59-A6C34878D82A}">
+                    <a16:rowId xmlns:a16="http://schemas.microsoft.com/office/drawing/2014/main" val="1855328816"/>
+                  </a:ext>
+                </a:extLst>
+              </a:tr>
+              <a:tr h="434763">
+                <a:tc>
+                  <a:txBody>
+                    <a:bodyPr/>
+                    <a:lstStyle/>
+                    <a:p>
+                      <a:endParaRPr lang="de-DE" sz="1400" dirty="0"/>
+                    </a:p>
+                  </a:txBody>
+                  <a:tcPr/>
+                </a:tc>
+                <a:tc>
+                  <a:txBody>
+                    <a:bodyPr/>
+                    <a:lstStyle/>
+                    <a:p>
+                      <a:endParaRPr lang="de-DE" sz="1400" dirty="0"/>
+                    </a:p>
+                  </a:txBody>
+                  <a:tcPr/>
+                </a:tc>
+                <a:tc>
+                  <a:txBody>
+                    <a:bodyPr/>
+                    <a:lstStyle/>
+                    <a:p>
+                      <a:endParaRPr lang="de-DE" sz="1400" dirty="0"/>
+                    </a:p>
+                  </a:txBody>
+                  <a:tcPr/>
+                </a:tc>
+                <a:tc>
+                  <a:txBody>
+                    <a:bodyPr/>
+                    <a:lstStyle/>
+                    <a:p>
+                      <a:endParaRPr lang="de-DE" sz="1400" dirty="0"/>
+                    </a:p>
+                  </a:txBody>
+                  <a:tcPr/>
+                </a:tc>
+                <a:tc>
+                  <a:txBody>
+                    <a:bodyPr/>
+                    <a:lstStyle/>
+                    <a:p>
+                      <a:endParaRPr lang="de-DE" sz="1400" dirty="0"/>
+                    </a:p>
+                  </a:txBody>
+                  <a:tcPr/>
+                </a:tc>
+                <a:extLst>
+                  <a:ext uri="{0D108BD9-81ED-4DB2-BD59-A6C34878D82A}">
+                    <a16:rowId xmlns:a16="http://schemas.microsoft.com/office/drawing/2014/main" val="2950307231"/>
+                  </a:ext>
+                </a:extLst>
+              </a:tr>
+              <a:tr h="434763">
+                <a:tc>
+                  <a:txBody>
+                    <a:bodyPr/>
+                    <a:lstStyle/>
+                    <a:p>
+                      <a:r>
+                        <a:rPr lang="de-DE" sz="1400" dirty="0"/>
+                        <a:t>Idee</a:t>
+                      </a:r>
+                    </a:p>
+                  </a:txBody>
+                  <a:tcPr/>
+                </a:tc>
+                <a:tc>
+                  <a:txBody>
+                    <a:bodyPr/>
+                    <a:lstStyle/>
+                    <a:p>
+                      <a:r>
+                        <a:rPr lang="de-DE" sz="1400" dirty="0"/>
+                        <a:t>Schlage neuen Punkt zufällig in der Nähe des vorherigen Punktes vor und vergleiche wie wahrscheinlich er im Vergleich zum vorherigen Punkt ist</a:t>
+                      </a:r>
+                    </a:p>
+                  </a:txBody>
+                  <a:tcPr/>
+                </a:tc>
+                <a:tc>
+                  <a:txBody>
+                    <a:bodyPr/>
+                    <a:lstStyle/>
+                    <a:p>
+                      <a:r>
+                        <a:rPr lang="de-DE" sz="1400" dirty="0"/>
+                        <a:t>Wie MH, aber schlage neuen Punkt in Richtung des Gradienten der Dichte vor für höhere Annahmewahrscheinlichkeit</a:t>
+                      </a:r>
+                    </a:p>
+                  </a:txBody>
+                  <a:tcPr/>
+                </a:tc>
+                <a:tc>
+                  <a:txBody>
+                    <a:bodyPr/>
+                    <a:lstStyle/>
+                    <a:p>
+                      <a:r>
+                        <a:rPr lang="de-DE" sz="1400" dirty="0"/>
+                        <a:t>Wie MALA, aber bewege dich weiter in Richtung des Gradienten</a:t>
+                      </a:r>
+                    </a:p>
+                  </a:txBody>
+                  <a:tcPr/>
+                </a:tc>
+                <a:tc>
+                  <a:txBody>
+                    <a:bodyPr/>
+                    <a:lstStyle/>
+                    <a:p>
+                      <a:r>
+                        <a:rPr lang="de-DE" sz="1400" dirty="0"/>
+                        <a:t>Wie HMC, aber entscheide  adaptiv wie weit in Richtung des Gradienten (bis ein U-Turn gemacht wurde)</a:t>
+                      </a:r>
+                    </a:p>
+                  </a:txBody>
+                  <a:tcPr/>
+                </a:tc>
+                <a:extLst>
+                  <a:ext uri="{0D108BD9-81ED-4DB2-BD59-A6C34878D82A}">
+                    <a16:rowId xmlns:a16="http://schemas.microsoft.com/office/drawing/2014/main" val="3311305669"/>
+                  </a:ext>
+                </a:extLst>
+              </a:tr>
+              <a:tr h="434763">
+                <a:tc>
+                  <a:txBody>
+                    <a:bodyPr/>
+                    <a:lstStyle/>
+                    <a:p>
+                      <a:r>
+                        <a:rPr lang="de-DE" sz="1400" dirty="0"/>
+                        <a:t>Hyperparameter</a:t>
+                      </a:r>
+                    </a:p>
+                  </a:txBody>
+                  <a:tcPr/>
+                </a:tc>
+                <a:tc>
+                  <a:txBody>
+                    <a:bodyPr/>
+                    <a:lstStyle/>
+                    <a:p>
+                      <a:r>
+                        <a:rPr lang="de-DE" sz="1400" dirty="0"/>
+                        <a:t>Keine</a:t>
+                      </a:r>
+                    </a:p>
+                  </a:txBody>
+                  <a:tcPr/>
+                </a:tc>
+                <a:tc>
+                  <a:txBody>
+                    <a:bodyPr/>
+                    <a:lstStyle/>
+                    <a:p>
+                      <a:r>
+                        <a:rPr lang="de-DE" sz="1400" dirty="0"/>
+                        <a:t>Schrittweite ɛ​</a:t>
+                      </a:r>
+                    </a:p>
+                  </a:txBody>
+                  <a:tcPr/>
+                </a:tc>
+                <a:tc>
+                  <a:txBody>
+                    <a:bodyPr/>
+                    <a:lstStyle/>
+                    <a:p>
+                      <a:r>
+                        <a:rPr lang="de-DE" sz="1400" dirty="0"/>
+                        <a:t>Schrittweite ɛ​</a:t>
+                      </a:r>
+                      <a:br>
+                        <a:rPr lang="de-DE" sz="1400" dirty="0"/>
+                      </a:br>
+                      <a:r>
+                        <a:rPr lang="de-DE" sz="1400" dirty="0"/>
+                        <a:t>Anzahl Schritte L</a:t>
+                      </a:r>
+                    </a:p>
+                  </a:txBody>
+                  <a:tcPr/>
+                </a:tc>
+                <a:tc>
+                  <a:txBody>
+                    <a:bodyPr/>
+                    <a:lstStyle/>
+                    <a:p>
+                      <a:r>
+                        <a:rPr lang="de-DE" sz="1400" dirty="0"/>
+                        <a:t>Schrittweite ɛ​</a:t>
+                      </a:r>
+                    </a:p>
+                  </a:txBody>
+                  <a:tcPr/>
+                </a:tc>
+                <a:extLst>
+                  <a:ext uri="{0D108BD9-81ED-4DB2-BD59-A6C34878D82A}">
+                    <a16:rowId xmlns:a16="http://schemas.microsoft.com/office/drawing/2014/main" val="198672877"/>
+                  </a:ext>
+                </a:extLst>
+              </a:tr>
+              <a:tr h="434763">
+                <a:tc>
+                  <a:txBody>
+                    <a:bodyPr/>
+                    <a:lstStyle/>
+                    <a:p>
+                      <a:r>
+                        <a:rPr lang="de-DE" sz="1400" dirty="0"/>
+                        <a:t>Wann benutzen?</a:t>
+                      </a:r>
+                    </a:p>
+                  </a:txBody>
+                  <a:tcPr/>
+                </a:tc>
+                <a:tc>
+                  <a:txBody>
+                    <a:bodyPr/>
+                    <a:lstStyle/>
+                    <a:p>
+                      <a:r>
+                        <a:rPr lang="de-DE" sz="1400" dirty="0"/>
+                        <a:t>Einfache Verteilungen</a:t>
+                      </a:r>
+                    </a:p>
+                  </a:txBody>
+                  <a:tcPr/>
+                </a:tc>
+                <a:tc>
+                  <a:txBody>
+                    <a:bodyPr/>
+                    <a:lstStyle/>
+                    <a:p>
+                      <a:r>
+                        <a:rPr lang="de-DE" sz="1400" dirty="0"/>
+                        <a:t>Mittel-Komplexe</a:t>
+                      </a:r>
+                      <a:br>
+                        <a:rPr lang="de-DE" sz="1400" dirty="0"/>
+                      </a:br>
+                      <a:r>
+                        <a:rPr lang="de-DE" sz="1400" dirty="0"/>
+                        <a:t>Verteilungen</a:t>
+                      </a:r>
+                    </a:p>
+                  </a:txBody>
+                  <a:tcPr/>
+                </a:tc>
+                <a:tc>
+                  <a:txBody>
+                    <a:bodyPr/>
+                    <a:lstStyle/>
+                    <a:p>
+                      <a:r>
+                        <a:rPr lang="de-DE" sz="1400" dirty="0"/>
+                        <a:t>Komplexe</a:t>
+                      </a:r>
+                      <a:br>
+                        <a:rPr lang="de-DE" sz="1400" dirty="0"/>
+                      </a:br>
+                      <a:r>
+                        <a:rPr lang="de-DE" sz="1400" dirty="0"/>
+                        <a:t>Verteilungen</a:t>
+                      </a:r>
+                    </a:p>
+                  </a:txBody>
+                  <a:tcPr/>
+                </a:tc>
+                <a:tc>
+                  <a:txBody>
+                    <a:bodyPr/>
+                    <a:lstStyle/>
+                    <a:p>
+                      <a:pPr marL="0" marR="0" lvl="0" indent="0" algn="l" defTabSz="914400" rtl="0" eaLnBrk="1" fontAlgn="auto" latinLnBrk="0" hangingPunct="1">
+                        <a:lnSpc>
+                          <a:spcPct val="100000"/>
+                        </a:lnSpc>
+                        <a:spcBef>
+                          <a:spcPts val="0"/>
+                        </a:spcBef>
+                        <a:spcAft>
+                          <a:spcPts val="0"/>
+                        </a:spcAft>
+                        <a:buClrTx/>
+                        <a:buSzTx/>
+                        <a:buFontTx/>
+                        <a:buNone/>
+                        <a:tabLst/>
+                        <a:defRPr/>
+                      </a:pPr>
+                      <a:r>
+                        <a:rPr lang="de-DE" sz="1400" dirty="0"/>
+                        <a:t>Komplexe</a:t>
+                      </a:r>
+                      <a:br>
+                        <a:rPr lang="de-DE" sz="1400" dirty="0"/>
+                      </a:br>
+                      <a:r>
+                        <a:rPr lang="de-DE" sz="1400" dirty="0"/>
+                        <a:t>Verteilungen</a:t>
+                      </a:r>
+                    </a:p>
+                  </a:txBody>
+                  <a:tcPr/>
+                </a:tc>
+                <a:extLst>
+                  <a:ext uri="{0D108BD9-81ED-4DB2-BD59-A6C34878D82A}">
+                    <a16:rowId xmlns:a16="http://schemas.microsoft.com/office/drawing/2014/main" val="1421215989"/>
+                  </a:ext>
+                </a:extLst>
+              </a:tr>
+              <a:tr h="434763">
+                <a:tc>
+                  <a:txBody>
+                    <a:bodyPr/>
+                    <a:lstStyle/>
+                    <a:p>
+                      <a:r>
+                        <a:rPr lang="de-DE" sz="1400" dirty="0"/>
+                        <a:t>Benötigt</a:t>
+                      </a:r>
+                    </a:p>
+                  </a:txBody>
+                  <a:tcPr/>
+                </a:tc>
+                <a:tc>
+                  <a:txBody>
+                    <a:bodyPr/>
+                    <a:lstStyle/>
+                    <a:p>
+                      <a:r>
+                        <a:rPr lang="de-DE" sz="1400" dirty="0"/>
+                        <a:t>Dichte </a:t>
+                      </a:r>
+                      <a:r>
+                        <a:rPr lang="el-GR" sz="1400" dirty="0"/>
+                        <a:t>π</a:t>
+                      </a:r>
+                      <a:endParaRPr lang="de-DE" sz="1400" dirty="0"/>
+                    </a:p>
+                  </a:txBody>
+                  <a:tcPr/>
+                </a:tc>
+                <a:tc>
+                  <a:txBody>
+                    <a:bodyPr/>
+                    <a:lstStyle/>
+                    <a:p>
+                      <a:r>
+                        <a:rPr lang="de-DE" sz="1400" dirty="0"/>
+                        <a:t>Dichte </a:t>
+                      </a:r>
+                      <a:r>
+                        <a:rPr lang="el-GR" sz="1400" dirty="0"/>
+                        <a:t>π</a:t>
+                      </a:r>
+                      <a:br>
+                        <a:rPr lang="de-DE" sz="1400" dirty="0"/>
+                      </a:br>
+                      <a:r>
+                        <a:rPr lang="de-DE" sz="1400" dirty="0"/>
+                        <a:t>Gradient log(</a:t>
+                      </a:r>
+                      <a:r>
+                        <a:rPr lang="el-GR" sz="1400" dirty="0"/>
+                        <a:t>π</a:t>
+                      </a:r>
+                      <a:r>
+                        <a:rPr lang="de-DE" sz="1400" dirty="0"/>
+                        <a:t>)</a:t>
+                      </a:r>
+                    </a:p>
+                  </a:txBody>
+                  <a:tcPr/>
+                </a:tc>
+                <a:tc>
+                  <a:txBody>
+                    <a:bodyPr/>
+                    <a:lstStyle/>
+                    <a:p>
+                      <a:r>
+                        <a:rPr lang="de-DE" sz="1400" dirty="0"/>
+                        <a:t>Dichte </a:t>
+                      </a:r>
+                      <a:r>
+                        <a:rPr lang="el-GR" sz="1400" dirty="0"/>
+                        <a:t>π</a:t>
+                      </a:r>
+                      <a:endParaRPr lang="de-DE" sz="1400" dirty="0"/>
+                    </a:p>
+                    <a:p>
+                      <a:r>
+                        <a:rPr lang="de-DE" sz="1400" dirty="0"/>
+                        <a:t>Gradient log(</a:t>
+                      </a:r>
+                      <a:r>
+                        <a:rPr lang="el-GR" sz="1400" dirty="0"/>
+                        <a:t>π</a:t>
+                      </a:r>
+                      <a:r>
+                        <a:rPr lang="de-DE" sz="1400" dirty="0"/>
+                        <a:t>)</a:t>
+                      </a:r>
+                    </a:p>
+                  </a:txBody>
+                  <a:tcPr/>
+                </a:tc>
+                <a:tc>
+                  <a:txBody>
+                    <a:bodyPr/>
+                    <a:lstStyle/>
+                    <a:p>
+                      <a:r>
+                        <a:rPr lang="de-DE" sz="1400" dirty="0"/>
+                        <a:t>Dichte </a:t>
+                      </a:r>
+                      <a:r>
+                        <a:rPr lang="el-GR" sz="1400" dirty="0"/>
+                        <a:t>π</a:t>
+                      </a:r>
+                      <a:endParaRPr lang="de-DE" sz="1400" dirty="0"/>
+                    </a:p>
+                    <a:p>
+                      <a:r>
+                        <a:rPr lang="de-DE" sz="1400" dirty="0"/>
+                        <a:t>Gradient log(</a:t>
+                      </a:r>
+                      <a:r>
+                        <a:rPr lang="el-GR" sz="1400" dirty="0"/>
+                        <a:t>π</a:t>
+                      </a:r>
+                      <a:r>
+                        <a:rPr lang="de-DE" sz="1400" dirty="0"/>
+                        <a:t>)</a:t>
+                      </a:r>
+                    </a:p>
+                  </a:txBody>
+                  <a:tcPr/>
+                </a:tc>
+                <a:extLst>
+                  <a:ext uri="{0D108BD9-81ED-4DB2-BD59-A6C34878D82A}">
+                    <a16:rowId xmlns:a16="http://schemas.microsoft.com/office/drawing/2014/main" val="585360061"/>
+                  </a:ext>
+                </a:extLst>
+              </a:tr>
+              <a:tr h="434763">
+                <a:tc>
+                  <a:txBody>
+                    <a:bodyPr/>
+                    <a:lstStyle/>
+                    <a:p>
+                      <a:r>
+                        <a:rPr lang="de-DE" sz="1400" dirty="0"/>
+                        <a:t>Rechenaufwand</a:t>
+                      </a:r>
+                    </a:p>
+                  </a:txBody>
+                  <a:tcPr/>
+                </a:tc>
+                <a:tc>
+                  <a:txBody>
+                    <a:bodyPr/>
+                    <a:lstStyle/>
+                    <a:p>
+                      <a:r>
+                        <a:rPr lang="de-DE" sz="1400" dirty="0"/>
+                        <a:t>Niedrig</a:t>
+                      </a:r>
+                    </a:p>
+                  </a:txBody>
+                  <a:tcPr/>
+                </a:tc>
+                <a:tc>
+                  <a:txBody>
+                    <a:bodyPr/>
+                    <a:lstStyle/>
+                    <a:p>
+                      <a:r>
+                        <a:rPr lang="de-DE" sz="1400" dirty="0"/>
+                        <a:t>Mittel</a:t>
+                      </a:r>
+                    </a:p>
+                  </a:txBody>
+                  <a:tcPr/>
+                </a:tc>
+                <a:tc>
+                  <a:txBody>
+                    <a:bodyPr/>
+                    <a:lstStyle/>
+                    <a:p>
+                      <a:r>
+                        <a:rPr lang="de-DE" sz="1400" dirty="0"/>
+                        <a:t>Hoch</a:t>
+                      </a:r>
+                    </a:p>
+                  </a:txBody>
+                  <a:tcPr/>
+                </a:tc>
+                <a:tc>
+                  <a:txBody>
+                    <a:bodyPr/>
+                    <a:lstStyle/>
+                    <a:p>
+                      <a:r>
+                        <a:rPr lang="de-DE" sz="1400" dirty="0"/>
+                        <a:t>Hoch</a:t>
+                      </a:r>
+                    </a:p>
+                  </a:txBody>
+                  <a:tcPr/>
+                </a:tc>
+                <a:extLst>
+                  <a:ext uri="{0D108BD9-81ED-4DB2-BD59-A6C34878D82A}">
+                    <a16:rowId xmlns:a16="http://schemas.microsoft.com/office/drawing/2014/main" val="1949209363"/>
+                  </a:ext>
+                </a:extLst>
+              </a:tr>
+            </a:tbl>
+          </a:graphicData>
+        </a:graphic>
+      </p:graphicFrame>
+    </p:spTree>
+    <p:extLst>
+      <p:ext uri="{BB962C8B-B14F-4D97-AF65-F5344CB8AC3E}">
+        <p14:creationId xmlns:p14="http://schemas.microsoft.com/office/powerpoint/2010/main" val="827682910"/>
       </p:ext>
     </p:extLst>
   </p:cSld>

</xml_diff>

<commit_message>
finish overview of algos
</commit_message>
<xml_diff>
--- a/Präsentation_MonteCarlo.pptx
+++ b/Präsentation_MonteCarlo.pptx
@@ -309,27 +309,6 @@
 </p188:cmLst>
 </file>
 
-<file path=ppt/comments/modernComment_11C_E1968037.xml><?xml version="1.0" encoding="utf-8"?>
-<p188:cmLst xmlns:a="http://schemas.openxmlformats.org/drawingml/2006/main" xmlns:r="http://schemas.openxmlformats.org/officeDocument/2006/relationships" xmlns:p188="http://schemas.microsoft.com/office/powerpoint/2018/8/main">
-  <p188:cm id="{11354EF2-F461-4FCB-94D2-22422F2FB526}" authorId="{738DA873-DB13-F91F-A9E2-F1ED84C0CE71}" created="2022-11-18T10:58:08.087">
-    <pc:sldMkLst xmlns:pc="http://schemas.microsoft.com/office/powerpoint/2013/main/command">
-      <pc:docMk/>
-      <pc:sldMk cId="3784736823" sldId="284"/>
-    </pc:sldMkLst>
-    <p188:txBody>
-      <a:bodyPr/>
-      <a:lstStyle/>
-      <a:p>
-        <a:r>
-          <a:rPr lang="de-DE"/>
-          <a:t>Übersicht über alle Algorithmen</a:t>
-        </a:r>
-      </a:p>
-    </p188:txBody>
-  </p188:cm>
-</p188:cmLst>
-</file>
-
 <file path=ppt/comments/modernComment_229_596C2A97.xml><?xml version="1.0" encoding="utf-8"?>
 <p188:cmLst xmlns:a="http://schemas.openxmlformats.org/drawingml/2006/main" xmlns:r="http://schemas.openxmlformats.org/officeDocument/2006/relationships" xmlns:p188="http://schemas.microsoft.com/office/powerpoint/2018/8/main">
   <p188:cm id="{1B37EBB9-C72B-4D53-8945-9A502A085E86}" authorId="{738DA873-DB13-F91F-A9E2-F1ED84C0CE71}" created="2022-11-13T10:27:54.470">
@@ -360,27 +339,6 @@
           <a:t>1.  Wie funktioniert Algo aufmalen
 2. Warum nehme ich manchmal auch weniger wahrscheinliche Punkte?
 Aufmalen</a:t>
-        </a:r>
-      </a:p>
-    </p188:txBody>
-  </p188:cm>
-</p188:cmLst>
-</file>
-
-<file path=ppt/comments/modernComment_22A_3155705E.xml><?xml version="1.0" encoding="utf-8"?>
-<p188:cmLst xmlns:a="http://schemas.openxmlformats.org/drawingml/2006/main" xmlns:r="http://schemas.openxmlformats.org/officeDocument/2006/relationships" xmlns:p188="http://schemas.microsoft.com/office/powerpoint/2018/8/main">
-  <p188:cm id="{DC85E501-1661-4F90-AAFE-D1E40485553E}" authorId="{738DA873-DB13-F91F-A9E2-F1ED84C0CE71}" created="2022-11-18T10:58:08.087">
-    <pc:sldMkLst xmlns:pc="http://schemas.microsoft.com/office/powerpoint/2013/main/command">
-      <pc:docMk/>
-      <pc:sldMk cId="3784736823" sldId="284"/>
-    </pc:sldMkLst>
-    <p188:txBody>
-      <a:bodyPr/>
-      <a:lstStyle/>
-      <a:p>
-        <a:r>
-          <a:rPr lang="de-DE"/>
-          <a:t>Übersicht über alle Algorithmen</a:t>
         </a:r>
       </a:p>
     </p188:txBody>
@@ -10205,7 +10163,7 @@
           <p:nvPr/>
         </p:nvPicPr>
         <p:blipFill>
-          <a:blip r:embed="rId3"/>
+          <a:blip r:embed="rId2"/>
           <a:stretch>
             <a:fillRect/>
           </a:stretch>
@@ -10235,7 +10193,7 @@
           <p:nvPr/>
         </p:nvPicPr>
         <p:blipFill>
-          <a:blip r:embed="rId4"/>
+          <a:blip r:embed="rId3"/>
           <a:stretch>
             <a:fillRect/>
           </a:stretch>
@@ -10260,11 +10218,6 @@
   <p:clrMapOvr>
     <a:masterClrMapping/>
   </p:clrMapOvr>
-  <p:extLst>
-    <p:ext uri="{6950BFC3-D8DA-4A85-94F7-54DA5524770B}">
-      <p188:commentRel xmlns:p188="http://schemas.microsoft.com/office/powerpoint/2018/8/main" r:id="rId2"/>
-    </p:ext>
-  </p:extLst>
 </p:sld>
 </file>
 
@@ -10332,7 +10285,7 @@
           <p:nvPr/>
         </p:nvPicPr>
         <p:blipFill>
-          <a:blip r:embed="rId3"/>
+          <a:blip r:embed="rId2"/>
           <a:stretch>
             <a:fillRect/>
           </a:stretch>
@@ -10362,14 +10315,14 @@
           <p:nvPr>
             <p:extLst>
               <p:ext uri="{D42A27DB-BD31-4B8C-83A1-F6EECF244321}">
-                <p14:modId xmlns:p14="http://schemas.microsoft.com/office/powerpoint/2010/main" val="2264465681"/>
+                <p14:modId xmlns:p14="http://schemas.microsoft.com/office/powerpoint/2010/main" val="3214253349"/>
               </p:ext>
             </p:extLst>
           </p:nvPr>
         </p:nvGraphicFramePr>
         <p:xfrm>
           <a:off x="838200" y="1314450"/>
-          <a:ext cx="10515600" cy="4740486"/>
+          <a:ext cx="10515600" cy="4623858"/>
         </p:xfrm>
         <a:graphic>
           <a:graphicData uri="http://schemas.openxmlformats.org/drawingml/2006/table">
@@ -10378,14 +10331,14 @@
                 <a:tableStyleId>{5C22544A-7EE6-4342-B048-85BDC9FD1C3A}</a:tableStyleId>
               </a:tblPr>
               <a:tblGrid>
-                <a:gridCol w="2103120">
+                <a:gridCol w="1400175">
                   <a:extLst>
                     <a:ext uri="{9D8B030D-6E8A-4147-A177-3AD203B41FA5}">
                       <a16:colId xmlns:a16="http://schemas.microsoft.com/office/drawing/2014/main" val="2236327597"/>
                     </a:ext>
                   </a:extLst>
                 </a:gridCol>
-                <a:gridCol w="2103120">
+                <a:gridCol w="2806065">
                   <a:extLst>
                     <a:ext uri="{9D8B030D-6E8A-4147-A177-3AD203B41FA5}">
                       <a16:colId xmlns:a16="http://schemas.microsoft.com/office/drawing/2014/main" val="3563289942"/>
@@ -10420,7 +10373,7 @@
                     <a:bodyPr/>
                     <a:lstStyle/>
                     <a:p>
-                      <a:endParaRPr lang="de-DE" sz="1400"/>
+                      <a:endParaRPr lang="de-DE" sz="1400" dirty="0"/>
                     </a:p>
                   </a:txBody>
                   <a:tcPr/>
@@ -10538,8 +10491,59 @@
                   </a:ext>
                 </a:extLst>
               </a:tr>
-              <a:tr h="434763">
+              <a:tr h="318135">
                 <a:tc>
+                  <a:txBody>
+                    <a:bodyPr/>
+                    <a:lstStyle/>
+                    <a:p>
+                      <a:r>
+                        <a:rPr lang="de-DE" sz="1400" dirty="0"/>
+                        <a:t>Ziel</a:t>
+                      </a:r>
+                    </a:p>
+                  </a:txBody>
+                  <a:tcPr/>
+                </a:tc>
+                <a:tc gridSpan="4">
+                  <a:txBody>
+                    <a:bodyPr/>
+                    <a:lstStyle/>
+                    <a:p>
+                      <a:pPr algn="ctr"/>
+                      <a:r>
+                        <a:rPr lang="de-DE" sz="1400" dirty="0"/>
+                        <a:t>Generiere Stichproben aus einer Dichte </a:t>
+                      </a:r>
+                      <a:r>
+                        <a:rPr lang="el-GR" sz="1400" dirty="0"/>
+                        <a:t>π</a:t>
+                      </a:r>
+                      <a:r>
+                        <a:rPr lang="de-DE" sz="1400" dirty="0"/>
+                        <a:t>, z.B. </a:t>
+                      </a:r>
+                      <a:r>
+                        <a:rPr lang="el-GR" sz="1400" dirty="0"/>
+                        <a:t>π</a:t>
+                      </a:r>
+                      <a:r>
+                        <a:rPr lang="de-DE" sz="1400" dirty="0"/>
+                        <a:t> = </a:t>
+                      </a:r>
+                      <a:r>
+                        <a:rPr lang="de-DE" sz="1400" dirty="0" err="1"/>
+                        <a:t>exp</a:t>
+                      </a:r>
+                      <a:r>
+                        <a:rPr lang="de-DE" sz="1400" dirty="0"/>
+                        <a:t>(-x^8)</a:t>
+                      </a:r>
+                    </a:p>
+                  </a:txBody>
+                  <a:tcPr/>
+                </a:tc>
+                <a:tc hMerge="1">
                   <a:txBody>
                     <a:bodyPr/>
                     <a:lstStyle/>
@@ -10549,7 +10553,7 @@
                   </a:txBody>
                   <a:tcPr/>
                 </a:tc>
-                <a:tc>
+                <a:tc hMerge="1">
                   <a:txBody>
                     <a:bodyPr/>
                     <a:lstStyle/>
@@ -10559,27 +10563,7 @@
                   </a:txBody>
                   <a:tcPr/>
                 </a:tc>
-                <a:tc>
-                  <a:txBody>
-                    <a:bodyPr/>
-                    <a:lstStyle/>
-                    <a:p>
-                      <a:endParaRPr lang="de-DE" sz="1400" dirty="0"/>
-                    </a:p>
-                  </a:txBody>
-                  <a:tcPr/>
-                </a:tc>
-                <a:tc>
-                  <a:txBody>
-                    <a:bodyPr/>
-                    <a:lstStyle/>
-                    <a:p>
-                      <a:endParaRPr lang="de-DE" sz="1400" dirty="0"/>
-                    </a:p>
-                  </a:txBody>
-                  <a:tcPr/>
-                </a:tc>
-                <a:tc>
+                <a:tc hMerge="1">
                   <a:txBody>
                     <a:bodyPr/>
                     <a:lstStyle/>
@@ -10603,6 +10587,239 @@
                     <a:p>
                       <a:r>
                         <a:rPr lang="de-DE" sz="1400" dirty="0"/>
+                        <a:t>Benötigt</a:t>
+                      </a:r>
+                    </a:p>
+                  </a:txBody>
+                  <a:tcPr/>
+                </a:tc>
+                <a:tc>
+                  <a:txBody>
+                    <a:bodyPr/>
+                    <a:lstStyle/>
+                    <a:p>
+                      <a:pPr algn="ctr"/>
+                      <a:r>
+                        <a:rPr lang="de-DE" sz="1400" dirty="0"/>
+                        <a:t>Initiale Stichprobe x</a:t>
+                      </a:r>
+                      <a:r>
+                        <a:rPr lang="de-DE" sz="1400" baseline="-25000" dirty="0"/>
+                        <a:t>0</a:t>
+                      </a:r>
+                      <a:endParaRPr lang="de-DE" sz="1400" dirty="0"/>
+                    </a:p>
+                    <a:p>
+                      <a:pPr algn="ctr"/>
+                      <a:r>
+                        <a:rPr lang="de-DE" sz="1400" dirty="0"/>
+                        <a:t>Dichte </a:t>
+                      </a:r>
+                      <a:r>
+                        <a:rPr lang="el-GR" sz="1400" dirty="0"/>
+                        <a:t>π</a:t>
+                      </a:r>
+                      <a:endParaRPr lang="de-DE" sz="1400" dirty="0"/>
+                    </a:p>
+                  </a:txBody>
+                  <a:tcPr/>
+                </a:tc>
+                <a:tc>
+                  <a:txBody>
+                    <a:bodyPr/>
+                    <a:lstStyle/>
+                    <a:p>
+                      <a:pPr marL="0" marR="0" lvl="0" indent="0" algn="ctr" defTabSz="914400" rtl="0" eaLnBrk="1" fontAlgn="auto" latinLnBrk="0" hangingPunct="1">
+                        <a:lnSpc>
+                          <a:spcPct val="100000"/>
+                        </a:lnSpc>
+                        <a:spcBef>
+                          <a:spcPts val="0"/>
+                        </a:spcBef>
+                        <a:spcAft>
+                          <a:spcPts val="0"/>
+                        </a:spcAft>
+                        <a:buClrTx/>
+                        <a:buSzTx/>
+                        <a:buFontTx/>
+                        <a:buNone/>
+                        <a:tabLst/>
+                        <a:defRPr/>
+                      </a:pPr>
+                      <a:r>
+                        <a:rPr lang="de-DE" sz="1400" dirty="0"/>
+                        <a:t>Initiale Stichprobe x</a:t>
+                      </a:r>
+                      <a:r>
+                        <a:rPr lang="de-DE" sz="1400" baseline="-25000" dirty="0"/>
+                        <a:t>0</a:t>
+                      </a:r>
+                      <a:br>
+                        <a:rPr lang="de-DE" sz="1400" dirty="0"/>
+                      </a:br>
+                      <a:r>
+                        <a:rPr lang="de-DE" sz="1400" dirty="0"/>
+                        <a:t>Dichte </a:t>
+                      </a:r>
+                      <a:r>
+                        <a:rPr lang="el-GR" sz="1400" dirty="0"/>
+                        <a:t>π</a:t>
+                      </a:r>
+                      <a:br>
+                        <a:rPr lang="de-DE" sz="1400" dirty="0"/>
+                      </a:br>
+                      <a:r>
+                        <a:rPr lang="de-DE" sz="1400" dirty="0"/>
+                        <a:t>Gradient log(</a:t>
+                      </a:r>
+                      <a:r>
+                        <a:rPr lang="el-GR" sz="1400" dirty="0"/>
+                        <a:t>π</a:t>
+                      </a:r>
+                      <a:r>
+                        <a:rPr lang="de-DE" sz="1400" dirty="0"/>
+                        <a:t>)</a:t>
+                      </a:r>
+                    </a:p>
+                  </a:txBody>
+                  <a:tcPr/>
+                </a:tc>
+                <a:tc>
+                  <a:txBody>
+                    <a:bodyPr/>
+                    <a:lstStyle/>
+                    <a:p>
+                      <a:pPr marL="0" marR="0" lvl="0" indent="0" algn="ctr" defTabSz="914400" rtl="0" eaLnBrk="1" fontAlgn="auto" latinLnBrk="0" hangingPunct="1">
+                        <a:lnSpc>
+                          <a:spcPct val="100000"/>
+                        </a:lnSpc>
+                        <a:spcBef>
+                          <a:spcPts val="0"/>
+                        </a:spcBef>
+                        <a:spcAft>
+                          <a:spcPts val="0"/>
+                        </a:spcAft>
+                        <a:buClrTx/>
+                        <a:buSzTx/>
+                        <a:buFontTx/>
+                        <a:buNone/>
+                        <a:tabLst/>
+                        <a:defRPr/>
+                      </a:pPr>
+                      <a:r>
+                        <a:rPr lang="de-DE" sz="1400" dirty="0"/>
+                        <a:t>Initiale Stichprobe x</a:t>
+                      </a:r>
+                      <a:r>
+                        <a:rPr lang="de-DE" sz="1400" baseline="-25000" dirty="0"/>
+                        <a:t>0</a:t>
+                      </a:r>
+                      <a:br>
+                        <a:rPr lang="de-DE" sz="1400" dirty="0"/>
+                      </a:br>
+                      <a:r>
+                        <a:rPr lang="de-DE" sz="1400" dirty="0"/>
+                        <a:t>Dichte </a:t>
+                      </a:r>
+                      <a:r>
+                        <a:rPr lang="el-GR" sz="1400" dirty="0"/>
+                        <a:t>π</a:t>
+                      </a:r>
+                      <a:endParaRPr lang="de-DE" sz="1400" dirty="0"/>
+                    </a:p>
+                    <a:p>
+                      <a:pPr algn="ctr"/>
+                      <a:r>
+                        <a:rPr lang="de-DE" sz="1400" dirty="0"/>
+                        <a:t>Gradient log(</a:t>
+                      </a:r>
+                      <a:r>
+                        <a:rPr lang="el-GR" sz="1400" dirty="0"/>
+                        <a:t>π</a:t>
+                      </a:r>
+                      <a:r>
+                        <a:rPr lang="de-DE" sz="1400" dirty="0"/>
+                        <a:t>)</a:t>
+                      </a:r>
+                    </a:p>
+                  </a:txBody>
+                  <a:tcPr/>
+                </a:tc>
+                <a:tc>
+                  <a:txBody>
+                    <a:bodyPr/>
+                    <a:lstStyle/>
+                    <a:p>
+                      <a:pPr marL="0" marR="0" lvl="0" indent="0" algn="ctr" defTabSz="914400" rtl="0" eaLnBrk="1" fontAlgn="auto" latinLnBrk="0" hangingPunct="1">
+                        <a:lnSpc>
+                          <a:spcPct val="100000"/>
+                        </a:lnSpc>
+                        <a:spcBef>
+                          <a:spcPts val="0"/>
+                        </a:spcBef>
+                        <a:spcAft>
+                          <a:spcPts val="0"/>
+                        </a:spcAft>
+                        <a:buClrTx/>
+                        <a:buSzTx/>
+                        <a:buFontTx/>
+                        <a:buNone/>
+                        <a:tabLst/>
+                        <a:defRPr/>
+                      </a:pPr>
+                      <a:r>
+                        <a:rPr lang="de-DE" sz="1400" dirty="0"/>
+                        <a:t>Initiale Stichprobe x</a:t>
+                      </a:r>
+                      <a:r>
+                        <a:rPr lang="de-DE" sz="1400" baseline="-25000" dirty="0"/>
+                        <a:t>0</a:t>
+                      </a:r>
+                      <a:br>
+                        <a:rPr lang="de-DE" sz="1400" dirty="0"/>
+                      </a:br>
+                      <a:r>
+                        <a:rPr lang="de-DE" sz="1400" dirty="0"/>
+                        <a:t>Dichte </a:t>
+                      </a:r>
+                      <a:r>
+                        <a:rPr lang="el-GR" sz="1400" dirty="0"/>
+                        <a:t>π</a:t>
+                      </a:r>
+                      <a:endParaRPr lang="de-DE" sz="1400" dirty="0"/>
+                    </a:p>
+                    <a:p>
+                      <a:pPr algn="ctr"/>
+                      <a:r>
+                        <a:rPr lang="de-DE" sz="1400" dirty="0"/>
+                        <a:t>Gradient log(</a:t>
+                      </a:r>
+                      <a:r>
+                        <a:rPr lang="el-GR" sz="1400" dirty="0"/>
+                        <a:t>π</a:t>
+                      </a:r>
+                      <a:r>
+                        <a:rPr lang="de-DE" sz="1400" dirty="0"/>
+                        <a:t>)</a:t>
+                      </a:r>
+                    </a:p>
+                  </a:txBody>
+                  <a:tcPr/>
+                </a:tc>
+                <a:extLst>
+                  <a:ext uri="{0D108BD9-81ED-4DB2-BD59-A6C34878D82A}">
+                    <a16:rowId xmlns:a16="http://schemas.microsoft.com/office/drawing/2014/main" val="381588593"/>
+                  </a:ext>
+                </a:extLst>
+              </a:tr>
+              <a:tr h="434763">
+                <a:tc>
+                  <a:txBody>
+                    <a:bodyPr/>
+                    <a:lstStyle/>
+                    <a:p>
+                      <a:r>
+                        <a:rPr lang="de-DE" sz="1400" dirty="0"/>
                         <a:t>Idee</a:t>
                       </a:r>
                     </a:p>
@@ -10614,9 +10831,10 @@
                     <a:bodyPr/>
                     <a:lstStyle/>
                     <a:p>
+                      <a:pPr algn="ctr"/>
                       <a:r>
                         <a:rPr lang="de-DE" sz="1400" dirty="0"/>
-                        <a:t>Schlage neuen Punkt zufällig in der Nähe des vorherigen Punktes vor und vergleiche wie wahrscheinlich er im Vergleich zum vorherigen Punkt ist</a:t>
+                        <a:t>Schlage neue Stichprobe zufällig in der Nähe der vorherigen Stichprobe vor und vergleiche wie wahrscheinlich sie im Vergleich zur vorherigen Stichprobe ist</a:t>
                       </a:r>
                     </a:p>
                   </a:txBody>
@@ -10627,9 +10845,10 @@
                     <a:bodyPr/>
                     <a:lstStyle/>
                     <a:p>
+                      <a:pPr algn="ctr"/>
                       <a:r>
                         <a:rPr lang="de-DE" sz="1400" dirty="0"/>
-                        <a:t>Wie MH, aber schlage neuen Punkt in Richtung des Gradienten der Dichte vor für höhere Annahmewahrscheinlichkeit</a:t>
+                        <a:t>Wie MH, aber schlage neue Stichprobe in Richtung des Gradienten der Dichte vor für höhere Annahmewahrscheinlichkeit</a:t>
                       </a:r>
                     </a:p>
                   </a:txBody>
@@ -10640,6 +10859,7 @@
                     <a:bodyPr/>
                     <a:lstStyle/>
                     <a:p>
+                      <a:pPr algn="ctr"/>
                       <a:r>
                         <a:rPr lang="de-DE" sz="1400" dirty="0"/>
                         <a:t>Wie MALA, aber bewege dich weiter in Richtung des Gradienten</a:t>
@@ -10653,6 +10873,7 @@
                     <a:bodyPr/>
                     <a:lstStyle/>
                     <a:p>
+                      <a:pPr algn="ctr"/>
                       <a:r>
                         <a:rPr lang="de-DE" sz="1400" dirty="0"/>
                         <a:t>Wie HMC, aber entscheide  adaptiv wie weit in Richtung des Gradienten (bis ein U-Turn gemacht wurde)</a:t>
@@ -10686,9 +10907,22 @@
                     <a:bodyPr/>
                     <a:lstStyle/>
                     <a:p>
+                      <a:pPr algn="ctr"/>
+                      <a:r>
+                        <a:rPr lang="de-DE" sz="1400" dirty="0" err="1"/>
+                        <a:t>Proposal</a:t>
+                      </a:r>
                       <a:r>
                         <a:rPr lang="de-DE" sz="1400" dirty="0"/>
-                        <a:t>Keine</a:t>
+                        <a:t> Density G (bei uns N(x</a:t>
+                      </a:r>
+                      <a:r>
+                        <a:rPr lang="de-DE" sz="1400" baseline="-25000" dirty="0"/>
+                        <a:t>n-1</a:t>
+                      </a:r>
+                      <a:r>
+                        <a:rPr lang="de-DE" sz="1400" dirty="0"/>
+                        <a:t>, 10))</a:t>
                       </a:r>
                     </a:p>
                   </a:txBody>
@@ -10699,6 +10933,7 @@
                     <a:bodyPr/>
                     <a:lstStyle/>
                     <a:p>
+                      <a:pPr algn="ctr"/>
                       <a:r>
                         <a:rPr lang="de-DE" sz="1400" dirty="0"/>
                         <a:t>Schrittweite ɛ​</a:t>
@@ -10712,6 +10947,7 @@
                     <a:bodyPr/>
                     <a:lstStyle/>
                     <a:p>
+                      <a:pPr algn="ctr"/>
                       <a:r>
                         <a:rPr lang="de-DE" sz="1400" dirty="0"/>
                         <a:t>Schrittweite ɛ​</a:t>
@@ -10732,6 +10968,7 @@
                     <a:bodyPr/>
                     <a:lstStyle/>
                     <a:p>
+                      <a:pPr algn="ctr"/>
                       <a:r>
                         <a:rPr lang="de-DE" sz="1400" dirty="0"/>
                         <a:t>Schrittweite ɛ​</a:t>
@@ -10765,6 +11002,7 @@
                     <a:bodyPr/>
                     <a:lstStyle/>
                     <a:p>
+                      <a:pPr algn="ctr"/>
                       <a:r>
                         <a:rPr lang="de-DE" sz="1400" dirty="0"/>
                         <a:t>Einfache Verteilungen</a:t>
@@ -10778,6 +11016,7 @@
                     <a:bodyPr/>
                     <a:lstStyle/>
                     <a:p>
+                      <a:pPr algn="ctr"/>
                       <a:r>
                         <a:rPr lang="de-DE" sz="1400" dirty="0"/>
                         <a:t>Mittel-Komplexe</a:t>
@@ -10798,6 +11037,7 @@
                     <a:bodyPr/>
                     <a:lstStyle/>
                     <a:p>
+                      <a:pPr algn="ctr"/>
                       <a:r>
                         <a:rPr lang="de-DE" sz="1400" dirty="0"/>
                         <a:t>Komplexe</a:t>
@@ -10818,7 +11058,7 @@
                     <a:bodyPr/>
                     <a:lstStyle/>
                     <a:p>
-                      <a:pPr marL="0" marR="0" lvl="0" indent="0" algn="l" defTabSz="914400" rtl="0" eaLnBrk="1" fontAlgn="auto" latinLnBrk="0" hangingPunct="1">
+                      <a:pPr marL="0" marR="0" lvl="0" indent="0" algn="ctr" defTabSz="914400" rtl="0" eaLnBrk="1" fontAlgn="auto" latinLnBrk="0" hangingPunct="1">
                         <a:lnSpc>
                           <a:spcPct val="100000"/>
                         </a:lnSpc>
@@ -10864,140 +11104,6 @@
                     <a:p>
                       <a:r>
                         <a:rPr lang="de-DE" sz="1400" dirty="0"/>
-                        <a:t>Benötigt</a:t>
-                      </a:r>
-                    </a:p>
-                  </a:txBody>
-                  <a:tcPr/>
-                </a:tc>
-                <a:tc>
-                  <a:txBody>
-                    <a:bodyPr/>
-                    <a:lstStyle/>
-                    <a:p>
-                      <a:r>
-                        <a:rPr lang="de-DE" sz="1400" dirty="0"/>
-                        <a:t>Dichte </a:t>
-                      </a:r>
-                      <a:r>
-                        <a:rPr lang="el-GR" sz="1400" dirty="0"/>
-                        <a:t>π</a:t>
-                      </a:r>
-                      <a:endParaRPr lang="de-DE" sz="1400" dirty="0"/>
-                    </a:p>
-                  </a:txBody>
-                  <a:tcPr/>
-                </a:tc>
-                <a:tc>
-                  <a:txBody>
-                    <a:bodyPr/>
-                    <a:lstStyle/>
-                    <a:p>
-                      <a:r>
-                        <a:rPr lang="de-DE" sz="1400" dirty="0"/>
-                        <a:t>Dichte </a:t>
-                      </a:r>
-                      <a:r>
-                        <a:rPr lang="el-GR" sz="1400" dirty="0"/>
-                        <a:t>π</a:t>
-                      </a:r>
-                      <a:br>
-                        <a:rPr lang="de-DE" sz="1400" dirty="0"/>
-                      </a:br>
-                      <a:r>
-                        <a:rPr lang="de-DE" sz="1400" dirty="0"/>
-                        <a:t>Gradient log(</a:t>
-                      </a:r>
-                      <a:r>
-                        <a:rPr lang="el-GR" sz="1400" dirty="0"/>
-                        <a:t>π</a:t>
-                      </a:r>
-                      <a:r>
-                        <a:rPr lang="de-DE" sz="1400" dirty="0"/>
-                        <a:t>)</a:t>
-                      </a:r>
-                    </a:p>
-                  </a:txBody>
-                  <a:tcPr/>
-                </a:tc>
-                <a:tc>
-                  <a:txBody>
-                    <a:bodyPr/>
-                    <a:lstStyle/>
-                    <a:p>
-                      <a:r>
-                        <a:rPr lang="de-DE" sz="1400" dirty="0"/>
-                        <a:t>Dichte </a:t>
-                      </a:r>
-                      <a:r>
-                        <a:rPr lang="el-GR" sz="1400" dirty="0"/>
-                        <a:t>π</a:t>
-                      </a:r>
-                      <a:endParaRPr lang="de-DE" sz="1400" dirty="0"/>
-                    </a:p>
-                    <a:p>
-                      <a:r>
-                        <a:rPr lang="de-DE" sz="1400" dirty="0"/>
-                        <a:t>Gradient log(</a:t>
-                      </a:r>
-                      <a:r>
-                        <a:rPr lang="el-GR" sz="1400" dirty="0"/>
-                        <a:t>π</a:t>
-                      </a:r>
-                      <a:r>
-                        <a:rPr lang="de-DE" sz="1400" dirty="0"/>
-                        <a:t>)</a:t>
-                      </a:r>
-                    </a:p>
-                  </a:txBody>
-                  <a:tcPr/>
-                </a:tc>
-                <a:tc>
-                  <a:txBody>
-                    <a:bodyPr/>
-                    <a:lstStyle/>
-                    <a:p>
-                      <a:r>
-                        <a:rPr lang="de-DE" sz="1400" dirty="0"/>
-                        <a:t>Dichte </a:t>
-                      </a:r>
-                      <a:r>
-                        <a:rPr lang="el-GR" sz="1400" dirty="0"/>
-                        <a:t>π</a:t>
-                      </a:r>
-                      <a:endParaRPr lang="de-DE" sz="1400" dirty="0"/>
-                    </a:p>
-                    <a:p>
-                      <a:r>
-                        <a:rPr lang="de-DE" sz="1400" dirty="0"/>
-                        <a:t>Gradient log(</a:t>
-                      </a:r>
-                      <a:r>
-                        <a:rPr lang="el-GR" sz="1400" dirty="0"/>
-                        <a:t>π</a:t>
-                      </a:r>
-                      <a:r>
-                        <a:rPr lang="de-DE" sz="1400" dirty="0"/>
-                        <a:t>)</a:t>
-                      </a:r>
-                    </a:p>
-                  </a:txBody>
-                  <a:tcPr/>
-                </a:tc>
-                <a:extLst>
-                  <a:ext uri="{0D108BD9-81ED-4DB2-BD59-A6C34878D82A}">
-                    <a16:rowId xmlns:a16="http://schemas.microsoft.com/office/drawing/2014/main" val="585360061"/>
-                  </a:ext>
-                </a:extLst>
-              </a:tr>
-              <a:tr h="434763">
-                <a:tc>
-                  <a:txBody>
-                    <a:bodyPr/>
-                    <a:lstStyle/>
-                    <a:p>
-                      <a:r>
-                        <a:rPr lang="de-DE" sz="1400" dirty="0"/>
                         <a:t>Rechenaufwand</a:t>
                       </a:r>
                     </a:p>
@@ -11009,6 +11115,7 @@
                     <a:bodyPr/>
                     <a:lstStyle/>
                     <a:p>
+                      <a:pPr algn="ctr"/>
                       <a:r>
                         <a:rPr lang="de-DE" sz="1400" dirty="0"/>
                         <a:t>Niedrig</a:t>
@@ -11022,6 +11129,7 @@
                     <a:bodyPr/>
                     <a:lstStyle/>
                     <a:p>
+                      <a:pPr algn="ctr"/>
                       <a:r>
                         <a:rPr lang="de-DE" sz="1400" dirty="0"/>
                         <a:t>Mittel</a:t>
@@ -11035,6 +11143,7 @@
                     <a:bodyPr/>
                     <a:lstStyle/>
                     <a:p>
+                      <a:pPr algn="ctr"/>
                       <a:r>
                         <a:rPr lang="de-DE" sz="1400" dirty="0"/>
                         <a:t>Hoch</a:t>
@@ -11048,6 +11157,7 @@
                     <a:bodyPr/>
                     <a:lstStyle/>
                     <a:p>
+                      <a:pPr algn="ctr"/>
                       <a:r>
                         <a:rPr lang="de-DE" sz="1400" dirty="0"/>
                         <a:t>Hoch</a:t>
@@ -11076,11 +11186,6 @@
   <p:clrMapOvr>
     <a:masterClrMapping/>
   </p:clrMapOvr>
-  <p:extLst>
-    <p:ext uri="{6950BFC3-D8DA-4A85-94F7-54DA5524770B}">
-      <p188:commentRel xmlns:p188="http://schemas.microsoft.com/office/powerpoint/2018/8/main" r:id="rId2"/>
-    </p:ext>
-  </p:extLst>
 </p:sld>
 </file>
 

</xml_diff>